<commit_message>
fixed compressing-faces exercise and PCA presentation
</commit_message>
<xml_diff>
--- a/Day 1/3 Dimensionality reduction/PCA.pptx
+++ b/Day 1/3 Dimensionality reduction/PCA.pptx
@@ -821,7 +821,7 @@
   <inkml:trace contextRef="#ctx0" brushRef="#br0">22 26 20071 0 0,'0'0'919'0'0,"0"-1"-20"0"0,0 1-882 0 0,0 0 0 0 0,0 0 0 0 0,0 0 0 0 0,0 0 0 0 0,0-1 0 0 0,0 1 0 0 0,0 0 0 0 0,0 0-1 0 0,0 0 1 0 0,0 0 0 0 0,0 0 0 0 0,-1 0 0 0 0,1 0 0 0 0,0 0 0 0 0,0-1 0 0 0,0 1 0 0 0,0 0 0 0 0,0 0 0 0 0,0 0 0 0 0,0 0 0 0 0,0 0 0 0 0,-1 0 0 0 0,1 0 0 0 0,0 0 0 0 0,0 0 0 0 0,0 0 0 0 0,0 0 0 0 0,0 0 0 0 0,0 0 0 0 0,-1 0 0 0 0,1 0 0 0 0,0 0 0 0 0,0 0 0 0 0,0 0 0 0 0,0 0 0 0 0,0 0 0 0 0,0 0 0 0 0,-1 0 0 0 0,1 0 0 0 0,0 0 0 0 0,0 0 0 0 0,0 0 0 0 0,0 0 0 0 0,0 0 0 0 0,0 0 0 0 0,0 0 0 0 0,-1 0 0 0 0,1 1 0 0 0,0-1 0 0 0,0 0 0 0 0,0 0 0 0 0,0 0 0 0 0,0 0 0 0 0,0 0 0 0 0,0 0 0 0 0,0 0 0 0 0,0 1 0 0 0,0-1-1 0 0,0 0 1 0 0,0 0 0 0 0,-1 0 0 0 0,1 0-17 0 0,-6 7 746 0 0,4-3-594 0 0,1 0 0 0 0,-1 0 0 0 0,1 0 0 0 0,0 0 0 0 0,0 1 0 0 0,0-1 0 0 0,1 0 0 0 0,-1 1 0 0 0,1 0-152 0 0,2 43 504 0 0,0-21-329 0 0,2 25 328 0 0,4 20-503 0 0,-4-44 90 0 0,0 3-282 0 0,1 0 1 0 0,7 21 191 0 0,-9-43 82 0 0,-1-1 1 0 0,1 0-1 0 0,1 0 1 0 0,-1 0-1 0 0,1-1 1 0 0,1 1-1 0 0,-1-1 1 0 0,1 0-1 0 0,1 0 1 0 0,-1 0-1 0 0,1-1 1 0 0,3 2-83 0 0,-8-6 9 0 0,1-1-1 0 0,0 0 1 0 0,-1 0 0 0 0,1 0 0 0 0,0 0 0 0 0,0 0-1 0 0,0 0 1 0 0,0 0 0 0 0,0 0 0 0 0,0-1-1 0 0,0 1 1 0 0,0-1 0 0 0,0 0 0 0 0,0 1 0 0 0,0-1-1 0 0,0 0 1 0 0,0 0 0 0 0,0 0 0 0 0,0-1-9 0 0,1 1 20 0 0,1-1-1 0 0,-1 0 1 0 0,0 0 0 0 0,0-1 0 0 0,0 1 0 0 0,0-1 0 0 0,0 1 0 0 0,-1-1 0 0 0,1 0 0 0 0,0 0 0 0 0,0-1-20 0 0,6-5 45 0 0,-1 0 0 0 0,-1-1 0 0 0,0 0 1 0 0,0 0-1 0 0,-1-1 0 0 0,3-4-45 0 0,0-4 46 0 0,0-1 1 0 0,-1 0-1 0 0,-1 0 0 0 0,-1-1 0 0 0,0 0 0 0 0,-2 0 1 0 0,0 0-1 0 0,-1 0 0 0 0,0-21-46 0 0,-3 0 104 0 0,-2 0 0 0 0,-1 0 0 0 0,-2 1 0 0 0,-6-22-104 0 0,14 116 133 0 0,-1 0-138 0 0,12 134 238 0 0,-2-11 622 0 0,-12-165-975 0 0,2 0 0 0 0,0 0 0 0 0,0-1 0 0 0,1 1 0 0 0,0 0 0 0 0,1-1 0 0 0,0 1 0 0 0,3 2 120 0 0,-7-13-97 0 0,0-1-1 0 0,1 1 0 0 0,-1-1 1 0 0,0 1-1 0 0,1 0 1 0 0,-1-1-1 0 0,1 1 0 0 0,-1-1 1 0 0,1 1-1 0 0,-1-1 0 0 0,1 1 1 0 0,0-1-1 0 0,-1 1 1 0 0,1-1-1 0 0,-1 0 0 0 0,2 1 98 0 0,4-1-7047 0 0,1-1-1591 0 0</inkml:trace>
   <inkml:trace contextRef="#ctx0" brushRef="#br0" timeOffset="344.376">487 424 21623 0 0,'0'0'992'0'0,"0"0"-25"0"0,0 0-540 0 0,0 20 1561 0 0,1 1-1770 0 0,2-1 1 0 0,0 0 0 0 0,1 1-1 0 0,2 3-218 0 0,-6-22-3933 0 0,-1-4 2214 0 0,-1-4 1018 0 0,1-6-946 0 0</inkml:trace>
   <inkml:trace contextRef="#ctx0" brushRef="#br0" timeOffset="345.376">475 258 20815 0 0,'0'-3'456'0'0,"-2"3"96"0"0,0-1 24 0 0,0 1 8 0 0,-1-3-464 0 0,3 2-120 0 0,0 1 0 0 0,0 0 0 0 0,0 0 224 0 0,0 0 32 0 0,0 0 0 0 0,0 0 0 0 0,0 0-1208 0 0,0 0-232 0 0</inkml:trace>
-  <inkml:trace contextRef="#ctx0" brushRef="#br0" timeOffset="680.056">607 311 20127 0 0,'0'0'926'0'0,"0"0"-26"0"0,1 12 637 0 0,3 3-495 0 0,-1 0-1 0 0,-1 0 1 0 0,1 15-1042 0 0,0 2 391 0 0,1 43-91 0 0,-4-49-362 0 0,2-1 1 0 0,2 15 61 0 0,-4-34-2189 0 0,0-6 898 0 0</inkml:trace>
+  <inkml:trace contextRef="#ctx0" brushRef="#br0" timeOffset="680.055">607 311 20127 0 0,'0'0'926'0'0,"0"0"-26"0"0,1 12 637 0 0,3 3-495 0 0,-1 0-1 0 0,-1 0 1 0 0,1 15-1042 0 0,0 2 391 0 0,1 43-91 0 0,-4-49-362 0 0,2-1 1 0 0,2 15 61 0 0,-4-34-2189 0 0,0-6 898 0 0</inkml:trace>
   <inkml:trace contextRef="#ctx0" brushRef="#br0" timeOffset="1059.202">729 450 16384 0 0,'19'-20'3035'0'0,"-19"20"-1625"0"0,0 0 59 0 0,0 0-114 0 0,0 0-546 0 0,-6 11 760 0 0,5-7-1381 0 0,-7 12 164 0 0,0-1 0 0 0,0 0 0 0 0,-3 2-352 0 0,9-13 37 0 0,-1-1-1 0 0,0 1 1 0 0,0-1-1 0 0,0 0 0 0 0,0 0 1 0 0,0 0-1 0 0,-1 0 0 0 0,1 0 1 0 0,-1-1-1 0 0,0 1 0 0 0,0-1 1 0 0,0 0-1 0 0,0-1 0 0 0,-3 2-36 0 0,-1-2 373 0 0,8-2 296 0 0,1 1-640 0 0,0-1-1 0 0,0 1 1 0 0,0 0-1 0 0,0 0 1 0 0,0-1-1 0 0,0 1 1 0 0,0 0-1 0 0,0 0 1 0 0,0 0-1 0 0,0 0 0 0 0,0 0 1 0 0,0 0-1 0 0,1 1-28 0 0,6 0 2 0 0,0 1 0 0 0,0 1 0 0 0,0-1 0 0 0,-1 2 0 0 0,1-1 0 0 0,-1 1-1 0 0,1 0-1 0 0,51 35-1 0 0,-28-18 0 0 0,-23-15-827 0 0,0 0-1 0 0,-1 0 1 0 0,1 1-1 0 0,-1 0 1 0 0,3 4 828 0 0,-4-4-9129 0 0</inkml:trace>
 </inkml:ink>
 </file>
@@ -933,7 +933,7 @@
     </inkml:brush>
   </inkml:definitions>
   <inkml:trace contextRef="#ctx0" brushRef="#br0">1629 472 7368 0 0,'0'0'333'0'0,"0"0"0"0"0,0 0 49 0 0,0 0 986 0 0,0 0 450 0 0,0 0 94 0 0,0 0-150 0 0,0 0-720 0 0,12-16 2901 0 0,-3 5-3248 0 0,0-1 0 0 0,-1-1 1 0 0,4-7-696 0 0,5-9 492 0 0,4-5 548 0 0,-20 27-797 0 0,-1 6-225 0 0,0 1-1 0 0,0 0 1 0 0,0-1-1 0 0,0 1 1 0 0,0-1-1 0 0,0 1 1 0 0,0 0 0 0 0,0-1-1 0 0,0 1 1 0 0,0 0-1 0 0,0-1 1 0 0,0 1 0 0 0,1-1-1 0 0,-1 1 1 0 0,0 0-1 0 0,0-1 1 0 0,0 1-1 0 0,0 0 1 0 0,1-1 0 0 0,-1 1-1 0 0,0 0 1 0 0,0 0-1 0 0,1-1 1 0 0,-1 1 0 0 0,0 0-1 0 0,0-1 1 0 0,1 1-1 0 0,-1 0 1 0 0,0 0-1 0 0,1 0 1 0 0,-1-1 0 0 0,0 1-1 0 0,1 0 1 0 0,-1 0-1 0 0,0 0 1 0 0,1 0-1 0 0,-1 0 1 0 0,0 0 0 0 0,1 0-1 0 0,-1 0 1 0 0,1 0-1 0 0,-1 0 1 0 0,0 0 0 0 0,1 0-1 0 0,-1 0 1 0 0,0 0-1 0 0,1 0 1 0 0,-1 0-1 0 0,1 0 1 0 0,-1 0 0 0 0,0 0-1 0 0,1 1 1 0 0,-1-1-1 0 0,0 0 1 0 0,1 0 0 0 0,-1 0-1 0 0,0 1 1 0 0,0-1-1 0 0,1 0-17 0 0,1 2 8 0 0,0-1 0 0 0,0 1-1 0 0,0-1 1 0 0,0 1 0 0 0,0 0-1 0 0,-1 0 1 0 0,1-1 0 0 0,0 1-1 0 0,-1 0 1 0 0,0 1-1 0 0,2 1-7 0 0,11 29 189 0 0,0-2 12 0 0,-8-22-28 0 0,0 1 1 0 0,1-2 0 0 0,2 3-174 0 0,5 3-7193 0 0,-4-6-944 0 0</inkml:trace>
-  <inkml:trace contextRef="#ctx0" brushRef="#br0" timeOffset="1280.863">2074 1346 5064 0 0,'0'0'389'0'0,"0"0"-136"0"0,0 0 357 0 0,-2-4 2180 0 0,-2-6-904 0 0,4 7-1527 0 0,-1 0 1 0 0,1 0-1 0 0,-1 0 1 0 0,0 0 0 0 0,0 0-1 0 0,-1 0 1 0 0,1 0-1 0 0,-1 1 1 0 0,1-1-1 0 0,-1 1 1 0 0,0-1-1 0 0,0 1 1 0 0,0-1 0 0 0,0 1-1 0 0,0 0 1 0 0,-1 0-1 0 0,1 0 1 0 0,-1 0-1 0 0,1 0 1 0 0,-1 1 0 0 0,0-1-360 0 0,1 1 25 0 0,1 1 0 0 0,-1-1 0 0 0,0 0 0 0 0,0 1 0 0 0,0 0 0 0 0,1-1 0 0 0,-1 1 0 0 0,0 0 0 0 0,0 0 0 0 0,0 0 0 0 0,0 0 0 0 0,1 0 0 0 0,-1 0 0 0 0,0 1 0 0 0,0-1 0 0 0,0 1 0 0 0,1-1 1 0 0,-1 1-1 0 0,0 0 0 0 0,1-1 0 0 0,-1 1 0 0 0,0 0 0 0 0,1 0 0 0 0,-1 0 0 0 0,1 0 0 0 0,-1 1 0 0 0,1-1 0 0 0,0 0 0 0 0,0 1 0 0 0,-1-1 0 0 0,1 0 0 0 0,0 1 0 0 0,0 0 0 0 0,0-1 0 0 0,0 2-25 0 0,-2 2-15 0 0,1 0 0 0 0,0 0 0 0 0,0 0-1 0 0,1 1 1 0 0,-1-1 0 0 0,1 0 0 0 0,0 1-1 0 0,0-1 1 0 0,1 0 0 0 0,0 1 0 0 0,0-1-1 0 0,0 1 1 0 0,1-1 0 0 0,-1 1 0 0 0,1-1-1 0 0,1 0 1 0 0,-1 0 0 0 0,1 1-1 0 0,0-1 1 0 0,0 0 0 0 0,0 0 0 0 0,1 0-1 0 0,-1-1 1 0 0,1 1 0 0 0,1-1 0 0 0,-1 1-1 0 0,4 2 16 0 0,-6-5-53 0 0,0-1 0 0 0,0 0 0 0 0,0 0-1 0 0,0 0 1 0 0,0 0 0 0 0,0 0 0 0 0,1 0-1 0 0,-1 0 1 0 0,0 0 0 0 0,1-1 0 0 0,-1 1-1 0 0,0 0 1 0 0,1-1 0 0 0,-1 1 0 0 0,1-1-1 0 0,-1 0 1 0 0,1 1 0 0 0,-1-1 0 0 0,1 0-1 0 0,-1 0 1 0 0,2 0 53 0 0,-1 0-67 0 0,-1-1-1 0 0,1 1 1 0 0,-1-1-1 0 0,1 0 1 0 0,-1 1 0 0 0,1-1-1 0 0,-1 0 1 0 0,1 0-1 0 0,-1 0 1 0 0,0 0-1 0 0,1 0 1 0 0,-1 0 0 0 0,0 0-1 0 0,0-1 1 0 0,0 1-1 0 0,1-2 68 0 0,2-4-136 0 0,1-1 0 0 0,-1 0 0 0 0,0 0 0 0 0,-1 0 0 0 0,0 0 0 0 0,1-7 136 0 0,-1 1-142 0 0,0 0 0 0 0,-1 0 0 0 0,-1 0 0 0 0,0 0 1 0 0,-1-9 141 0 0,-3-25-521 0 0,-2 0 521 0 0,0 11-388 0 0,4 19 286 0 0,-2-9 82 0 0,0 1-1 0 0,-3-9 21 0 0,5 35 597 0 0,1 0-73 0 0,4 60 276 0 0,2 1 0 0 0,2-1-1 0 0,9 26-799 0 0,4 30 198 0 0,-13-83-548 0 0,-4-19-60 0 0</inkml:trace>
+  <inkml:trace contextRef="#ctx0" brushRef="#br0" timeOffset="1280.862">2074 1346 5064 0 0,'0'0'389'0'0,"0"0"-136"0"0,0 0 357 0 0,-2-4 2180 0 0,-2-6-904 0 0,4 7-1527 0 0,-1 0 1 0 0,1 0-1 0 0,-1 0 1 0 0,0 0 0 0 0,0 0-1 0 0,-1 0 1 0 0,1 0-1 0 0,-1 1 1 0 0,1-1-1 0 0,-1 1 1 0 0,0-1-1 0 0,0 1 1 0 0,0-1 0 0 0,0 1-1 0 0,0 0 1 0 0,-1 0-1 0 0,1 0 1 0 0,-1 0-1 0 0,1 0 1 0 0,-1 1 0 0 0,0-1-360 0 0,1 1 25 0 0,1 1 0 0 0,-1-1 0 0 0,0 0 0 0 0,0 1 0 0 0,0 0 0 0 0,1-1 0 0 0,-1 1 0 0 0,0 0 0 0 0,0 0 0 0 0,0 0 0 0 0,0 0 0 0 0,1 0 0 0 0,-1 0 0 0 0,0 1 0 0 0,0-1 0 0 0,0 1 0 0 0,1-1 1 0 0,-1 1-1 0 0,0 0 0 0 0,1-1 0 0 0,-1 1 0 0 0,0 0 0 0 0,1 0 0 0 0,-1 0 0 0 0,1 0 0 0 0,-1 1 0 0 0,1-1 0 0 0,0 0 0 0 0,0 1 0 0 0,-1-1 0 0 0,1 0 0 0 0,0 1 0 0 0,0 0 0 0 0,0-1 0 0 0,0 2-25 0 0,-2 2-15 0 0,1 0 0 0 0,0 0 0 0 0,0 0-1 0 0,1 1 1 0 0,-1-1 0 0 0,1 0 0 0 0,0 1-1 0 0,0-1 1 0 0,1 0 0 0 0,0 1 0 0 0,0-1-1 0 0,0 1 1 0 0,1-1 0 0 0,-1 1 0 0 0,1-1-1 0 0,1 0 1 0 0,-1 0 0 0 0,1 1-1 0 0,0-1 1 0 0,0 0 0 0 0,0 0 0 0 0,1 0-1 0 0,-1-1 1 0 0,1 1 0 0 0,1-1 0 0 0,-1 1-1 0 0,4 2 16 0 0,-6-5-53 0 0,0-1 0 0 0,0 0 0 0 0,0 0-1 0 0,0 0 1 0 0,0 0 0 0 0,0 0 0 0 0,1 0-1 0 0,-1 0 1 0 0,0 0 0 0 0,1-1 0 0 0,-1 1-1 0 0,0 0 1 0 0,1-1 0 0 0,-1 1 0 0 0,1-1-1 0 0,-1 0 1 0 0,1 1 0 0 0,-1-1 0 0 0,1 0-1 0 0,-1 0 1 0 0,2 0 53 0 0,-1 0-67 0 0,-1-1-1 0 0,1 1 1 0 0,-1-1-1 0 0,1 0 1 0 0,-1 1 0 0 0,1-1-1 0 0,-1 0 1 0 0,1 0-1 0 0,-1 0 1 0 0,0 0-1 0 0,1 0 1 0 0,-1 0 0 0 0,0 0-1 0 0,0-1 1 0 0,0 1-1 0 0,1-2 68 0 0,2-4-136 0 0,1-1 0 0 0,-1 0 0 0 0,0 0 0 0 0,-1 0 0 0 0,0 0 0 0 0,1-7 136 0 0,-1 1-142 0 0,0 0 0 0 0,-1 0 0 0 0,-1 0 0 0 0,0 0 1 0 0,-1-9 141 0 0,-3-25-521 0 0,-2 0 521 0 0,0 11-388 0 0,4 19 286 0 0,-2-9 82 0 0,0 1-1 0 0,-3-9 21 0 0,5 35 597 0 0,1 0-73 0 0,4 60 276 0 0,2 1 0 0 0,2-1-1 0 0,9 26-799 0 0,4 30 198 0 0,-13-83-548 0 0,-4-19-60 0 0</inkml:trace>
   <inkml:trace contextRef="#ctx0" brushRef="#br0" timeOffset="8871.732">371 23 3224 0 0,'0'0'272'0'0,"0"0"-68"0"0,0 0-32 0 0,0 0-4 0 0,0 0 25 0 0,0 0 107 0 0,5-9 1630 0 0,-4 6 1965 0 0,-3 5-3751 0 0,1 0 0 0 0,0-1 0 0 0,0 1 0 0 0,0-1 0 0 0,0 1 0 0 0,0 0 0 0 0,0 0-1 0 0,0 0 1 0 0,1-1 0 0 0,-1 1 0 0 0,1 0 0 0 0,-1 1-144 0 0,-4 29 970 0 0,4-20-505 0 0,-2 16 27 0 0,2 1 0 0 0,2 0 0 0 0,0 0 0 0 0,2-1 0 0 0,3 16-492 0 0,1 2 603 0 0,-2 26-603 0 0,-4 42 750 0 0,1 20 839 0 0,7 7-1589 0 0,-4-77 779 0 0,-1 33-253 0 0,-3-59-442 0 0,-1 55 172 0 0,-1-51 273 0 0,2-1 0 0 0,3 22-529 0 0,2-12 842 0 0,-1 24-842 0 0,-5-44 108 0 0,-3 23-108 0 0,0-15 379 0 0,4 30-379 0 0,0-23 307 0 0,1 31-220 0 0,1-41-25 0 0,-3 0-1 0 0,-2 22-61 0 0,0-42-13 0 0,0 7-33 0 0,0 0 0 0 0,1 0 1 0 0,2 3 45 0 0,2-16-629 0 0,-2-10 568 0 0,-1 0 0 0 0,0 0 1 0 0,0 0-1 0 0,1 0 0 0 0,-1 0 0 0 0,0 1 1 0 0,0-1-1 0 0,1 0 0 0 0,-1 0 0 0 0,0 0 1 0 0,0 0-1 0 0,1 0 0 0 0,-1 0 0 0 0,0 0 1 0 0,1 0-1 0 0,-1 0 0 0 0,0 0 0 0 0,0 0 0 0 0,1 0 1 0 0,-1 0-1 0 0,0-1 0 0 0,0 1 0 0 0,1 0 1 0 0,-1 0-1 0 0,0 0 0 0 0,0 0 0 0 0,1 0 1 0 0,-1 0-1 0 0,0-1 0 0 0,0 1 0 0 0,0 0 1 0 0,1 0-1 0 0,-1 0 0 0 0,0-1 61 0 0,6-5-1171 0 0</inkml:trace>
   <inkml:trace contextRef="#ctx0" brushRef="#br0" timeOffset="12861.872">2943 15 7312 0 0,'0'-6'-1835'0'0,"1"-1"7107"0"0,-1 6 173 0 0,0 5-2145 0 0,-1 0-3224 0 0,-4 55 1846 0 0,3 1 0 0 0,3 24-1922 0 0,-1 20 896 0 0,-3 42-338 0 0,-3 156 981 0 0,4-227-1169 0 0,0-30-27 0 0,2-1 0 0 0,2 3-343 0 0,3 46 568 0 0,-4 9-568 0 0,-1-91 16 0 0,4 308 496 0 0,-5-258-532 0 0,-1-24-24 0 0,4 30 44 0 0,-2-27 35 0 0,0-26-691 0 0,0-1-1 0 0,1 0 1 0 0,0 3 656 0 0,-1-14-1504 0 0,0-1-66 0 0</inkml:trace>
   <inkml:trace contextRef="#ctx0" brushRef="#br0" timeOffset="14435.533">445 1922 8496 0 0,'0'0'388'0'0,"0"0"-11"0"0,15 8 490 0 0,-1-8-769 0 0,5 0 623 0 0,1 0-1 0 0,-1-2 1 0 0,1 0 0 0 0,1-1-721 0 0,11-3 1134 0 0,0 3 0 0 0,0 0 1 0 0,4 2-1135 0 0,52-4 199 0 0,122-15 1105 0 0,-137 16-489 0 0,37 4-815 0 0,-49 0 57 0 0,-9 1-57 0 0,84-3 0 0 0,145-6 887 0 0,-240 9-708 0 0,5-1 78 0 0,26-3-257 0 0,185-14 412 0 0,-145 13 68 0 0,-14 0-412 0 0,-12 3 708 0 0,-47 2-675 0 0,21-4-101 0 0,195-13-88 0 0,-249 16-84 0 0,0-1-1 0 0,0 1 1 0 0,0 1-1 0 0,-1-1 1 0 0,1 1-1 0 0,0 0 1 0 0,0 0-1 0 0,-1 0 1 0 0,1 1 0 0 0,-1 0-1 0 0,4 2 173 0 0,-3-3-823 0 0</inkml:trace>
@@ -1026,9 +1026,9 @@
     </inkml:brush>
   </inkml:definitions>
   <inkml:trace contextRef="#ctx0" brushRef="#br0">763 82 20127 0 0,'-12'-7'1254'0'0,"-7"-11"-304"0"0,3 3-946 0 0,9 10 294 0 0,0 0 0 0 0,-1 1 1 0 0,1 0-1 0 0,-1 1 0 0 0,1-1 0 0 0,-1 2 0 0 0,0-1 0 0 0,0 1 0 0 0,0 0 0 0 0,-1 1 0 0 0,0-1-298 0 0,-22-1 693 0 0,0 1-1 0 0,-10 2-692 0 0,40 0-8 0 0,-31 1 213 0 0,1 2-1 0 0,0 1 0 0 0,1 2 1 0 0,-1 0-1 0 0,1 2 0 0 0,0 2 1 0 0,1 0-1 0 0,0 2 0 0 0,1 1 1 0 0,0 2-1 0 0,-15 10-204 0 0,30-17 67 0 0,0 1 1 0 0,1 1-1 0 0,0-1 0 0 0,0 2 1 0 0,1 0-1 0 0,1 0 0 0 0,-1 1 1 0 0,2 0-1 0 0,0 1 0 0 0,0 0 1 0 0,2 1-1 0 0,-3 4-67 0 0,8-14 0 0 0,1-1 0 0 0,0 0 0 0 0,0 1 0 0 0,0-1 0 0 0,1 1 0 0 0,-1-1 0 0 0,1 1 0 0 0,0-1 0 0 0,0 1 0 0 0,0-1 0 0 0,0 1 0 0 0,1-1 0 0 0,-1 1 0 0 0,1-1 0 0 0,0 1 0 0 0,0-1 0 0 0,1 3 0 0 0,0-2 0 0 0,0 0 0 0 0,0-1 0 0 0,1 1 0 0 0,0 0 0 0 0,-1-1 0 0 0,1 1 0 0 0,0-1 0 0 0,0 0 0 0 0,1 0 0 0 0,-1-1 0 0 0,1 1 0 0 0,-1 0 0 0 0,1-1 0 0 0,1 1 0 0 0,14 6 26 0 0,1 0 0 0 0,-1-2 0 0 0,1 0 0 0 0,14 3-26 0 0,87 14 197 0 0,-59-13-82 0 0,3 4-115 0 0,-23-4-5 0 0,-1 2 0 0 0,0 2 1 0 0,0 1-1 0 0,28 18 5 0 0,-53-25 0 0 0,0 1 0 0 0,-1 1 1 0 0,-1 0-1 0 0,0 1 0 0 0,10 10 0 0 0,-16-12 4 0 0,1 0 0 0 0,-1 0 0 0 0,0 1 0 0 0,-1 0 0 0 0,-1 1 0 0 0,0-1-1 0 0,0 1 1 0 0,1 7-4 0 0,-4-13 52 0 0,-1 1 0 0 0,-1 0 0 0 0,1 0-1 0 0,-1 0 1 0 0,0 0 0 0 0,-1 0 0 0 0,0 0 0 0 0,0 0-1 0 0,0 0 1 0 0,-1 0 0 0 0,0 0 0 0 0,0 0-1 0 0,-1 0 1 0 0,0-1 0 0 0,0 1 0 0 0,-1 0-1 0 0,1-1 1 0 0,-2 1 0 0 0,1-1 0 0 0,0 0-1 0 0,-3 1-51 0 0,-2 4 96 0 0,0 0-1 0 0,-1-1 0 0 0,-1-1 1 0 0,1 1-1 0 0,-2-2 0 0 0,1 1 0 0 0,-1-1 1 0 0,0-1-1 0 0,-1 0 0 0 0,-9 4-95 0 0,2-2 21 0 0,-1 0 0 0 0,0-1 0 0 0,0-2 1 0 0,-1 0-1 0 0,0-1 0 0 0,0-1 0 0 0,-16 1-21 0 0,23-4 8 0 0,1-1 0 0 0,0 0 0 0 0,-1-1-1 0 0,1 0 1 0 0,0-1 0 0 0,0-1 0 0 0,-1 0 0 0 0,2-1 0 0 0,-1 0 0 0 0,0-1 0 0 0,1 0 0 0 0,0-1 0 0 0,-1-1-8 0 0,-8-6-985 0 0,0-2 1 0 0,1 0-1 0 0,-15-15 985 0 0,16 12-2500 0 0,1-1 0 0 0,0-1 0 0 0,-8-13 2500 0 0,1-6-9601 0 0</inkml:trace>
-  <inkml:trace contextRef="#ctx0" brushRef="#br0" timeOffset="490.99">911 509 19007 0 0,'-1'0'95'0'0,"0"0"0"0"0,0 0 0 0 0,0 0-1 0 0,0 0 1 0 0,1 0 0 0 0,-1 0 0 0 0,0 0-1 0 0,0 0 1 0 0,0 0 0 0 0,1 0-1 0 0,-1 0 1 0 0,0 1 0 0 0,0-1 0 0 0,0 0-1 0 0,1 1 1 0 0,-1-1 0 0 0,0 0 0 0 0,1 1-1 0 0,-1-1 1 0 0,0 1 0 0 0,1-1 0 0 0,-1 1-1 0 0,0 0 1 0 0,1-1 0 0 0,-1 1-1 0 0,1 0 1 0 0,-1-1 0 0 0,1 1 0 0 0,0 0-1 0 0,-1-1 1 0 0,1 1 0 0 0,0 0 0 0 0,-1 0-1 0 0,1-1 1 0 0,0 1 0 0 0,0 0 0 0 0,0 0-1 0 0,-1 0 1 0 0,1 0 0 0 0,0-1-1 0 0,0 1 1 0 0,0 0 0 0 0,0 0 0 0 0,1 0-1 0 0,-1-1 1 0 0,0 2-95 0 0,2 4 622 0 0,0 1-1 0 0,0-1 0 0 0,0 1 1 0 0,1-1-1 0 0,2 4-621 0 0,0-1 69 0 0,18 47 320 0 0,-2 0 0 0 0,11 51-389 0 0,-28-88-689 0 0,0 1 0 0 0,0 17 689 0 0,-2-16-3722 0 0,5 22 3722 0 0,-5-33-8195 0 0</inkml:trace>
+  <inkml:trace contextRef="#ctx0" brushRef="#br0" timeOffset="490.989">911 509 19007 0 0,'-1'0'95'0'0,"0"0"0"0"0,0 0 0 0 0,0 0-1 0 0,0 0 1 0 0,1 0 0 0 0,-1 0 0 0 0,0 0-1 0 0,0 0 1 0 0,0 0 0 0 0,1 0-1 0 0,-1 0 1 0 0,0 1 0 0 0,0-1 0 0 0,0 0-1 0 0,1 1 1 0 0,-1-1 0 0 0,0 0 0 0 0,1 1-1 0 0,-1-1 1 0 0,0 1 0 0 0,1-1 0 0 0,-1 1-1 0 0,0 0 1 0 0,1-1 0 0 0,-1 1-1 0 0,1 0 1 0 0,-1-1 0 0 0,1 1 0 0 0,0 0-1 0 0,-1-1 1 0 0,1 1 0 0 0,0 0 0 0 0,-1 0-1 0 0,1-1 1 0 0,0 1 0 0 0,0 0 0 0 0,0 0-1 0 0,-1 0 1 0 0,1 0 0 0 0,0-1-1 0 0,0 1 1 0 0,0 0 0 0 0,0 0 0 0 0,1 0-1 0 0,-1-1 1 0 0,0 2-95 0 0,2 4 622 0 0,0 1-1 0 0,0-1 0 0 0,0 1 1 0 0,1-1-1 0 0,2 4-621 0 0,0-1 69 0 0,18 47 320 0 0,-2 0 0 0 0,11 51-389 0 0,-28-88-689 0 0,0 1 0 0 0,0 17 689 0 0,-2-16-3722 0 0,5 22 3722 0 0,-5-33-8195 0 0</inkml:trace>
   <inkml:trace contextRef="#ctx0" brushRef="#br0" timeOffset="922.906">1038 490 22319 0 0,'0'0'76'0'0,"-1"0"0"0"0,1 0 0 0 0,-1 0 0 0 0,1 0 0 0 0,-1 0 0 0 0,0 0 0 0 0,1 0 0 0 0,-1 0 0 0 0,1 1 0 0 0,-1-1-1 0 0,1 0 1 0 0,-1 0 0 0 0,1 0 0 0 0,-1 1 0 0 0,1-1 0 0 0,-1 0 0 0 0,1 1 0 0 0,-1-1 0 0 0,1 0 0 0 0,0 1 0 0 0,-1-1 0 0 0,1 0 0 0 0,-1 1 0 0 0,1-1-1 0 0,0 1 1 0 0,0-1 0 0 0,-1 1 0 0 0,1 0-76 0 0,-1 0 65 0 0,1 0-1 0 0,0 1 0 0 0,0-1 1 0 0,0 1-1 0 0,0-1 0 0 0,0 0 1 0 0,0 1-1 0 0,0-1 0 0 0,0 1 1 0 0,0-1-1 0 0,1 0 0 0 0,-1 1-64 0 0,4 7 156 0 0,-1 0 0 0 0,1 0-1 0 0,4 7-155 0 0,-5-10 378 0 0,36 80 295 0 0,-4 1-1 0 0,8 40-672 0 0,-36-112 134 0 0,-6-12-75 0 0,1-1 0 0 0,-1 1 1 0 0,0 0-1 0 0,0-1 0 0 0,0 1 1 0 0,-1 0-1 0 0,1-1 0 0 0,0 2-59 0 0,-1-3 168 0 0,0-1 135 0 0,0 0 59 0 0,0-8 326 0 0,-2-42-526 0 0,-4-11-162 0 0,2 25 42 0 0,2 1-1 0 0,1-1 1 0 0,3-11-42 0 0,-1 36 14 0 0,0-1 81 0 0,0 0-1 0 0,1 0 1 0 0,0 0-1 0 0,3-7-94 0 0,-4 16 13 0 0,-1 1 0 0 0,1-1 1 0 0,0 1-1 0 0,0-1 0 0 0,1 1 0 0 0,-1 0 1 0 0,0-1-1 0 0,1 1 0 0 0,0 0 0 0 0,-1 0 0 0 0,1 0 1 0 0,0 0-1 0 0,0 1 0 0 0,0-1 0 0 0,0 0 1 0 0,0 1-1 0 0,1-1 0 0 0,-1 1 0 0 0,0 0 0 0 0,1 0 1 0 0,-1 0-1 0 0,1 0 0 0 0,0 0-13 0 0,-1 0 3 0 0,-1 1 0 0 0,1 0 0 0 0,0 0 0 0 0,-1 0 0 0 0,1 0 0 0 0,0 0-1 0 0,-1 0 1 0 0,1 0 0 0 0,0 0 0 0 0,-1 1 0 0 0,1-1 0 0 0,0 1 0 0 0,-1-1 0 0 0,1 1 0 0 0,-1-1 0 0 0,1 1 0 0 0,-1 0-1 0 0,2 1-2 0 0,-1 0 13 0 0,1 0 0 0 0,-1 0 0 0 0,1 1 0 0 0,-1-1 0 0 0,0 1 0 0 0,0 0 0 0 0,0-1 0 0 0,-1 1 0 0 0,2 1-13 0 0,2 8 47 0 0,0-1-1 0 0,-1 1 0 0 0,0 0 1 0 0,1 7-47 0 0,2 21 38 0 0,-1 1 0 0 0,-2-1 0 0 0,-1 26-38 0 0,-2-42 3 0 0,0-9-597 0 0,1-1 1 0 0,0 1-1 0 0,3 9 594 0 0,-4-21-168 0 0,-1 1 1 0 0,1 0 0 0 0,1-1-1 0 0,-1 0 1 0 0,0 1 0 0 0,1-1-1 0 0,0 0 1 0 0,0 1-1 0 0,0-1 1 0 0,0 0 0 0 0,0 0-1 0 0,0-1 1 0 0,1 1 0 0 0,0 0-1 0 0,-1-1 1 0 0,1 1 0 0 0,1-1 167 0 0,3 0-2152 0 0,1-3-22 0 0</inkml:trace>
-  <inkml:trace contextRef="#ctx0" brushRef="#br0" timeOffset="1449.151">1670 579 21679 0 0,'-1'-5'318'0'0,"-1"-1"0"0"0,0 1-1 0 0,0-1 1 0 0,0 1 0 0 0,-1 0-1 0 0,0 0 1 0 0,0 0 0 0 0,0 0 0 0 0,-1 0-1 0 0,1 0-317 0 0,0 2 258 0 0,0 0 0 0 0,0-1-1 0 0,-1 1 1 0 0,1 0 0 0 0,-1 0 0 0 0,1 1 0 0 0,-1-1-1 0 0,0 1 1 0 0,0 0 0 0 0,0 0 0 0 0,0 0-1 0 0,0 1 1 0 0,-2-1-258 0 0,5 1 52 0 0,-1 1 0 0 0,0 0 1 0 0,0 0-1 0 0,1 0 0 0 0,-1 0 0 0 0,0 0 0 0 0,0 0 0 0 0,1 0 0 0 0,-1 1 1 0 0,0-1-1 0 0,0 0 0 0 0,1 1 0 0 0,-1 0 0 0 0,0-1 0 0 0,1 1 0 0 0,-1 0 1 0 0,0 0-53 0 0,-1 1 22 0 0,1 0 0 0 0,-1 0 1 0 0,0 1-1 0 0,0-1 0 0 0,1 1 1 0 0,0 0-1 0 0,-1-1 0 0 0,0 3-22 0 0,-2 3 55 0 0,0 0-1 0 0,1 1 1 0 0,0 0-1 0 0,0-1 1 0 0,1 1-1 0 0,0 2-54 0 0,-1 4 169 0 0,0 0-1 0 0,1 0 1 0 0,1 1 0 0 0,0-1-1 0 0,1 1 1 0 0,1-1-1 0 0,1 1 1 0 0,1 14-169 0 0,-1-24 31 0 0,0-1 0 0 0,1 1-1 0 0,-1 0 1 0 0,1-1 0 0 0,0 1 0 0 0,0-1 0 0 0,1 0 0 0 0,0 1 0 0 0,0-1-1 0 0,0 0 1 0 0,0-1 0 0 0,1 1 0 0 0,0-1 0 0 0,0 1 0 0 0,0-1-1 0 0,0 0 1 0 0,1-1 0 0 0,-1 1 0 0 0,1-1 0 0 0,0 0 0 0 0,0 0 0 0 0,0 0-1 0 0,1-1 1 0 0,-1 0 0 0 0,1 1-31 0 0,4 0 5 0 0,0-1 0 0 0,-1 0 0 0 0,1 0 0 0 0,0-1 0 0 0,0 0 0 0 0,0-1-1 0 0,0 0 1 0 0,0 0 0 0 0,1-1 0 0 0,-2 0 0 0 0,1-1 0 0 0,0 0 0 0 0,0-1 0 0 0,-1 0 0 0 0,1-1 0 0 0,-1 1 0 0 0,0-2 0 0 0,0 1 0 0 0,0-2-1 0 0,-1 1 1 0 0,1-1 0 0 0,-1 0 0 0 0,-1 0 0 0 0,1-1 0 0 0,-1 0 0 0 0,0-1-5 0 0,3-3-22 0 0,-1-1 0 0 0,-1 0 0 0 0,0 0 0 0 0,0 0 0 0 0,-1-1 0 0 0,-1 0 0 0 0,0 0 0 0 0,0-1 0 0 0,-2 0 0 0 0,0 0 0 0 0,0 0 0 0 0,1-12 22 0 0,-5 18-37 0 0,1 0 0 0 0,-1-1 0 0 0,-1 1 0 0 0,0-2 37 0 0,1 7-10 0 0,0 0-1 0 0,-1 0 1 0 0,0 0 0 0 0,0 0-1 0 0,0 0 1 0 0,0 0 0 0 0,0 0-1 0 0,0 0 1 0 0,-1 0 0 0 0,1 0-1 0 0,-1 1 1 0 0,0-2 10 0 0,1 4 0 0 0,0-1 0 0 0,1 0 0 0 0,-1 1 0 0 0,0-1 0 0 0,1 1 0 0 0,-1-1 0 0 0,0 1 0 0 0,0-1 0 0 0,1 1 0 0 0,-1 0 0 0 0,0-1 0 0 0,0 1 0 0 0,0 0 0 0 0,0 0 0 0 0,0-1 0 0 0,1 1 0 0 0,-1 0 0 0 0,0 0 0 0 0,0 0 0 0 0,0 0 0 0 0,0 0 0 0 0,0 0 0 0 0,-1 1 0 0 0,0-1 0 0 0,0 1 0 0 0,0 0 0 0 0,0-1 0 0 0,0 1 0 0 0,0 0 0 0 0,1 0 0 0 0,-1 0 0 0 0,0 1 0 0 0,0-1 0 0 0,-2 3 0 0 0,0-1 0 0 0,0 1 0 0 0,0 0 0 0 0,1 0 0 0 0,-1 1 0 0 0,1-1 0 0 0,-1 3 0 0 0,-1 2 41 0 0,1 1 0 0 0,0 0 0 0 0,0 0-1 0 0,1 0 1 0 0,1 1 0 0 0,0-1 0 0 0,0 1 0 0 0,1 0 0 0 0,0-1 0 0 0,1 1-1 0 0,0 0 1 0 0,1-1 0 0 0,0 1 0 0 0,2 8-41 0 0,-2-12 32 0 0,1 1 0 0 0,0 0-1 0 0,1 0 1 0 0,0-1 0 0 0,0 1 0 0 0,0-1 0 0 0,1 0-1 0 0,0 0 1 0 0,1 0 0 0 0,-1-1 0 0 0,1 1-1 0 0,1-1 1 0 0,-1 0 0 0 0,1-1 0 0 0,0 1 0 0 0,0-1-1 0 0,1 0 1 0 0,-1-1 0 0 0,7 4-32 0 0,-3-4 26 0 0,0 1 1 0 0,1-1-1 0 0,-1-1 1 0 0,1 0-1 0 0,0-1 1 0 0,0 1-1 0 0,0-2 0 0 0,0 0 1 0 0,1 0-1 0 0,-1-1 1 0 0,0-1-1 0 0,10-1-26 0 0,-13 1-243 0 0,0 0-1 0 0,0-1 1 0 0,0 0-1 0 0,0-1 1 0 0,-1 0-1 0 0,1 0 1 0 0,-1-1 0 0 0,1 1-1 0 0,-1-2 1 0 0,0 1-1 0 0,-1-1 1 0 0,1 0 0 0 0,-1 0-1 0 0,0-1 1 0 0,0 0-1 0 0,-1 0 1 0 0,5-6 243 0 0,-1-1-1403 0 0</inkml:trace>
+  <inkml:trace contextRef="#ctx0" brushRef="#br0" timeOffset="1449.15">1670 579 21679 0 0,'-1'-5'318'0'0,"-1"-1"0"0"0,0 1-1 0 0,0-1 1 0 0,0 1 0 0 0,-1 0-1 0 0,0 0 1 0 0,0 0 0 0 0,0 0 0 0 0,-1 0-1 0 0,1 0-317 0 0,0 2 258 0 0,0 0 0 0 0,0-1-1 0 0,-1 1 1 0 0,1 0 0 0 0,-1 0 0 0 0,1 1 0 0 0,-1-1-1 0 0,0 1 1 0 0,0 0 0 0 0,0 0 0 0 0,0 0-1 0 0,0 1 1 0 0,-2-1-258 0 0,5 1 52 0 0,-1 1 0 0 0,0 0 1 0 0,0 0-1 0 0,1 0 0 0 0,-1 0 0 0 0,0 0 0 0 0,0 0 0 0 0,1 0 0 0 0,-1 1 1 0 0,0-1-1 0 0,0 0 0 0 0,1 1 0 0 0,-1 0 0 0 0,0-1 0 0 0,1 1 0 0 0,-1 0 1 0 0,0 0-53 0 0,-1 1 22 0 0,1 0 0 0 0,-1 0 1 0 0,0 1-1 0 0,0-1 0 0 0,1 1 1 0 0,0 0-1 0 0,-1-1 0 0 0,0 3-22 0 0,-2 3 55 0 0,0 0-1 0 0,1 1 1 0 0,0 0-1 0 0,0-1 1 0 0,1 1-1 0 0,0 2-54 0 0,-1 4 169 0 0,0 0-1 0 0,1 0 1 0 0,1 1 0 0 0,0-1-1 0 0,1 1 1 0 0,1-1-1 0 0,1 1 1 0 0,1 14-169 0 0,-1-24 31 0 0,0-1 0 0 0,1 1-1 0 0,-1 0 1 0 0,1-1 0 0 0,0 1 0 0 0,0-1 0 0 0,1 0 0 0 0,0 1 0 0 0,0-1-1 0 0,0 0 1 0 0,0-1 0 0 0,1 1 0 0 0,0-1 0 0 0,0 1 0 0 0,0-1-1 0 0,0 0 1 0 0,1-1 0 0 0,-1 1 0 0 0,1-1 0 0 0,0 0 0 0 0,0 0 0 0 0,0 0-1 0 0,1-1 1 0 0,-1 0 0 0 0,1 1-31 0 0,4 0 5 0 0,0-1 0 0 0,-1 0 0 0 0,1 0 0 0 0,0-1 0 0 0,0 0 0 0 0,0-1-1 0 0,0 0 1 0 0,0 0 0 0 0,1-1 0 0 0,-2 0 0 0 0,1-1 0 0 0,0 0 0 0 0,0-1 0 0 0,-1 0 0 0 0,1-1 0 0 0,-1 1 0 0 0,0-2 0 0 0,0 1 0 0 0,0-2-1 0 0,-1 1 1 0 0,1-1 0 0 0,-1 0 0 0 0,-1 0 0 0 0,1-1 0 0 0,-1 0 0 0 0,0-1-5 0 0,3-3-22 0 0,-1-1 0 0 0,-1 0 0 0 0,0 0 0 0 0,0 0 0 0 0,-1-1 0 0 0,-1 0 0 0 0,0 0 0 0 0,0-1 0 0 0,-2 0 0 0 0,0 0 0 0 0,0 0 0 0 0,1-12 22 0 0,-5 18-37 0 0,1 0 0 0 0,-1-1 0 0 0,-1 1 0 0 0,0-2 37 0 0,1 7-10 0 0,0 0-1 0 0,-1 0 1 0 0,0 0 0 0 0,0 0-1 0 0,0 0 1 0 0,0 0 0 0 0,0 0-1 0 0,0 0 1 0 0,-1 0 0 0 0,1 0-1 0 0,-1 1 1 0 0,0-2 10 0 0,1 4 0 0 0,0-1 0 0 0,1 0 0 0 0,-1 1 0 0 0,0-1 0 0 0,1 1 0 0 0,-1-1 0 0 0,0 1 0 0 0,0-1 0 0 0,1 1 0 0 0,-1 0 0 0 0,0-1 0 0 0,0 1 0 0 0,0 0 0 0 0,0 0 0 0 0,0-1 0 0 0,1 1 0 0 0,-1 0 0 0 0,0 0 0 0 0,0 0 0 0 0,0 0 0 0 0,0 0 0 0 0,0 0 0 0 0,-1 1 0 0 0,0-1 0 0 0,0 1 0 0 0,0 0 0 0 0,0-1 0 0 0,0 1 0 0 0,0 0 0 0 0,1 0 0 0 0,-1 0 0 0 0,0 1 0 0 0,0-1 0 0 0,-2 3 0 0 0,0-1 0 0 0,0 1 0 0 0,0 0 0 0 0,1 0 0 0 0,-1 1 0 0 0,1-1 0 0 0,-1 3 0 0 0,-1 2 41 0 0,1 1 0 0 0,0 0 0 0 0,0 0-1 0 0,1 0 1 0 0,1 1 0 0 0,0-1 0 0 0,0 1 0 0 0,1 0 0 0 0,0-1 0 0 0,1 1-1 0 0,0 0 1 0 0,1-1 0 0 0,0 1 0 0 0,2 8-41 0 0,-2-12 32 0 0,1 1 0 0 0,0 0-1 0 0,1 0 1 0 0,0-1 0 0 0,0 1 0 0 0,0-1 0 0 0,1 0-1 0 0,0 0 1 0 0,1 0 0 0 0,-1-1 0 0 0,1 1-1 0 0,1-1 1 0 0,-1 0 0 0 0,1-1 0 0 0,0 1 0 0 0,0-1-1 0 0,1 0 1 0 0,-1-1 0 0 0,7 4-32 0 0,-3-4 26 0 0,0 1 1 0 0,1-1-1 0 0,-1-1 1 0 0,1 0-1 0 0,0-1 1 0 0,0 1-1 0 0,0-2 0 0 0,0 0 1 0 0,1 0-1 0 0,-1-1 1 0 0,0-1-1 0 0,10-1-26 0 0,-13 1-243 0 0,0 0-1 0 0,0-1 1 0 0,0 0-1 0 0,0-1 1 0 0,-1 0-1 0 0,1 0 1 0 0,-1-1 0 0 0,1 1-1 0 0,-1-2 1 0 0,0 1-1 0 0,-1-1 1 0 0,1 0 0 0 0,-1 0-1 0 0,0-1 1 0 0,0 0-1 0 0,-1 0 1 0 0,5-6 243 0 0,-1-1-1403 0 0</inkml:trace>
   <inkml:trace contextRef="#ctx0" brushRef="#br0" timeOffset="1832.675">857 279 24767 0 0,'0'0'544'0'0,"-4"0"120"0"0,-1-4 16 0 0,-1 3 8 0 0,6 1-552 0 0,0 0-136 0 0,-4 0 0 0 0,4 0 0 0 0,0 0 104 0 0,0 0-8 0 0,0 0 0 0 0,0 0 0 0 0,0 0-288 0 0,0 0-56 0 0,6 5-8 0 0</inkml:trace>
 </inkml:ink>
 </file>
@@ -1163,7 +1163,7 @@
     </inkml:brush>
   </inkml:definitions>
   <inkml:trace contextRef="#ctx0" brushRef="#br0">288 217 16583 0 0,'-2'-2'816'0'0,"-2"-5"370"0"0,3 6-242 0 0,1 1 310 0 0,0 0 68 0 0,-5 17 1498 0 0,3 1-2123 0 0,1 0 1 0 0,1-1 0 0 0,1 16-698 0 0,0-4 333 0 0,1 42 165 0 0,0 126-19 0 0,-2-163-409 0 0,1-21 16 0 0,-1-1 0 0 0,-1 0 0 0 0,0 0 0 0 0,0 0 0 0 0,-2 0 0 0 0,1 0 0 0 0,-2 2-86 0 0,4-13 22 0 0,0 0-1 0 0,-1 0 0 0 0,1 0 0 0 0,-1 0 1 0 0,1 0-1 0 0,-1 0 0 0 0,1 0 0 0 0,-1 0 1 0 0,1 0-1 0 0,-1-1 0 0 0,0 1 1 0 0,0 0-1 0 0,1 0 0 0 0,-1-1 0 0 0,0 1 1 0 0,0 0-1 0 0,0-1 0 0 0,0 1 0 0 0,0-1 1 0 0,0 1-1 0 0,0-1 0 0 0,0 1 0 0 0,0-1 1 0 0,0 0-1 0 0,0 1-21 0 0,-1-1 27 0 0,0-1 1 0 0,0 1-1 0 0,0 0 0 0 0,0 0 1 0 0,1-1-1 0 0,-1 1 0 0 0,0-1 1 0 0,0 1-1 0 0,1-1 0 0 0,-1 0 1 0 0,0 0-1 0 0,1 0 0 0 0,-2-1-27 0 0,-5-3 67 0 0,1-1 0 0 0,0 0 0 0 0,1 0 0 0 0,-1 0 0 0 0,-2-6-67 0 0,-13-16-55 0 0,1-2 0 0 0,1 0 1 0 0,2-1-1 0 0,1-1 0 0 0,2-1 1 0 0,1 0-1 0 0,2-1 0 0 0,1 0 1 0 0,1-1-1 0 0,2 0 0 0 0,-2-25 55 0 0,10 57 36 0 0,0 0 0 0 0,-1 0 0 0 0,1 0 0 0 0,0 0 0 0 0,1-1-1 0 0,-1 1 1 0 0,1 0 0 0 0,-1 0 0 0 0,1 0 0 0 0,0 0 0 0 0,0 0 0 0 0,0 0-1 0 0,0 1 1 0 0,1-1 0 0 0,-1 0 0 0 0,1 1 0 0 0,0-1 0 0 0,0 0-1 0 0,0 1 1 0 0,0 0 0 0 0,0 0 0 0 0,0-1 0 0 0,0 1 0 0 0,1 0-1 0 0,-1 1 1 0 0,1-1 0 0 0,1-1-36 0 0,9-3 130 0 0,0 0 0 0 0,0 1 0 0 0,0 0 0 0 0,0 1 0 0 0,11-1-130 0 0,9-4 146 0 0,138-40 230 0 0,49-16 63 0 0,-201 58-503 0 0,46-14-4056 0 0,65-14 4120 0 0,-118 33-2016 0 0</inkml:trace>
-  <inkml:trace contextRef="#ctx0" brushRef="#br0" timeOffset="720.831">608 456 19439 0 0,'0'0'892'0'0,"-3"-10"320"0"0,2 7-1084 0 0,0 2 532 0 0,1 1 211 0 0,0 0 32 0 0,0 0-23 0 0,0 0-128 0 0,0 14 1219 0 0,7 117-1485 0 0,0-27-406 0 0,-5-58-1228 0 0,3 1 1148 0 0,4 14-5409 0 0,-6-52 3699 0 0</inkml:trace>
+  <inkml:trace contextRef="#ctx0" brushRef="#br0" timeOffset="720.83">608 456 19439 0 0,'0'0'892'0'0,"-3"-10"320"0"0,2 7-1084 0 0,0 2 532 0 0,1 1 211 0 0,0 0 32 0 0,0 0-23 0 0,0 0-128 0 0,0 14 1219 0 0,7 117-1485 0 0,0-27-406 0 0,-5-58-1228 0 0,3 1 1148 0 0,4 14-5409 0 0,-6-52 3699 0 0</inkml:trace>
   <inkml:trace contextRef="#ctx0" brushRef="#br0" timeOffset="1094.587">800 564 19895 0 0,'1'-3'219'0'0,"1"0"-1"0"0,-1-1 1 0 0,1 1-1 0 0,-1 0 0 0 0,0 0 1 0 0,0-1-1 0 0,-1 1 1 0 0,1-1-1 0 0,-1 1 0 0 0,1-2-218 0 0,-1 5 76 0 0,0-1 0 0 0,-1 1 0 0 0,1-1-1 0 0,0 1 1 0 0,0-1 0 0 0,0 1 0 0 0,0 0-1 0 0,-1-1 1 0 0,1 1 0 0 0,0-1 0 0 0,0 1 0 0 0,-1 0-1 0 0,1-1 1 0 0,0 1 0 0 0,-1-1 0 0 0,1 1-1 0 0,0 0 1 0 0,-1 0 0 0 0,1-1 0 0 0,-1 1-1 0 0,1 0 1 0 0,0 0 0 0 0,-1-1 0 0 0,1 1 0 0 0,-1 0-1 0 0,1 0 1 0 0,-1 0 0 0 0,1 0 0 0 0,-1 0-1 0 0,1 0 1 0 0,-1 0 0 0 0,1 0 0 0 0,-1 0-1 0 0,1 0 1 0 0,-1 0-76 0 0,-2 0 178 0 0,0 1 0 0 0,0 0 0 0 0,0 0 0 0 0,1 0 0 0 0,-1 0 0 0 0,0 1 0 0 0,0-1-1 0 0,1 1 1 0 0,-1 0 0 0 0,1 0 0 0 0,0 0 0 0 0,-1 0 0 0 0,1 0 0 0 0,0 0 0 0 0,0 0-178 0 0,-6 9 305 0 0,0-1 0 0 0,-6 11-305 0 0,6-10 114 0 0,-24 36-255 0 0,-31 35 141 0 0,61-79 75 0 0,0-1 1 0 0,-1 1-1 0 0,1-1 0 0 0,-1 1 0 0 0,0-1 0 0 0,1 0 1 0 0,-1 0-1 0 0,0 0 0 0 0,-1-1 0 0 0,1 1 0 0 0,0-1 1 0 0,0 1-1 0 0,-1-1 0 0 0,1 0 0 0 0,-3 0-75 0 0,40 1 76 0 0,1 2 1 0 0,-1 1-1 0 0,0 2 0 0 0,0 1 0 0 0,4 4-76 0 0,38 8-1616 0 0,-61-17-149 0 0</inkml:trace>
 </inkml:ink>
 </file>
@@ -1262,7 +1262,7 @@
   </inkml:definitions>
   <inkml:trace contextRef="#ctx0" brushRef="#br0">94 441 14744 0 0,'-2'0'205'0'0,"0"-1"1"0"0,0 1-1 0 0,0 0 1 0 0,0 0-1 0 0,0 1 1 0 0,0-1 0 0 0,0 0-1 0 0,0 1 1 0 0,0-1-1 0 0,0 1 1 0 0,0 0 0 0 0,0-1-1 0 0,0 1 1 0 0,1 0-1 0 0,-1 0 1 0 0,0 0-1 0 0,1 0 1 0 0,-1 1 0 0 0,1-1-1 0 0,-1 0 1 0 0,1 1-1 0 0,-1-1 1 0 0,1 1 0 0 0,0-1-1 0 0,0 1 1 0 0,-1 1-206 0 0,-3 5 179 0 0,1-1 0 0 0,0 1 0 0 0,0 0 0 0 0,0 1 0 0 0,1-1 0 0 0,1 1 0 0 0,-1-1-1 0 0,1 1 1 0 0,1 0 0 0 0,-1 0 0 0 0,2 0 0 0 0,-1 7-179 0 0,1 7 88 0 0,1 1 0 0 0,1 0 0 0 0,1-1-1 0 0,3 6-87 0 0,-5-20 19 0 0,1-1 0 0 0,1 0 0 0 0,-1 1-1 0 0,2-1 1 0 0,-1 0 0 0 0,1-1 0 0 0,0 1-1 0 0,0-1 1 0 0,2 1-19 0 0,-4-4 24 0 0,1-1 0 0 0,0 1 0 0 0,0-1 0 0 0,1 0 0 0 0,-1 0 0 0 0,1 0 0 0 0,-1-1 0 0 0,1 1 0 0 0,0-1 0 0 0,0 0 0 0 0,0 0-1 0 0,0 0 1 0 0,0-1 0 0 0,1 1 0 0 0,-1-1 0 0 0,0 0 0 0 0,5 0-24 0 0,0 0 63 0 0,-1-1 0 0 0,1 0-1 0 0,0-1 1 0 0,-1 0 0 0 0,1 0 0 0 0,-1-1-1 0 0,0 0 1 0 0,1 0 0 0 0,-1-1-1 0 0,0 0 1 0 0,0-1 0 0 0,-1 0-1 0 0,1 0 1 0 0,-1 0 0 0 0,0-1 0 0 0,0 0-1 0 0,0-1 1 0 0,0 0 0 0 0,-1 0-1 0 0,0 0 1 0 0,4-6-63 0 0,-5 6 22 0 0,0 0 0 0 0,-1-1 0 0 0,1 1 0 0 0,-1-1 1 0 0,0 0-1 0 0,-1 0 0 0 0,0-1 0 0 0,0 1 0 0 0,0-1 0 0 0,-1 0 0 0 0,-1 1 0 0 0,1-1 0 0 0,-1 0 1 0 0,0 0-1 0 0,-1 0 0 0 0,0 0 0 0 0,0 0 0 0 0,-1 0 0 0 0,1 0 0 0 0,-2 0 0 0 0,1 0 0 0 0,-1 0 1 0 0,-2-4-23 0 0,-2-2-9 0 0,-1 1 1 0 0,0 0-1 0 0,0 1 1 0 0,-1-1-1 0 0,-1 1 0 0 0,0 1 1 0 0,-5-6 8 0 0,6 9-76 0 0,0 0 1 0 0,0 1-1 0 0,-1 0 1 0 0,0 0-1 0 0,0 1 1 0 0,-1 0-1 0 0,0 1 1 0 0,0 0-1 0 0,0 1 1 0 0,-2-1 75 0 0,7 3-45 0 0,0 1 0 0 0,0-1 0 0 0,0 1 0 0 0,0 0 1 0 0,-1 1-1 0 0,1 0 0 0 0,0-1 0 0 0,0 1 0 0 0,0 1 0 0 0,0-1 0 0 0,-1 1 1 0 0,1 0-1 0 0,0 0 0 0 0,0 1 0 0 0,0-1 0 0 0,1 1 0 0 0,-1 0 0 0 0,0 0 1 0 0,1 1-1 0 0,-1-1 0 0 0,1 1 45 0 0,-1 1-21 0 0,0 0 0 0 0,1 0 1 0 0,-1 1-1 0 0,1-1 0 0 0,0 1 0 0 0,1 0 1 0 0,-1 0-1 0 0,1 0 0 0 0,0 1 1 0 0,0-1-1 0 0,1 1 0 0 0,-1-1 0 0 0,1 1 1 0 0,1 0-1 0 0,-1 0 0 0 0,1 0 0 0 0,-1 3 21 0 0,1-1-216 0 0,1 0 0 0 0,0 0 0 0 0,0 0 0 0 0,0 1 0 0 0,1-1 0 0 0,0 0 0 0 0,1 0 0 0 0,0 0 0 0 0,0 0-1 0 0,1 0 1 0 0,0-1 0 0 0,0 1 0 0 0,1-1 0 0 0,0 1 216 0 0,8 11-1799 0 0</inkml:trace>
   <inkml:trace contextRef="#ctx0" brushRef="#br0" timeOffset="372.895">499 390 20271 0 0,'0'0'463'0'0,"0"0"61"0"0,0 0 29 0 0,0 0-58 0 0,0 6-306 0 0,1 60 606 0 0,2-1 0 0 0,3-1-1 0 0,6 14-794 0 0,-8-53 22 0 0,-3-12 36 0 0,2-1 0 0 0,-1 1 0 0 0,2 0 0 0 0,-1-1 0 0 0,5 10-58 0 0,-18-48 358 0 0,0 0 1 0 0,1 0-1 0 0,2 0 0 0 0,1-1 0 0 0,0 0 1 0 0,3-1-1 0 0,0 1 0 0 0,1-1 0 0 0,3-27-358 0 0,-1 54 0 0 0,0-13-13 0 0,1 1 1 0 0,1 0-1 0 0,0-1 0 0 0,1 1 1 0 0,1-4 12 0 0,-3 13-4 0 0,0 1 0 0 0,1-1 0 0 0,0 0 0 0 0,0 1 0 0 0,0 0 0 0 0,0-1 0 0 0,0 1 0 0 0,1 0 1 0 0,-1 0-1 0 0,1 0 0 0 0,0 0 0 0 0,0 1 0 0 0,0-1 0 0 0,0 1 0 0 0,0 0 0 0 0,1 0 0 0 0,-1 0 1 0 0,1 0-1 0 0,-1 0 0 0 0,2 0 4 0 0,-1 1-15 0 0,-1 0 1 0 0,1 0 0 0 0,-1 1-1 0 0,1-1 1 0 0,0 1-1 0 0,-1 0 1 0 0,1 0-1 0 0,0 0 1 0 0,-1 0 0 0 0,1 1-1 0 0,0-1 1 0 0,-1 1-1 0 0,1 0 1 0 0,-1 0-1 0 0,1 0 1 0 0,-1 1 0 0 0,1-1-1 0 0,-1 1 1 0 0,0 0-1 0 0,3 1 15 0 0,6 6-1237 0 0,-1 0-1 0 0,1 1 1 0 0,-2 0-1 0 0,7 7 1238 0 0,-13-13-681 0 0,7 7-1402 0 0</inkml:trace>
-  <inkml:trace contextRef="#ctx0" brushRef="#br0" timeOffset="1152.172">903 608 14600 0 0,'0'0'330'0'0,"0"-16"925"0"0,1 6-688 0 0,-1 0 0 0 0,-1 0 0 0 0,0 0 0 0 0,0 0 0 0 0,-1 1 0 0 0,0-1 0 0 0,-1 0 1 0 0,0 1-1 0 0,0 0 0 0 0,-1 0 0 0 0,0 0 0 0 0,-4-5-567 0 0,5 9 107 0 0,-1 1-1 0 0,0 0 1 0 0,0 0 0 0 0,0 0-1 0 0,-1 1 1 0 0,0 0 0 0 0,1 0-1 0 0,-1 0 1 0 0,0 0 0 0 0,0 1-1 0 0,-2-1-106 0 0,5 2 16 0 0,0 1-1 0 0,0-1 0 0 0,0 0 1 0 0,0 1-1 0 0,-1 0 1 0 0,1 0-1 0 0,0-1 0 0 0,-1 1 1 0 0,1 1-1 0 0,0-1 1 0 0,0 0-1 0 0,0 0 0 0 0,-1 1 1 0 0,1-1-1 0 0,0 1 0 0 0,-1 0-15 0 0,-1 1-5 0 0,1 0-1 0 0,0 0 0 0 0,-1 0 1 0 0,1 0-1 0 0,0 0 0 0 0,0 1 1 0 0,0 0-1 0 0,0-1 0 0 0,0 2 6 0 0,-3 4-63 0 0,0-1-1 0 0,1 1 1 0 0,0 0-1 0 0,0 0 1 0 0,1 0-1 0 0,0 1 1 0 0,-1 6 63 0 0,0 3-2 0 0,1 0 0 0 0,0 0 0 0 0,2 0 0 0 0,0 0 1 0 0,1 0-1 0 0,1 0 0 0 0,0 1 0 0 0,2-1 0 0 0,0 0 0 0 0,1 2 2 0 0,-2-15 0 0 0,1 1 0 0 0,-1-1 0 0 0,1 0 0 0 0,0 0 0 0 0,0-1 0 0 0,0 1 0 0 0,1 0 0 0 0,1 2 0 0 0,-3-5 0 0 0,0 0 0 0 0,1-1 0 0 0,-1 1 0 0 0,1 0 0 0 0,-1-1 0 0 0,1 0 0 0 0,-1 1 0 0 0,1-1 0 0 0,0 0 0 0 0,0 1 0 0 0,0-1 0 0 0,-1 0 0 0 0,1 0 0 0 0,0-1 0 0 0,0 1 0 0 0,1 0 0 0 0,-1-1 0 0 0,0 1 0 0 0,0-1 0 0 0,0 0 0 0 0,2 1 0 0 0,1-2 8 0 0,0 0 0 0 0,0 0 0 0 0,0 0 0 0 0,0 0 0 0 0,0-1 0 0 0,0 0 0 0 0,0 0 0 0 0,0 0 0 0 0,0-1 0 0 0,-1 0 0 0 0,1 0 0 0 0,-1 0 0 0 0,0 0-1 0 0,0 0 1 0 0,0-1 0 0 0,-1 0 0 0 0,1 0 0 0 0,2-4-8 0 0,4-4 38 0 0,-2 0 1 0 0,0-1-1 0 0,0 0 0 0 0,-1 0 0 0 0,-1-1 0 0 0,1-3-38 0 0,1-6 129 0 0,-2 1 0 0 0,0-1 0 0 0,-2 0 0 0 0,0 0 0 0 0,-2 0 0 0 0,0-20-129 0 0,-3-32 121 0 0,-7-36-121 0 0,-1-47-11 0 0,10 40 923 0 0,-1 116-630 0 0,-6 23-102 0 0,2 2-178 0 0,1 1 0 0 0,1 0 0 0 0,1 0 0 0 0,1 0 0 0 0,2 13-2 0 0,1 20 0 0 0,3 0 0 0 0,3 0 0 0 0,1-1 0 0 0,13 34 0 0 0,-13-62 54 0 0,2 1-1 0 0,0-2 0 0 0,2 1 1 0 0,17 24-54 0 0,-28-46 27 0 0,1 0 0 0 0,0-1 0 0 0,0 1 0 0 0,0-1 0 0 0,1 0 0 0 0,0 0 0 0 0,1 1-27 0 0,-5-5-1 0 0,0 0-1 0 0,1 0 1 0 0,-1-1 0 0 0,1 1 0 0 0,0 0 0 0 0,-1 0 0 0 0,1-1 0 0 0,-1 1 0 0 0,1-1 0 0 0,0 1 0 0 0,-1-1 0 0 0,1 0 0 0 0,0 0 0 0 0,0 0 0 0 0,-1 0 0 0 0,1 0-1 0 0,0 0 1 0 0,-1 0 0 0 0,1 0 0 0 0,0-1 0 0 0,0 1 0 0 0,-1 0 0 0 0,1-1 0 0 0,-1 0 0 0 0,1 1 0 0 0,0-1 0 0 0,-1 0 0 0 0,1 0 0 0 0,-1 0 0 0 0,0 0 0 0 0,1 0 1 0 0,7-6-153 0 0,-1 0 0 0 0,0-1 0 0 0,0 0 0 0 0,-1-1 0 0 0,1 1 0 0 0,-2-1 0 0 0,0 0 0 0 0,5-9 153 0 0,0-3-139 0 0,-1 0-1 0 0,-1-1 1 0 0,4-15 139 0 0,-8 23 6 0 0,-1-1 0 0 0,0 0 0 0 0,-1 0 0 0 0,-1 0 0 0 0,0 0 0 0 0,-1-1 0 0 0,-1 1 0 0 0,-1 0 0 0 0,0-3-6 0 0,0 14 44 0 0,1 0 1 0 0,-2 0 0 0 0,1 0 0 0 0,0 1-1 0 0,-1-1 1 0 0,1 0 0 0 0,-1 1-1 0 0,0 0 1 0 0,0-1 0 0 0,0 1 0 0 0,-1 0-1 0 0,1 0 1 0 0,-1 0 0 0 0,-1-1-45 0 0,3 3 4 0 0,-1 0 0 0 0,1 0 0 0 0,0 0-1 0 0,0 0 1 0 0,-1 0 0 0 0,1 0 0 0 0,0 1 0 0 0,-1-1 0 0 0,1 0-1 0 0,-1 1 1 0 0,1-1 0 0 0,-1 1 0 0 0,1 0 0 0 0,-1-1 0 0 0,1 1 0 0 0,-1 0-1 0 0,0 0 1 0 0,1 0 0 0 0,-1 0 0 0 0,1 0 0 0 0,-1 0 0 0 0,1 1 0 0 0,-1-1-1 0 0,1 0 1 0 0,-1 1 0 0 0,1-1 0 0 0,-1 1 0 0 0,1 0 0 0 0,-1-1 0 0 0,1 1-1 0 0,0 0 1 0 0,0 0 0 0 0,-1 0 0 0 0,1 0 0 0 0,-1 1-4 0 0,-2 2-37 0 0,0 1 1 0 0,0 0-1 0 0,1 0 1 0 0,0 0-1 0 0,-1 0 1 0 0,2 0-1 0 0,-1 1 1 0 0,1-1 0 0 0,0 1-1 0 0,0-1 1 0 0,-1 6 36 0 0,0 5-45 0 0,0 0 1 0 0,0 0-1 0 0,1 13 45 0 0,2-10-15 0 0,0 1 0 0 0,1 0 0 0 0,1-1-1 0 0,1 1 1 0 0,1 3 15 0 0,-2-15-4 0 0,0 0-1 0 0,0 0 1 0 0,1-1-1 0 0,0 1 1 0 0,0 0-1 0 0,1-1 1 0 0,0 0-1 0 0,0 0 1 0 0,1 0-1 0 0,0-1 1 0 0,0 1-1 0 0,0-1 1 0 0,6 4 4 0 0,-8-7-40 0 0,0-1-1 0 0,0 0 1 0 0,0 1 0 0 0,1-1 0 0 0,-1-1 0 0 0,1 1 0 0 0,-1 0 0 0 0,1-1 0 0 0,0 0 0 0 0,-1 0 0 0 0,1 0 0 0 0,0 0 0 0 0,0-1 0 0 0,0 1 0 0 0,0-1 0 0 0,-1 0 0 0 0,1 0 0 0 0,0 0 0 0 0,0-1 0 0 0,0 1 0 0 0,0-1 0 0 0,-1 0 0 0 0,1 0 0 0 0,0-1 0 0 0,-1 1 0 0 0,1-1-1 0 0,0 1 1 0 0,-1-1 0 0 0,0 0 0 0 0,0 0 0 0 0,1-1 0 0 0,-1 1 40 0 0,14-11-1160 0 0</inkml:trace>
+  <inkml:trace contextRef="#ctx0" brushRef="#br0" timeOffset="1152.171">903 608 14600 0 0,'0'0'330'0'0,"0"-16"925"0"0,1 6-688 0 0,-1 0 0 0 0,-1 0 0 0 0,0 0 0 0 0,0 0 0 0 0,-1 1 0 0 0,0-1 0 0 0,-1 0 1 0 0,0 1-1 0 0,0 0 0 0 0,-1 0 0 0 0,0 0 0 0 0,-4-5-567 0 0,5 9 107 0 0,-1 1-1 0 0,0 0 1 0 0,0 0 0 0 0,0 0-1 0 0,-1 1 1 0 0,0 0 0 0 0,1 0-1 0 0,-1 0 1 0 0,0 0 0 0 0,0 1-1 0 0,-2-1-106 0 0,5 2 16 0 0,0 1-1 0 0,0-1 0 0 0,0 0 1 0 0,0 1-1 0 0,-1 0 1 0 0,1 0-1 0 0,0-1 0 0 0,-1 1 1 0 0,1 1-1 0 0,0-1 1 0 0,0 0-1 0 0,0 0 0 0 0,-1 1 1 0 0,1-1-1 0 0,0 1 0 0 0,-1 0-15 0 0,-1 1-5 0 0,1 0-1 0 0,0 0 0 0 0,-1 0 1 0 0,1 0-1 0 0,0 0 0 0 0,0 1 1 0 0,0 0-1 0 0,0-1 0 0 0,0 2 6 0 0,-3 4-63 0 0,0-1-1 0 0,1 1 1 0 0,0 0-1 0 0,0 0 1 0 0,1 0-1 0 0,0 1 1 0 0,-1 6 63 0 0,0 3-2 0 0,1 0 0 0 0,0 0 0 0 0,2 0 0 0 0,0 0 1 0 0,1 0-1 0 0,1 0 0 0 0,0 1 0 0 0,2-1 0 0 0,0 0 0 0 0,1 2 2 0 0,-2-15 0 0 0,1 1 0 0 0,-1-1 0 0 0,1 0 0 0 0,0 0 0 0 0,0-1 0 0 0,0 1 0 0 0,1 0 0 0 0,1 2 0 0 0,-3-5 0 0 0,0 0 0 0 0,1-1 0 0 0,-1 1 0 0 0,1 0 0 0 0,-1-1 0 0 0,1 0 0 0 0,-1 1 0 0 0,1-1 0 0 0,0 0 0 0 0,0 1 0 0 0,0-1 0 0 0,-1 0 0 0 0,1 0 0 0 0,0-1 0 0 0,0 1 0 0 0,1 0 0 0 0,-1-1 0 0 0,0 1 0 0 0,0-1 0 0 0,0 0 0 0 0,2 1 0 0 0,1-2 8 0 0,0 0 0 0 0,0 0 0 0 0,0 0 0 0 0,0 0 0 0 0,0-1 0 0 0,0 0 0 0 0,0 0 0 0 0,0 0 0 0 0,0-1 0 0 0,-1 0 0 0 0,1 0 0 0 0,-1 0 0 0 0,0 0-1 0 0,0 0 1 0 0,0-1 0 0 0,-1 0 0 0 0,1 0 0 0 0,2-4-8 0 0,4-4 38 0 0,-2 0 1 0 0,0-1-1 0 0,0 0 0 0 0,-1 0 0 0 0,-1-1 0 0 0,1-3-38 0 0,1-6 129 0 0,-2 1 0 0 0,0-1 0 0 0,-2 0 0 0 0,0 0 0 0 0,-2 0 0 0 0,0-20-129 0 0,-3-32 121 0 0,-7-36-121 0 0,-1-47-11 0 0,10 40 923 0 0,-1 116-630 0 0,-6 23-102 0 0,2 2-178 0 0,1 1 0 0 0,1 0 0 0 0,1 0 0 0 0,1 0 0 0 0,2 13-2 0 0,1 20 0 0 0,3 0 0 0 0,3 0 0 0 0,1-1 0 0 0,13 34 0 0 0,-13-62 54 0 0,2 1-1 0 0,0-2 0 0 0,2 1 1 0 0,17 24-54 0 0,-28-46 27 0 0,1 0 0 0 0,0-1 0 0 0,0 1 0 0 0,0-1 0 0 0,1 0 0 0 0,0 0 0 0 0,1 1-27 0 0,-5-5-1 0 0,0 0-1 0 0,1 0 1 0 0,-1-1 0 0 0,1 1 0 0 0,0 0 0 0 0,-1 0 0 0 0,1-1 0 0 0,-1 1 0 0 0,1-1 0 0 0,0 1 0 0 0,-1-1 0 0 0,1 0 0 0 0,0 0 0 0 0,0 0 0 0 0,-1 0 0 0 0,1 0-1 0 0,0 0 1 0 0,-1 0 0 0 0,1 0 0 0 0,0-1 0 0 0,0 1 0 0 0,-1 0 0 0 0,1-1 0 0 0,-1 0 0 0 0,1 1 0 0 0,0-1 0 0 0,-1 0 0 0 0,1 0 0 0 0,-1 0 0 0 0,0 0 0 0 0,1 0 1 0 0,7-6-153 0 0,-1 0 0 0 0,0-1 0 0 0,0 0 0 0 0,-1-1 0 0 0,1 1 0 0 0,-2-1 0 0 0,0 0 0 0 0,5-9 153 0 0,0-3-139 0 0,-1 0-1 0 0,-1-1 1 0 0,4-15 139 0 0,-8 23 6 0 0,-1-1 0 0 0,0 0 0 0 0,-1 0 0 0 0,-1 0 0 0 0,0 0 0 0 0,-1-1 0 0 0,-1 1 0 0 0,-1 0 0 0 0,0-3-6 0 0,0 14 44 0 0,1 0 1 0 0,-2 0 0 0 0,1 0 0 0 0,0 1-1 0 0,-1-1 1 0 0,1 0 0 0 0,-1 1-1 0 0,0 0 1 0 0,0-1 0 0 0,0 1 0 0 0,-1 0-1 0 0,1 0 1 0 0,-1 0 0 0 0,-1-1-45 0 0,3 3 4 0 0,-1 0 0 0 0,1 0 0 0 0,0 0-1 0 0,0 0 1 0 0,-1 0 0 0 0,1 0 0 0 0,0 1 0 0 0,-1-1 0 0 0,1 0-1 0 0,-1 1 1 0 0,1-1 0 0 0,-1 1 0 0 0,1 0 0 0 0,-1-1 0 0 0,1 1 0 0 0,-1 0-1 0 0,0 0 1 0 0,1 0 0 0 0,-1 0 0 0 0,1 0 0 0 0,-1 0 0 0 0,1 1 0 0 0,-1-1-1 0 0,1 0 1 0 0,-1 1 0 0 0,1-1 0 0 0,-1 1 0 0 0,1 0 0 0 0,-1-1 0 0 0,1 1-1 0 0,0 0 1 0 0,0 0 0 0 0,-1 0 0 0 0,1 0 0 0 0,-1 1-4 0 0,-2 2-37 0 0,0 1 1 0 0,0 0-1 0 0,1 0 1 0 0,0 0-1 0 0,-1 0 1 0 0,2 0-1 0 0,-1 1 1 0 0,1-1 0 0 0,0 1-1 0 0,0-1 1 0 0,-1 6 36 0 0,0 5-45 0 0,0 0 1 0 0,0 0-1 0 0,1 13 45 0 0,2-10-15 0 0,0 1 0 0 0,1 0 0 0 0,1-1-1 0 0,1 1 1 0 0,1 3 15 0 0,-2-15-4 0 0,0 0-1 0 0,0 0 1 0 0,1-1-1 0 0,0 1 1 0 0,0 0-1 0 0,1-1 1 0 0,0 0-1 0 0,0 0 1 0 0,1 0-1 0 0,0-1 1 0 0,0 1-1 0 0,0-1 1 0 0,6 4 4 0 0,-8-7-40 0 0,0-1-1 0 0,0 0 1 0 0,0 1 0 0 0,1-1 0 0 0,-1-1 0 0 0,1 1 0 0 0,-1 0 0 0 0,1-1 0 0 0,0 0 0 0 0,-1 0 0 0 0,1 0 0 0 0,0 0 0 0 0,0-1 0 0 0,0 1 0 0 0,0-1 0 0 0,-1 0 0 0 0,1 0 0 0 0,0 0 0 0 0,0-1 0 0 0,0 1 0 0 0,0-1 0 0 0,-1 0 0 0 0,1 0 0 0 0,0-1 0 0 0,-1 1 0 0 0,1-1-1 0 0,0 1 1 0 0,-1-1 0 0 0,0 0 0 0 0,0 0 0 0 0,1-1 0 0 0,-1 1 40 0 0,14-11-1160 0 0</inkml:trace>
   <inkml:trace contextRef="#ctx0" brushRef="#br0" timeOffset="3541.427">1469 358 16583 0 0,'-5'0'1506'0'0,"5"0"-1488"0"0,0 0-1 0 0,-1 0 1 0 0,1 0 0 0 0,-1 0 0 0 0,1 1-1 0 0,0-1 1 0 0,-1 0 0 0 0,1 0 0 0 0,0 0-1 0 0,0 1 1 0 0,-1-1 0 0 0,1 0 0 0 0,0 0 0 0 0,-1 1-1 0 0,1-1 1 0 0,0 0 0 0 0,0 0 0 0 0,-1 1-1 0 0,1-1 1 0 0,0 0 0 0 0,0 1 0 0 0,0-1-1 0 0,0 0 1 0 0,-1 1 0 0 0,1-1 0 0 0,0 0-1 0 0,0 1 1 0 0,0-1 0 0 0,0 1 0 0 0,0-1-18 0 0,-1 13 1058 0 0,1-12-607 0 0,-1 10 269 0 0,1-1 0 0 0,0 0 1 0 0,0 0-1 0 0,1 0 0 0 0,0 0 0 0 0,2 5-720 0 0,1 14 417 0 0,6 54 1393 0 0,8 23-1810 0 0,-21-119 1836 0 0,-2-8-1271 0 0,1 0 1 0 0,0-10-566 0 0,3 26 17 0 0,-1-24 227 0 0,2 0 0 0 0,2-26-244 0 0,-2 47 33 0 0,1 1 1 0 0,1 0-1 0 0,-1-1 0 0 0,1 1 0 0 0,0 0 1 0 0,1 0-1 0 0,-1 0 0 0 0,2 0 0 0 0,-1 0 0 0 0,1 1 1 0 0,0-1-1 0 0,0 1 0 0 0,5-5-33 0 0,-7 8 2 0 0,1 0 0 0 0,0 1 0 0 0,0 0 0 0 0,0-1 0 0 0,1 1-1 0 0,-1 0 1 0 0,0 1 0 0 0,1-1 0 0 0,-1 0 0 0 0,1 1 0 0 0,0 0 0 0 0,0 0 0 0 0,-1 0 0 0 0,1 0 0 0 0,0 1 0 0 0,0 0-1 0 0,3 0-1 0 0,7 0-40 0 0,-1 1-1 0 0,1 1 1 0 0,-1 1-1 0 0,7 1 41 0 0,-5 0-526 0 0,1-1 1 0 0,8 0 525 0 0,-16-3-415 0 0,22 3-2628 0 0,-29-2 2687 0 0,1-1 1 0 0,-1 0 0 0 0,1 1-1 0 0,-1-1 1 0 0,1 1 0 0 0,-1 0-1 0 0,1-1 1 0 0,-1 1 0 0 0,1 0 0 0 0,-1 0-1 0 0,0 0 1 0 0,1 0 0 0 0,-1 0-1 0 0,0 0 1 0 0,1 1 355 0 0,1 7-2111 0 0</inkml:trace>
   <inkml:trace contextRef="#ctx0" brushRef="#br0" timeOffset="3913.483">1811 741 22375 0 0,'-4'6'390'0'0,"1"-1"-1"0"0,0 0 0 0 0,0 1 1 0 0,1 0-1 0 0,0-1 0 0 0,0 1 0 0 0,0 0 1 0 0,0 0-1 0 0,1 0 0 0 0,0 3-389 0 0,-6 21 1898 0 0,-2-2-963 0 0,-2 0-650 0 0,2 2-1 0 0,2-1 1 0 0,0 1-1 0 0,1 13-284 0 0,5-29-1631 0 0,2-1-5255 0 0,1-2-2452 0 0</inkml:trace>
 </inkml:ink>
@@ -1510,7 +1510,7 @@
   <inkml:trace contextRef="#ctx0" brushRef="#br0">131 183 18799 0 0,'-1'-1'194'0'0,"-1"-1"-1"0"0,1 1 0 0 0,-1 0 0 0 0,1 0 1 0 0,-1 0-1 0 0,0 0 0 0 0,0 0 0 0 0,1 1 0 0 0,-1-1 1 0 0,0 0-1 0 0,0 1 0 0 0,0-1 0 0 0,0 1-193 0 0,1 0 507 0 0,1 0 18 0 0,-2 10 1147 0 0,8 21-977 0 0,33 192 712 0 0,-3 158-1877 0 0,-35-374 383 0 0,0 3-101 0 0,0 0 0 0 0,0 0 0 0 0,1-1 0 0 0,1 1-1 0 0,-1-1 1 0 0,1 1 0 0 0,1 0 188 0 0,-3-9-1697 0 0,-1-3-3924 0 0,0-6-1680 0 0</inkml:trace>
   <inkml:trace contextRef="#ctx0" brushRef="#br0" timeOffset="347.804">6 630 16583 0 0,'-1'0'84'0'0,"1"-1"0"0"0,-1 0-1 0 0,1 1 1 0 0,-1-1-1 0 0,1 0 1 0 0,0 0 0 0 0,-1 1-1 0 0,1-1 1 0 0,0 0-1 0 0,-1 0 1 0 0,1 0-1 0 0,0 0 1 0 0,0 1 0 0 0,0-1-1 0 0,0 0 1 0 0,0 0-1 0 0,0 0 1 0 0,0 0 0 0 0,0 0-1 0 0,0 0-83 0 0,9-17 1162 0 0,-9 17-1132 0 0,4-5 451 0 0,1 0 0 0 0,-1 1 1 0 0,1-1-1 0 0,1 1 0 0 0,-1 0 0 0 0,1 0 0 0 0,0 1 0 0 0,0 0 0 0 0,0 0 0 0 0,3-1-481 0 0,16-8 399 0 0,0 1 0 0 0,1 0-399 0 0,-26 12 7 0 0,52-19 114 0 0,21-4-121 0 0,-31 10-1314 0 0,-18 5-181 0 0</inkml:trace>
   <inkml:trace contextRef="#ctx0" brushRef="#br0" timeOffset="690.518">378 1 21943 0 0,'0'10'2338'0'0,"1"6"-2330"0"0,0 0 1 0 0,2 1 0 0 0,0-1 0 0 0,3 8-9 0 0,5 27 189 0 0,2 8 681 0 0,9 27-870 0 0,9 34 716 0 0,-14-39-666 0 0,19 109-470 0 0,-34-178 735 0 0,-1 1 1 0 0,0-1 0 0 0,-1 1 0 0 0,0-1-1 0 0,-1 0 1 0 0,-1 7-316 0 0,-5-6 0 0 0,7-13 0 0 0,0 0 0 0 0,0 0-1 0 0,0 0 1 0 0,-1 0 0 0 0,1 0-1 0 0,0 1 1 0 0,0-1 0 0 0,0 0-1 0 0,0 0 1 0 0,0 0 0 0 0,-1 0 0 0 0,1 0-1 0 0,0 0 1 0 0,0 0 0 0 0,0-1-1 0 0,0 1 1 0 0,0 0 0 0 0,-1 0-1 0 0,1 0 1 0 0,0 0 0 0 0,0 0-1 0 0,0 0 1 0 0,0 0 0 0 0,0 0 0 0 0,0 0-1 0 0,-1 0 1 0 0,1 0 0 0 0,0 0-1 0 0,0-1 1 0 0,0 1 0 0 0,0 0-1 0 0,0 0 1 0 0,0 0 0 0 0,0 0 0 0 0,0 0-1 0 0,0 0 1 0 0,-1-1 0 0 0,1 1-1 0 0,0 0 1 0 0,0 0 0 0 0,0 0-1 0 0,0 0 1 0 0,0 0 0 0 0,0-1 0 0 0,-3-6 67 0 0,1-4 111 0 0,-1 0 1 0 0,2 0 0 0 0,0 0 0 0 0,0-1 0 0 0,1 1 0 0 0,1 0-1 0 0,0-1 1 0 0,0 1-179 0 0,1-17-12 0 0,-1 3 4 0 0,1 1 0 0 0,1-1-1 0 0,1 1 1 0 0,1 0 0 0 0,1 0 0 0 0,3-4 8 0 0,-8 26 14 0 0,-1 0 0 0 0,1 0 0 0 0,0 1 1 0 0,0-1-1 0 0,0 1 0 0 0,0-1 0 0 0,0 0 0 0 0,0 1 1 0 0,0 0-1 0 0,1-1 0 0 0,-1 1 0 0 0,0 0 1 0 0,1-1-15 0 0,-1 2 19 0 0,0-1 0 0 0,0 1 0 0 0,0-1 0 0 0,0 1 0 0 0,0 0 0 0 0,0-1 1 0 0,0 1-1 0 0,0 0 0 0 0,0 0 0 0 0,0 0 0 0 0,0-1 0 0 0,0 1 0 0 0,0 0 1 0 0,0 1-1 0 0,0-1 0 0 0,0 0 0 0 0,0 0 0 0 0,0 0-19 0 0,1 1 20 0 0,1 0 0 0 0,-1 0 0 0 0,0 1 0 0 0,0-1 1 0 0,0 0-1 0 0,0 1 0 0 0,0-1 0 0 0,0 1 0 0 0,0 0 0 0 0,-1-1 0 0 0,1 1 0 0 0,-1 0 0 0 0,1 0 0 0 0,-1 0 0 0 0,1 0 0 0 0,-1 1 0 0 0,1 1-20 0 0,7 19 49 0 0,0 0 0 0 0,-1 0 0 0 0,-1 1 0 0 0,2 17-49 0 0,2 28-14 0 0,-3 2 14 0 0,-7-66-54 0 0,5 38-156 0 0,-5-40 38 0 0,-1 1-1 0 0,1 0 1 0 0,1-1 0 0 0,-1 1 0 0 0,0-1-1 0 0,1 0 1 0 0,0 1 0 0 0,0-1-1 0 0,0 0 1 0 0,1 1 172 0 0,-3-4-105 0 0,0 0-1 0 0,1 1 0 0 0,-1-1 1 0 0,1 0-1 0 0,-1 0 1 0 0,0 1-1 0 0,1-1 0 0 0,-1 0 1 0 0,1 0-1 0 0,-1 0 1 0 0,0 0-1 0 0,1 0 1 0 0,-1 0-1 0 0,1 0 0 0 0,-1 0 1 0 0,1 0-1 0 0,-1 0 1 0 0,1 0-1 0 0,-1 0 1 0 0,0 0-1 0 0,1 0 0 0 0,-1 0 1 0 0,1 0-1 0 0,-1 0 1 0 0,1 0-1 0 0,-1-1 0 0 0,0 1 1 0 0,1 0-1 0 0,-1 0 1 0 0,0-1-1 0 0,1 1 1 0 0,-1 0-1 0 0,0 0 0 0 0,1-1 1 0 0,-1 1-1 0 0,0 0 1 0 0,1-1-1 0 0,-1 1 106 0 0,11-15-2525 0 0,-10 15 2492 0 0,8-17-2093 0 0</inkml:trace>
-  <inkml:trace contextRef="#ctx0" brushRef="#br0" timeOffset="1037.013">781 671 17535 0 0,'0'0'803'0'0,"0"0"-18"0"0,17 5 1469 0 0,-12-5-1954 0 0,1 1 1 0 0,-1-1 0 0 0,1-1-1 0 0,-1 1 1 0 0,0-1 0 0 0,1 0-1 0 0,-1 0 1 0 0,0 0 0 0 0,0-1-1 0 0,0 1 1 0 0,0-1 0 0 0,0-1-1 0 0,0 1 1 0 0,0-1 0 0 0,-1 0-1 0 0,1 0 1 0 0,-1 0-1 0 0,1-1-300 0 0,8-7 83 0 0,-1 0-1 0 0,0-1 0 0 0,-1 0 0 0 0,0-1 0 0 0,2-3-82 0 0,-10 12 18 0 0,0-1 0 0 0,-1 1 0 0 0,1-1 0 0 0,-1 1 0 0 0,0-1 0 0 0,0 0 0 0 0,0 0 0 0 0,-1 0 0 0 0,1 0 0 0 0,-1 0 0 0 0,0-4-18 0 0,-1 8 2 0 0,0-1-1 0 0,0 0 1 0 0,0 0-1 0 0,0 0 0 0 0,0 0 1 0 0,-1 0-1 0 0,1 0 1 0 0,-1 0-1 0 0,1 0 1 0 0,-1 0-1 0 0,0 1 0 0 0,1-1 1 0 0,-1 0-1 0 0,0 0 1 0 0,0 1-1 0 0,0-1 1 0 0,-1 1-1 0 0,1-1 1 0 0,0 1-1 0 0,-1-1 0 0 0,1 1 1 0 0,-1 0-1 0 0,1 0 1 0 0,-1-1-1 0 0,1 1 1 0 0,-1 0-1 0 0,0 1 1 0 0,0-1-1 0 0,1 0 0 0 0,-1 0 1 0 0,-2 0-2 0 0,1 1-18 0 0,-1-1 0 0 0,1 0 0 0 0,-1 1 0 0 0,1 0 0 0 0,-1 0 0 0 0,1 0 0 0 0,-1 0 0 0 0,1 1 1 0 0,-1-1-1 0 0,1 1 0 0 0,-1 0 0 0 0,1 0 0 0 0,0 0 0 0 0,-1 0 0 0 0,1 1 0 0 0,0-1 0 0 0,0 1 0 0 0,-2 1 18 0 0,-2 2 20 0 0,0 0 0 0 0,0 0 0 0 0,0 1 0 0 0,1 0 0 0 0,-1 0 0 0 0,-3 6-20 0 0,4-5 119 0 0,1 0-1 0 0,0 1 0 0 0,0-1 1 0 0,0 1-1 0 0,1 0 0 0 0,1 0 1 0 0,-1 1-1 0 0,1-1 0 0 0,0 3-118 0 0,2-4 118 0 0,0-1 0 0 0,0 1 0 0 0,0-1 0 0 0,1 1 0 0 0,0 0 0 0 0,0-1 0 0 0,1 1 0 0 0,0 0-1 0 0,0-1 1 0 0,1 1 0 0 0,-1-1 0 0 0,3 6-118 0 0,0-4 49 0 0,0 0 0 0 0,0 0 0 0 0,0-1 0 0 0,1 0 0 0 0,0 0 0 0 0,0 0 0 0 0,1 0 1 0 0,0-1-1 0 0,0 0 0 0 0,0 0 0 0 0,1 0 0 0 0,0-1 0 0 0,0 0 0 0 0,0 0 0 0 0,1-1 0 0 0,0 0 0 0 0,0-1 0 0 0,0 1 0 0 0,0-1 0 0 0,0-1 0 0 0,1 0 0 0 0,-1 0 0 0 0,1 0 0 0 0,6-1-49 0 0,-1 1-590 0 0,-1-1 0 0 0,1-1 0 0 0,0 0 0 0 0,-1-1 0 0 0,4 0 590 0 0,10-3-10067 0 0</inkml:trace>
+  <inkml:trace contextRef="#ctx0" brushRef="#br0" timeOffset="1037.012">781 671 17535 0 0,'0'0'803'0'0,"0"0"-18"0"0,17 5 1469 0 0,-12-5-1954 0 0,1 1 1 0 0,-1-1 0 0 0,1-1-1 0 0,-1 1 1 0 0,0-1 0 0 0,1 0-1 0 0,-1 0 1 0 0,0 0 0 0 0,0-1-1 0 0,0 1 1 0 0,0-1 0 0 0,0-1-1 0 0,0 1 1 0 0,0-1 0 0 0,-1 0-1 0 0,1 0 1 0 0,-1 0-1 0 0,1-1-300 0 0,8-7 83 0 0,-1 0-1 0 0,0-1 0 0 0,-1 0 0 0 0,0-1 0 0 0,2-3-82 0 0,-10 12 18 0 0,0-1 0 0 0,-1 1 0 0 0,1-1 0 0 0,-1 1 0 0 0,0-1 0 0 0,0 0 0 0 0,0 0 0 0 0,-1 0 0 0 0,1 0 0 0 0,-1 0 0 0 0,0-4-18 0 0,-1 8 2 0 0,0-1-1 0 0,0 0 1 0 0,0 0-1 0 0,0 0 0 0 0,0 0 1 0 0,-1 0-1 0 0,1 0 1 0 0,-1 0-1 0 0,1 0 1 0 0,-1 0-1 0 0,0 1 0 0 0,1-1 1 0 0,-1 0-1 0 0,0 0 1 0 0,0 1-1 0 0,0-1 1 0 0,-1 1-1 0 0,1-1 1 0 0,0 1-1 0 0,-1-1 0 0 0,1 1 1 0 0,-1 0-1 0 0,1 0 1 0 0,-1-1-1 0 0,1 1 1 0 0,-1 0-1 0 0,0 1 1 0 0,0-1-1 0 0,1 0 0 0 0,-1 0 1 0 0,-2 0-2 0 0,1 1-18 0 0,-1-1 0 0 0,1 0 0 0 0,-1 1 0 0 0,1 0 0 0 0,-1 0 0 0 0,1 0 0 0 0,-1 0 0 0 0,1 1 1 0 0,-1-1-1 0 0,1 1 0 0 0,-1 0 0 0 0,1 0 0 0 0,0 0 0 0 0,-1 0 0 0 0,1 1 0 0 0,0-1 0 0 0,0 1 0 0 0,-2 1 18 0 0,-2 2 20 0 0,0 0 0 0 0,0 0 0 0 0,0 1 0 0 0,1 0 0 0 0,-1 0 0 0 0,-3 6-20 0 0,4-5 119 0 0,1 0-1 0 0,0 1 0 0 0,0-1 1 0 0,0 1-1 0 0,1 0 0 0 0,1 0 1 0 0,-1 1-1 0 0,1-1 0 0 0,0 3-118 0 0,2-4 118 0 0,0-1 0 0 0,0 1 0 0 0,0-1 0 0 0,1 1 0 0 0,0 0 0 0 0,0-1 0 0 0,1 1 0 0 0,0 0-1 0 0,0-1 1 0 0,1 1 0 0 0,-1-1 0 0 0,3 6-118 0 0,0-4 49 0 0,0 0 0 0 0,0 0 0 0 0,0-1 0 0 0,1 0 0 0 0,0 0 0 0 0,0 0 0 0 0,1 0 1 0 0,0-1-1 0 0,0 0 0 0 0,0 0 0 0 0,1 0 0 0 0,0-1 0 0 0,0 0 0 0 0,0 0 0 0 0,1-1 0 0 0,0 0 0 0 0,0-1 0 0 0,0 1 0 0 0,0-1 0 0 0,0-1 0 0 0,1 0 0 0 0,-1 0 0 0 0,1 0 0 0 0,6-1-49 0 0,-1 1-590 0 0,-1-1 0 0 0,1-1 0 0 0,0 0 0 0 0,-1-1 0 0 0,4 0 590 0 0,10-3-10067 0 0</inkml:trace>
 </inkml:ink>
 </file>
 
@@ -1544,7 +1544,7 @@
   <inkml:trace contextRef="#ctx0" brushRef="#br0">0 1 20359 0 0,'0'0'463'0'0,"0"0"61"0"0,0 0 29 0 0,0 0-57 0 0,0 6-210 0 0,3 224 3824 0 0,17 307-2161 0 0,-19-531-1939 0 0,0 25 71 0 0,1-1 0 0 0,1 0-1 0 0,2 0 1 0 0,1 0 0 0 0,3 5-81 0 0,-9-32 7 0 0,1-1-1 0 0,0 0 1 0 0,0 0 0 0 0,0 0 0 0 0,0 1 0 0 0,1-1-1 0 0,-1 0 1 0 0,0-1 0 0 0,1 1 0 0 0,-1 0 0 0 0,1 0-1 0 0,0-1 1 0 0,0 1 0 0 0,0-1 0 0 0,0 1-7 0 0,0-1-3 0 0,-1 0 1 0 0,1 0 0 0 0,0-1-1 0 0,0 1 1 0 0,-1-1-1 0 0,1 1 1 0 0,0-1-1 0 0,0 0 1 0 0,0 0 0 0 0,0 0-1 0 0,-1 0 1 0 0,1 0-1 0 0,0 0 1 0 0,0 0-1 0 0,0-1 1 0 0,-1 1-1 0 0,1-1 1 0 0,0 1 0 0 0,0-1-1 0 0,0 0 3 0 0,8-3-247 0 0,1-1 0 0 0,-1 0 0 0 0,0-1 0 0 0,-1 0 0 0 0,6-5 247 0 0,24-21-4689 0 0,-22 17-3914 0 0</inkml:trace>
   <inkml:trace contextRef="#ctx0" brushRef="#br0" timeOffset="519.475">474 728 16416 0 0,'0'0'751'0'0,"2"-6"273"0"0,1 2-205 0 0,-1 0 0 0 0,-1-1-1 0 0,1 1 1 0 0,0 0-1 0 0,0-4-818 0 0,2-3 866 0 0,2-5 203 0 0,-4 13-916 0 0,-1-1-1 0 0,1 1 1 0 0,-1-1 0 0 0,0 1 0 0 0,0-1 0 0 0,0 0 0 0 0,0 0 0 0 0,-1 1-1 0 0,1-1 1 0 0,-1 0 0 0 0,0 0 0 0 0,0 0 0 0 0,-1 0-153 0 0,1 0 22 0 0,-2-6 91 0 0,0 1-1 0 0,0 0 0 0 0,-1-1 0 0 0,0 1 1 0 0,-3-5-113 0 0,5 11 16 0 0,0 1 0 0 0,-1 0 0 0 0,1-1 0 0 0,-1 1 0 0 0,1 0 0 0 0,-1 0 0 0 0,0 0 0 0 0,0 0 0 0 0,0 1 0 0 0,0-1 0 0 0,0 0 0 0 0,0 1 1 0 0,-1-1-1 0 0,1 1 0 0 0,0 0 0 0 0,-1 0 0 0 0,1 0 0 0 0,-1 0 0 0 0,1 0 0 0 0,-1 1 0 0 0,0-1 0 0 0,1 1 0 0 0,-1-1-16 0 0,0 2 0 0 0,0-1 0 0 0,0 0 0 0 0,0 0 0 0 0,0 1 0 0 0,0 0 0 0 0,0 0 0 0 0,0 0 0 0 0,0 0 0 0 0,1 0 0 0 0,-1 0 0 0 0,0 1 0 0 0,1-1 0 0 0,-1 1 0 0 0,1 0 0 0 0,-1 0 0 0 0,1 0 0 0 0,0 0 0 0 0,0 0 0 0 0,-2 2 0 0 0,-3 4 0 0 0,0 1 0 0 0,0 0 0 0 0,1 0 0 0 0,-4 7 0 0 0,1 1 0 0 0,0 0 0 0 0,2 1 0 0 0,0 0 0 0 0,1 0 0 0 0,0 1 0 0 0,-1 10 0 0 0,6-20 0 0 0,-1 0 0 0 0,1-1 0 0 0,1 1 0 0 0,0 0 0 0 0,0 0 0 0 0,0 0 0 0 0,1 0 0 0 0,1 0 0 0 0,0 0 0 0 0,0 0 0 0 0,0-1 0 0 0,1 1 0 0 0,0-1 0 0 0,1 0 0 0 0,0 1 0 0 0,-2-6-1 0 0,-1-1 0 0 0,1 1 0 0 0,-1-1 0 0 0,1 0 0 0 0,0 1 0 0 0,0-1 0 0 0,0 0 0 0 0,0 0 0 0 0,0-1 0 0 0,0 1 0 0 0,0 0 0 0 0,1-1 0 0 0,-1 1 0 0 0,0-1 0 0 0,1 0 0 0 0,0 0 0 0 0,-1 0 0 0 0,1 0 0 0 0,0 0 0 0 0,0 0 1 0 0,0-1 15 0 0,0 0 1 0 0,0 0-1 0 0,1 0 1 0 0,-1-1-1 0 0,0 1 1 0 0,0-1-1 0 0,0 1 0 0 0,1-1 1 0 0,-1 0-1 0 0,0-1 1 0 0,0 1-1 0 0,-1 0 1 0 0,1-1-1 0 0,0 1 1 0 0,0-1-1 0 0,-1 0 1 0 0,2-1-16 0 0,8-7 105 0 0,0 0 0 0 0,-1-1 1 0 0,0 0-1 0 0,-1 0 0 0 0,0-1 0 0 0,-1-1 1 0 0,0 0-1 0 0,3-6-105 0 0,-7 10 12 0 0,0-1 0 0 0,-1 1 0 0 0,0-1 0 0 0,-1 0 0 0 0,0 0-1 0 0,0 0 1 0 0,-1 0 0 0 0,-1 0 0 0 0,0 0 0 0 0,0-1 0 0 0,-1 1 0 0 0,0-1 0 0 0,0-1-12 0 0,-1 10 37 0 0,1 0 0 0 0,0 0 0 0 0,-1 0-1 0 0,1 0 1 0 0,-1 0 0 0 0,0 0 0 0 0,0 0 0 0 0,0 0-1 0 0,0 0 1 0 0,-1-1-37 0 0,2 4 6 0 0,-1-1 0 0 0,1 1 0 0 0,-1-1 0 0 0,1 1 0 0 0,-1-1 0 0 0,1 1-1 0 0,-1-1 1 0 0,1 1 0 0 0,0-1 0 0 0,-1 1 0 0 0,1 0 0 0 0,0-1 0 0 0,-1 1 0 0 0,1 0 0 0 0,0-1 0 0 0,0 2-6 0 0,-1-1 1 0 0,-2 9 7 0 0,-1 1 1 0 0,2-1-1 0 0,0 1 0 0 0,0 0 1 0 0,1 0-1 0 0,0 0 0 0 0,1 11-8 0 0,-1 0 6 0 0,0 2-3 0 0,1 0-1 0 0,3 16-2 0 0,-2-28-4 0 0,1 0 0 0 0,0 0 0 0 0,1-1-1 0 0,1 1 1 0 0,0-1 0 0 0,2 4 4 0 0,-4-11-79 0 0,0 0 1 0 0,0 0-1 0 0,1 0 0 0 0,-1-1 1 0 0,1 1-1 0 0,0-1 0 0 0,0 1 0 0 0,1-1 1 0 0,-1 0-1 0 0,3 2 79 0 0,-3-3-527 0 0,0 0 0 0 0,0-1 0 0 0,-1 1 0 0 0,2-1 0 0 0,-1 0 0 0 0,0 1 0 0 0,0-1 0 0 0,0-1 0 0 0,2 1 527 0 0,6 0-8617 0 0</inkml:trace>
   <inkml:trace contextRef="#ctx0" brushRef="#br0" timeOffset="902.271">887 652 19783 0 0,'-16'-22'1595'0'0,"12"16"-1145"0"0,0-1 0 0 0,-1 1 1 0 0,0-1-1 0 0,-5-4-450 0 0,8 10 168 0 0,0 0 0 0 0,1-1 0 0 0,-1 1 0 0 0,0 0 0 0 0,0 0 0 0 0,0 0 0 0 0,0 0-1 0 0,0 0 1 0 0,0 0 0 0 0,0 1 0 0 0,0-1 0 0 0,0 0 0 0 0,0 1 0 0 0,0 0 0 0 0,0 0 0 0 0,0-1 0 0 0,0 1 0 0 0,-1 1 0 0 0,1-1 0 0 0,0 0-168 0 0,-4 1 85 0 0,1 1-1 0 0,0-1 1 0 0,-1 1 0 0 0,1 0-1 0 0,0 0 1 0 0,0 1 0 0 0,1 0-1 0 0,-1 0 1 0 0,0 0 0 0 0,1 0-1 0 0,0 1 1 0 0,0-1-1 0 0,-3 4-84 0 0,2-2 75 0 0,1 0-1 0 0,0 0 0 0 0,0 0 0 0 0,1 1 1 0 0,-1 0-1 0 0,1-1 0 0 0,0 1 0 0 0,1 0 1 0 0,-1 0-1 0 0,1 1 0 0 0,0 2-74 0 0,1-8 1 0 0,1 1 1 0 0,0-1-1 0 0,0 1 0 0 0,0-1 1 0 0,0 1-1 0 0,0-1 0 0 0,0 1 1 0 0,0-1-1 0 0,0 1 0 0 0,0-1 1 0 0,1 1-1 0 0,-1-1 0 0 0,1 0 0 0 0,-1 1 1 0 0,1-1-1 0 0,-1 1 0 0 0,1-1 1 0 0,0 0-1 0 0,0 0 0 0 0,-1 1 1 0 0,1-1-1 0 0,0 0 0 0 0,0 0 0 0 0,0 0 1 0 0,1 0-1 0 0,-1 0 0 0 0,0 0 1 0 0,0 0-1 0 0,0 0 0 0 0,1-1 1 0 0,-1 1-1 0 0,1 0 0 0 0,-1-1 1 0 0,0 1-1 0 0,1-1 0 0 0,0 1-1 0 0,8 1 14 0 0,0 0 0 0 0,0 0 0 0 0,0-1 0 0 0,1 0 0 0 0,3-1-14 0 0,10 2 11 0 0,-2 0 67 0 0,-1 2-1 0 0,1 0 0 0 0,-1 2 1 0 0,0 0-1 0 0,0 1-77 0 0,-13-4 36 0 0,0 1-1 0 0,-1-1 1 0 0,0 1-1 0 0,1 0 1 0 0,-2 1-1 0 0,1 0 1 0 0,0 0-1 0 0,-1 0 1 0 0,0 1-1 0 0,0 0 1 0 0,-1 0-1 0 0,0 0 1 0 0,0 1-1 0 0,4 7-35 0 0,-8-13 46 0 0,1 1 0 0 0,-1 0 0 0 0,-1 0 0 0 0,1 0-1 0 0,0 0 1 0 0,0 0 0 0 0,-1 0 0 0 0,1 0 0 0 0,-1 0 0 0 0,1 0-1 0 0,-1 0 1 0 0,0 0 0 0 0,0 0 0 0 0,0 0 0 0 0,0 0 0 0 0,0 0 0 0 0,-1 1-1 0 0,1-1 1 0 0,-1 0 0 0 0,1 0 0 0 0,-1 0 0 0 0,0 0 0 0 0,1-1 0 0 0,-1 1-1 0 0,0 0-45 0 0,-2 1 53 0 0,1 0 0 0 0,-1 0 0 0 0,0-1-1 0 0,0 1 1 0 0,0-1 0 0 0,0 1 0 0 0,0-1-1 0 0,0 0 1 0 0,-1-1 0 0 0,1 1 0 0 0,-1 0-1 0 0,1-1 1 0 0,-2 1-53 0 0,-6 1 113 0 0,0 0 0 0 0,0-1 0 0 0,1 0 0 0 0,-1 0 0 0 0,-1-1 0 0 0,1-1 0 0 0,0 0 0 0 0,-5-1-113 0 0,-1 0-12 0 0,1-2 0 0 0,0 0 0 0 0,0 0 0 0 0,0-2 0 0 0,-7-2 12 0 0,19 5-77 0 0,-1 0-1 0 0,1 0 1 0 0,-1 0-1 0 0,1-1 1 0 0,0 0-1 0 0,0 0 1 0 0,0 0-1 0 0,0 0 1 0 0,1-1-1 0 0,-3-2 78 0 0,4 4-216 0 0,0 0-1 0 0,1 0 0 0 0,-1 0 1 0 0,1 0-1 0 0,0-1 0 0 0,0 1 1 0 0,0 0-1 0 0,0-1 0 0 0,0 1 1 0 0,0-1-1 0 0,1 1 0 0 0,-1-1 0 0 0,1 1 1 0 0,0-1-1 0 0,0 1 0 0 0,0-1 1 0 0,0 0-1 0 0,0 1 0 0 0,0-1 1 0 0,1 1-1 0 0,0-3 217 0 0,4-12-1619 0 0</inkml:trace>
-  <inkml:trace contextRef="#ctx0" brushRef="#br0" timeOffset="1258.361">1217 59 24479 0 0,'0'0'562'0'0,"-8"10"1330"0"0,6-4-1807 0 0,-1-1 0 0 0,1 1 1 0 0,1-1-1 0 0,-1 1 1 0 0,1 0-1 0 0,0-1 1 0 0,1 1-1 0 0,-1 0 1 0 0,1 0-1 0 0,0 0 1 0 0,1 5-86 0 0,2 11 681 0 0,1 1 1 0 0,3 10-682 0 0,0-3 290 0 0,13 75 710 0 0,-4 8-1000 0 0,-11-58 132 0 0,-3-1 1 0 0,-1 1-1 0 0,-3 1-132 0 0,2-52-14 0 0,-10 178 362 0 0,10-136-781 0 0,7-57-1963 0 0,-4 1 591 0 0,2-5-363 0 0</inkml:trace>
+  <inkml:trace contextRef="#ctx0" brushRef="#br0" timeOffset="1258.36">1217 59 24479 0 0,'0'0'562'0'0,"-8"10"1330"0"0,6-4-1807 0 0,-1-1 0 0 0,1 1 1 0 0,1-1-1 0 0,-1 1 1 0 0,1 0-1 0 0,0-1 1 0 0,1 1-1 0 0,-1 0 1 0 0,1 0-1 0 0,0 0 1 0 0,1 5-86 0 0,2 11 681 0 0,1 1 1 0 0,3 10-682 0 0,0-3 290 0 0,13 75 710 0 0,-4 8-1000 0 0,-11-58 132 0 0,-3-1 1 0 0,-1 1-1 0 0,-3 1-132 0 0,2-52-14 0 0,-10 178 362 0 0,10-136-781 0 0,7-57-1963 0 0,-4 1 591 0 0,2-5-363 0 0</inkml:trace>
   <inkml:trace contextRef="#ctx0" brushRef="#br0" timeOffset="1598.94">1126 498 14280 0 0,'-7'-4'1606'0'0,"-3"-5"-1466"0"0,6 4 7629 0 0,3 4-5173 0 0,1 1-1172 0 0,0 0-1324 0 0,0 0 0 0 0,0-1 0 0 0,1 1 0 0 0,-1 0 0 0 0,0 0 0 0 0,0-1 0 0 0,0 1 0 0 0,0 0 0 0 0,0-1 0 0 0,0 1 0 0 0,1 0 0 0 0,-1 0 0 0 0,0 0 0 0 0,0-1 0 0 0,0 1 0 0 0,0 0 0 0 0,1 0 0 0 0,-1 0 0 0 0,0-1 0 0 0,0 1 0 0 0,1 0 0 0 0,-1 0 0 0 0,0 0 0 0 0,0 0 0 0 0,1 0 0 0 0,-1 0 0 0 0,0 0 0 0 0,0-1-100 0 0,16-1 180 0 0,1-1-1 0 0,-1 2 0 0 0,16 0-179 0 0,6-1 126 0 0,21-5-1922 0 0,-1-3 0 0 0,0-2 1796 0 0,45-8-5530 0 0,-65 14-3995 0 0</inkml:trace>
 </inkml:ink>
 </file>
@@ -1577,10 +1577,10 @@
     </inkml:brush>
   </inkml:definitions>
   <inkml:trace contextRef="#ctx0" brushRef="#br0">908 177 14280 0 0,'-1'-3'276'0'0,"1"1"0"0"0,0-1-1 0 0,-1 0 1 0 0,0 1 0 0 0,1-1 0 0 0,-1 1 0 0 0,0-1 0 0 0,-1 1 0 0 0,1-1 0 0 0,0 1 0 0 0,-1 0 0 0 0,1 0 0 0 0,-1-1 0 0 0,1 1 0 0 0,-3-1-276 0 0,-4-5 1698 0 0,0 0-1 0 0,-1 1 1 0 0,-1-1-1698 0 0,1 1 89 0 0,5 3 51 0 0,0 1 1 0 0,-1 0-1 0 0,1 0 1 0 0,-1 1-1 0 0,0-1 1 0 0,0 1-1 0 0,0 0 1 0 0,0 0 0 0 0,0 1-1 0 0,-4-1-140 0 0,6 1 99 0 0,1 1 1 0 0,-1 0-1 0 0,1 0 0 0 0,-1 0 0 0 0,1 0 0 0 0,-1 0 1 0 0,1 1-1 0 0,-1-1 0 0 0,1 1 0 0 0,-1 0 0 0 0,1-1 1 0 0,-1 1-1 0 0,1 0 0 0 0,0 1 0 0 0,0-1 0 0 0,-1 0 1 0 0,1 0-1 0 0,0 1 0 0 0,0 0 0 0 0,0-1 1 0 0,1 1-1 0 0,-1 0 0 0 0,0 0 0 0 0,0 0-99 0 0,-6 10 180 0 0,0 0 0 0 0,1 0 0 0 0,0 0-1 0 0,0 1 1 0 0,2 0 0 0 0,-1 0 0 0 0,2 1-1 0 0,-2 7-179 0 0,-1 6 130 0 0,2 1 0 0 0,1 0 0 0 0,0 24-130 0 0,4-44-1 0 0,-1-1-1 0 0,2 0 1 0 0,-1 0 0 0 0,1 1-1 0 0,0-1 1 0 0,1 0 0 0 0,0 0-1 0 0,0 0 1 0 0,0 0 0 0 0,1 0-1 0 0,0-1 1 0 0,1 2 1 0 0,-2-5 16 0 0,-1 0 1 0 0,1-1 0 0 0,1 1-1 0 0,-1-1 1 0 0,0 1-1 0 0,0-1 1 0 0,1 0 0 0 0,0 1-1 0 0,-1-2 1 0 0,1 1-1 0 0,0 0 1 0 0,0 0 0 0 0,0-1-1 0 0,0 1 1 0 0,0-1-1 0 0,0 0 1 0 0,0 0 0 0 0,1 0-1 0 0,-1-1 1 0 0,0 1-1 0 0,1-1 1 0 0,-1 0 0 0 0,0 1-1 0 0,1-2 1 0 0,-1 1 0 0 0,0 0-1 0 0,1-1-16 0 0,7-1 62 0 0,-1 0 1 0 0,1-1-1 0 0,-1 0 1 0 0,1-1-1 0 0,-1 0 0 0 0,-1-1 1 0 0,3-1-63 0 0,21-13-913 0 0,11-9 913 0 0,-43 27-45 0 0,25-21-1906 0 0,-18 14-1103 0 0,-1-1-3342 0 0,-3 2-1265 0 0</inkml:trace>
-  <inkml:trace contextRef="#ctx0" brushRef="#br0" timeOffset="599.46">1017 103 20815 0 0,'0'0'472'0'0,"0"0"68"0"0,0 0 34 0 0,0 0-69 0 0,6 11-244 0 0,-3 2 229 0 0,0-1 0 0 0,-1 1 0 0 0,0 0 0 0 0,-1 0 0 0 0,0 6-490 0 0,2 13 846 0 0,3 40 504 0 0,-5-39-875 0 0,3 1 1 0 0,0-1 0 0 0,3 0-1 0 0,1 2-475 0 0,-5-28 534 0 0,-1-7-159 0 0,0-13 26 0 0,-1-22-119 0 0,-14-64-121 0 0,5 42-322 0 0,6 46 114 0 0,-1-10-83 0 0,1 0 0 0 0,1-11 130 0 0,1 26-24 0 0,0 1 0 0 0,1-1-1 0 0,0 1 1 0 0,0 0 0 0 0,0-1 0 0 0,0 1 0 0 0,1 0 0 0 0,0 0 0 0 0,0 0 0 0 0,0 0 0 0 0,1 0 0 0 0,0-1 24 0 0,-2 5-5 0 0,1-1-1 0 0,-1 1 0 0 0,1 0 1 0 0,-1-1-1 0 0,1 1 1 0 0,0 0-1 0 0,-1 0 1 0 0,1 0-1 0 0,0 0 1 0 0,0 0-1 0 0,0 0 1 0 0,0 1-1 0 0,0-1 1 0 0,0 1-1 0 0,0-1 1 0 0,0 1-1 0 0,0 0 0 0 0,0 0 1 0 0,0 0-1 0 0,0 0 1 0 0,0 0-1 0 0,1 0 6 0 0,2 1-5 0 0,1-1-1 0 0,0 1 1 0 0,-1 0-1 0 0,1 1 1 0 0,-1 0 0 0 0,0-1-1 0 0,4 3 6 0 0,11 7 26 0 0,-1 1 1 0 0,0 1-1 0 0,-1 1 0 0 0,11 11-26 0 0,-10-9 125 0 0,0-1 0 0 0,1 0 0 0 0,19 10-125 0 0,-34-23 22 0 0,0 0-1 0 0,-1-1 0 0 0,1 1 1 0 0,0-1-1 0 0,0 0 1 0 0,0 0-1 0 0,0-1 1 0 0,0 1-1 0 0,0-1 1 0 0,0 0-1 0 0,1-1 1 0 0,-1 1-1 0 0,0-1 1 0 0,0 0-1 0 0,0 0 1 0 0,-1 0-1 0 0,1-1 1 0 0,0 0-1 0 0,0 0 1 0 0,-1 0-1 0 0,2-1-21 0 0,4-3-18 0 0,0 0 1 0 0,-1 0-1 0 0,1-1 0 0 0,-1 0 1 0 0,-1-1-1 0 0,1 0 0 0 0,-1 0 0 0 0,6-9 18 0 0,-10 12-34 0 0,0 0-1 0 0,-1 0 0 0 0,0 0 1 0 0,0 0-1 0 0,0-1 0 0 0,0 1 1 0 0,-1-1-1 0 0,0 0 0 0 0,0 0 1 0 0,-1 1-1 0 0,1-1 0 0 0,-2 0 1 0 0,1-1-1 0 0,0 1 0 0 0,-1 0 1 0 0,0 0-1 0 0,-1 0 0 0 0,1 0 1 0 0,-1 0-1 0 0,-1-4 35 0 0,1 8-6 0 0,1 0-1 0 0,-1 0 1 0 0,1 0 0 0 0,-1 1-1 0 0,0-1 1 0 0,0 0 0 0 0,0 1-1 0 0,0-1 1 0 0,0 1-1 0 0,0-1 1 0 0,0 1 0 0 0,-1 0-1 0 0,1-1 1 0 0,0 1 0 0 0,-1 0-1 0 0,1 0 1 0 0,-1 0 0 0 0,0 0-1 0 0,1 0 1 0 0,-1 0 0 0 0,-1 0 6 0 0,0 0-18 0 0,0 0 0 0 0,0 1 1 0 0,0 0-1 0 0,0-1 1 0 0,0 1-1 0 0,0 0 1 0 0,0 1-1 0 0,0-1 1 0 0,0 0-1 0 0,0 1 1 0 0,1 0-1 0 0,-4 0 18 0 0,-3 2-35 0 0,1 1 0 0 0,0 0 0 0 0,0 0 0 0 0,0 0 0 0 0,0 1 0 0 0,1 0 0 0 0,-1 1 0 0 0,-3 3 35 0 0,1 2 41 0 0,0 0 0 0 0,0 1-1 0 0,1 0 1 0 0,1 1 0 0 0,0-1-1 0 0,1 2 1 0 0,0-1 0 0 0,1 1 0 0 0,1 0-1 0 0,0 0 1 0 0,-2 9-41 0 0,4-11 32 0 0,1 1 0 0 0,0-1 0 0 0,0 0 0 0 0,1 0 0 0 0,1 1 0 0 0,0-1 0 0 0,1 1 0 0 0,0-1 0 0 0,1 0 0 0 0,0 0 0 0 0,1 1 0 0 0,0-1 0 0 0,1-1 0 0 0,2 4-32 0 0,-4-10-109 0 0,1 0-1 0 0,0 0 1 0 0,0-1 0 0 0,0 1-1 0 0,0-1 1 0 0,0 0 0 0 0,1 0 0 0 0,0 0-1 0 0,0-1 1 0 0,0 1 0 0 0,0-1-1 0 0,1 0 1 0 0,-1 0 0 0 0,1 0-1 0 0,0-1 1 0 0,0 1 0 0 0,0-1-1 0 0,0-1 1 0 0,0 1 0 0 0,0-1-1 0 0,0 0 1 0 0,1 0 0 0 0,-1 0-1 0 0,1 0 1 0 0,-1-1 0 0 0,2 0 109 0 0,6-1-393 0 0,0 0 1 0 0,1-1 0 0 0,-1 0-1 0 0,0-1 1 0 0,0 0-1 0 0,-1-1 1 0 0,1 0-1 0 0,-1-1 1 0 0,0-1 0 0 0,2-1 392 0 0,5-2-2178 0 0</inkml:trace>
+  <inkml:trace contextRef="#ctx0" brushRef="#br0" timeOffset="599.459">1017 103 20815 0 0,'0'0'472'0'0,"0"0"68"0"0,0 0 34 0 0,0 0-69 0 0,6 11-244 0 0,-3 2 229 0 0,0-1 0 0 0,-1 1 0 0 0,0 0 0 0 0,-1 0 0 0 0,0 6-490 0 0,2 13 846 0 0,3 40 504 0 0,-5-39-875 0 0,3 1 1 0 0,0-1 0 0 0,3 0-1 0 0,1 2-475 0 0,-5-28 534 0 0,-1-7-159 0 0,0-13 26 0 0,-1-22-119 0 0,-14-64-121 0 0,5 42-322 0 0,6 46 114 0 0,-1-10-83 0 0,1 0 0 0 0,1-11 130 0 0,1 26-24 0 0,0 1 0 0 0,1-1-1 0 0,0 1 1 0 0,0 0 0 0 0,0-1 0 0 0,0 1 0 0 0,1 0 0 0 0,0 0 0 0 0,0 0 0 0 0,0 0 0 0 0,1 0 0 0 0,0-1 24 0 0,-2 5-5 0 0,1-1-1 0 0,-1 1 0 0 0,1 0 1 0 0,-1-1-1 0 0,1 1 1 0 0,0 0-1 0 0,-1 0 1 0 0,1 0-1 0 0,0 0 1 0 0,0 0-1 0 0,0 0 1 0 0,0 1-1 0 0,0-1 1 0 0,0 1-1 0 0,0-1 1 0 0,0 1-1 0 0,0 0 0 0 0,0 0 1 0 0,0 0-1 0 0,0 0 1 0 0,0 0-1 0 0,1 0 6 0 0,2 1-5 0 0,1-1-1 0 0,0 1 1 0 0,-1 0-1 0 0,1 1 1 0 0,-1 0 0 0 0,0-1-1 0 0,4 3 6 0 0,11 7 26 0 0,-1 1 1 0 0,0 1-1 0 0,-1 1 0 0 0,11 11-26 0 0,-10-9 125 0 0,0-1 0 0 0,1 0 0 0 0,19 10-125 0 0,-34-23 22 0 0,0 0-1 0 0,-1-1 0 0 0,1 1 1 0 0,0-1-1 0 0,0 0 1 0 0,0 0-1 0 0,0-1 1 0 0,0 1-1 0 0,0-1 1 0 0,0 0-1 0 0,1-1 1 0 0,-1 1-1 0 0,0-1 1 0 0,0 0-1 0 0,0 0 1 0 0,-1 0-1 0 0,1-1 1 0 0,0 0-1 0 0,0 0 1 0 0,-1 0-1 0 0,2-1-21 0 0,4-3-18 0 0,0 0 1 0 0,-1 0-1 0 0,1-1 0 0 0,-1 0 1 0 0,-1-1-1 0 0,1 0 0 0 0,-1 0 0 0 0,6-9 18 0 0,-10 12-34 0 0,0 0-1 0 0,-1 0 0 0 0,0 0 1 0 0,0 0-1 0 0,0-1 0 0 0,0 1 1 0 0,-1-1-1 0 0,0 0 0 0 0,0 0 1 0 0,-1 1-1 0 0,1-1 0 0 0,-2 0 1 0 0,1-1-1 0 0,0 1 0 0 0,-1 0 1 0 0,0 0-1 0 0,-1 0 0 0 0,1 0 1 0 0,-1 0-1 0 0,-1-4 35 0 0,1 8-6 0 0,1 0-1 0 0,-1 0 1 0 0,1 0 0 0 0,-1 1-1 0 0,0-1 1 0 0,0 0 0 0 0,0 1-1 0 0,0-1 1 0 0,0 1-1 0 0,0-1 1 0 0,0 1 0 0 0,-1 0-1 0 0,1-1 1 0 0,0 1 0 0 0,-1 0-1 0 0,1 0 1 0 0,-1 0 0 0 0,0 0-1 0 0,1 0 1 0 0,-1 0 0 0 0,-1 0 6 0 0,0 0-18 0 0,0 0 0 0 0,0 1 1 0 0,0 0-1 0 0,0-1 1 0 0,0 1-1 0 0,0 0 1 0 0,0 1-1 0 0,0-1 1 0 0,0 0-1 0 0,0 1 1 0 0,1 0-1 0 0,-4 0 18 0 0,-3 2-35 0 0,1 1 0 0 0,0 0 0 0 0,0 0 0 0 0,0 0 0 0 0,0 1 0 0 0,1 0 0 0 0,-1 1 0 0 0,-3 3 35 0 0,1 2 41 0 0,0 0 0 0 0,0 1-1 0 0,1 0 1 0 0,1 1 0 0 0,0-1-1 0 0,1 2 1 0 0,0-1 0 0 0,1 1 0 0 0,1 0-1 0 0,0 0 1 0 0,-2 9-41 0 0,4-11 32 0 0,1 1 0 0 0,0-1 0 0 0,0 0 0 0 0,1 0 0 0 0,1 1 0 0 0,0-1 0 0 0,1 1 0 0 0,0-1 0 0 0,1 0 0 0 0,0 0 0 0 0,1 1 0 0 0,0-1 0 0 0,1-1 0 0 0,2 4-32 0 0,-4-10-109 0 0,1 0-1 0 0,0 0 1 0 0,0-1 0 0 0,0 1-1 0 0,0-1 1 0 0,0 0 0 0 0,1 0 0 0 0,0 0-1 0 0,0-1 1 0 0,0 1 0 0 0,0-1-1 0 0,1 0 1 0 0,-1 0 0 0 0,1 0-1 0 0,0-1 1 0 0,0 1 0 0 0,0-1-1 0 0,0-1 1 0 0,0 1 0 0 0,0-1-1 0 0,0 0 1 0 0,1 0 0 0 0,-1 0-1 0 0,1 0 1 0 0,-1-1 0 0 0,2 0 109 0 0,6-1-393 0 0,0 0 1 0 0,1-1 0 0 0,-1 0-1 0 0,0-1 1 0 0,0 0-1 0 0,-1-1 1 0 0,1 0-1 0 0,-1-1 1 0 0,0-1 0 0 0,2-1 392 0 0,5-2-2178 0 0</inkml:trace>
   <inkml:trace contextRef="#ctx0" brushRef="#br0" timeOffset="992.858">1821 300 6448 0 0,'2'-2'264'0'0,"0"1"-1"0"0,0-1 1 0 0,0 0 0 0 0,0 0 0 0 0,0 0 0 0 0,-1 0-1 0 0,1 0 1 0 0,-1 0 0 0 0,0 0 0 0 0,1-1 0 0 0,-1 1-264 0 0,12-28 8431 0 0,-12 25-6893 0 0,2-3-823 0 0,0 0-1 0 0,-1 0 0 0 0,-1-1 1 0 0,1 1-1 0 0,-1 0 0 0 0,-1-1 1 0 0,1 1-1 0 0,-1-1 0 0 0,-1-4-714 0 0,0 8 137 0 0,0 0-1 0 0,0-1 1 0 0,0 1-1 0 0,0 0 1 0 0,-1 0 0 0 0,0 0-1 0 0,0 0 1 0 0,0 0-1 0 0,-1 1 1 0 0,1-1-1 0 0,-1 1 1 0 0,0-1-1 0 0,-1 1 1 0 0,1 0-1 0 0,-3-2-136 0 0,4 4 26 0 0,0 1 0 0 0,0 0-1 0 0,0 0 1 0 0,0 0 0 0 0,0 0-1 0 0,0 0 1 0 0,0 0 0 0 0,0 1-1 0 0,0-1 1 0 0,0 1-1 0 0,-1-1 1 0 0,1 1 0 0 0,0 0-1 0 0,0 0 1 0 0,0 0 0 0 0,-1 0-1 0 0,1 0 1 0 0,0 1-1 0 0,0-1 1 0 0,-1 1 0 0 0,1-1-1 0 0,0 1 1 0 0,0 0 0 0 0,0 0-1 0 0,0 0 1 0 0,0 0-1 0 0,0 0 1 0 0,-2 1-26 0 0,-2 2 16 0 0,0 0 0 0 0,0 1 0 0 0,0 0 1 0 0,0 0-1 0 0,1 0 0 0 0,0 0 0 0 0,0 1 0 0 0,0 0-16 0 0,-7 12 27 0 0,1 0 0 0 0,1 0 0 0 0,1 1 0 0 0,0 0 0 0 0,2 1 1 0 0,0 0-1 0 0,1 0 0 0 0,1 0 0 0 0,1 1 0 0 0,1 1-27 0 0,2-15 17 0 0,0 1 0 0 0,1 0 0 0 0,0 0 0 0 0,1 0 0 0 0,0-1 0 0 0,0 1 0 0 0,0 0 0 0 0,2 3-17 0 0,-2-9 10 0 0,-1 0-1 0 0,1 0 0 0 0,0 0 1 0 0,0 0-1 0 0,0 1 1 0 0,0-1-1 0 0,1-1 1 0 0,-1 1-1 0 0,1 0 0 0 0,-1 0 1 0 0,1 0-1 0 0,-1-1 1 0 0,2 2-10 0 0,-1-3 9 0 0,-1 1 1 0 0,0 0 0 0 0,1 0-1 0 0,-1-1 1 0 0,1 1 0 0 0,-1-1 0 0 0,1 0-1 0 0,0 1 1 0 0,-1-1 0 0 0,1 0-1 0 0,-1 0 1 0 0,1 0 0 0 0,-1 0-1 0 0,1 0 1 0 0,0 0 0 0 0,-1 0 0 0 0,1-1-1 0 0,-1 1 1 0 0,1 0 0 0 0,-1-1-1 0 0,2 0-9 0 0,5-2 59 0 0,0-1-1 0 0,0 0 1 0 0,0 0-1 0 0,-1-1 1 0 0,0 0-1 0 0,0-1 1 0 0,0 1-1 0 0,2-4-58 0 0,7-6 142 0 0,-1-2-1 0 0,10-13-141 0 0,-18 21 17 0 0,-1 0 0 0 0,0-1 0 0 0,-1 0 0 0 0,0 0 0 0 0,0 0-1 0 0,-1-1 1 0 0,-1 0 0 0 0,0 1 0 0 0,2-9-17 0 0,-7 0 53 0 0,2 18-51 0 0,0 1-1 0 0,0 0 0 0 0,0 0 1 0 0,0 0-1 0 0,0 0 0 0 0,0-1 0 0 0,0 1 1 0 0,0 0-1 0 0,0 0 0 0 0,0 0 1 0 0,0-1-1 0 0,0 1 0 0 0,0 0 1 0 0,0 0-1 0 0,0 0 0 0 0,0 0 0 0 0,0 0 1 0 0,-1-1-1 0 0,1 1 0 0 0,0 0 1 0 0,0 0-1 0 0,0 0 0 0 0,0 0 0 0 0,0 0 1 0 0,0 0-1 0 0,-1-1 0 0 0,1 1 1 0 0,0 0-1 0 0,0 0 0 0 0,0 0 0 0 0,0 0 1 0 0,-1 0-1 0 0,1 0 0 0 0,0 0 1 0 0,0 0-1 0 0,0 0 0 0 0,0 0 1 0 0,-1 0-1 0 0,1 0 0 0 0,0 0 0 0 0,0 0 1 0 0,0 0-1 0 0,-1 0 0 0 0,1 0 1 0 0,0 0-1 0 0,0 0 0 0 0,0 0 0 0 0,0 0 1 0 0,-1 0-1 0 0,1 0-1 0 0,-6 6 10 0 0,5-6-10 0 0,-3 4-7 0 0,1 0 0 0 0,0 0-1 0 0,0 1 1 0 0,0-1 0 0 0,0 1 0 0 0,1 0-1 0 0,0-1 1 0 0,0 1 0 0 0,0 0 0 0 0,1 0-1 0 0,-1 0 1 0 0,1 0 0 0 0,0 1 0 0 0,1-1-1 0 0,-1 0 1 0 0,1 4 7 0 0,0 14-39 0 0,1-1 1 0 0,0 0-1 0 0,3 6 39 0 0,-3-17-175 0 0,1 0-1 0 0,1-1 0 0 0,-1 0 1 0 0,1 1-1 0 0,1-1 1 0 0,0 0-1 0 0,1 0 0 0 0,0-1 1 0 0,0 0-1 0 0,1 1 1 0 0,0-2-1 0 0,1 1 0 0 0,7 7 176 0 0,-2-7-6807 0 0,0-4-2254 0 0</inkml:trace>
   <inkml:trace contextRef="#ctx0" brushRef="#br0" timeOffset="1356.718">2182 160 11520 0 0,'-18'-28'1106'0'0,"14"24"-268"0"0,1 1-1 0 0,0-1 0 0 0,-1 1 1 0 0,0 0-1 0 0,0 0 0 0 0,0 0 1 0 0,0 1-1 0 0,0-1 0 0 0,-1 1-837 0 0,3 1 398 0 0,0 0-1 0 0,0 0 1 0 0,-1 0-1 0 0,1 1 1 0 0,0-1-1 0 0,-1 1 0 0 0,1 0 1 0 0,0-1-1 0 0,0 1 1 0 0,-1 0-1 0 0,1 0 1 0 0,0 1-1 0 0,-1-1 1 0 0,1 0-1 0 0,0 1 0 0 0,-1-1 1 0 0,1 1-1 0 0,-1 0-397 0 0,1 0 39 0 0,-1 1 0 0 0,1-1 0 0 0,0 1 0 0 0,-1 0-1 0 0,1-1 1 0 0,0 1 0 0 0,0 0 0 0 0,0 0 0 0 0,0 0-1 0 0,0 1 1 0 0,0 1-39 0 0,-3 2 92 0 0,1 0 0 0 0,1 0 0 0 0,-1 1 0 0 0,1-1 0 0 0,0 1 0 0 0,1 0 0 0 0,-1 0 0 0 0,1 0 0 0 0,0 5-92 0 0,2-9 5 0 0,-1 0 0 0 0,1 0 0 0 0,0 0 0 0 0,0 0 1 0 0,0 0-1 0 0,0 0 0 0 0,1 1 0 0 0,0-1 0 0 0,-1 0 0 0 0,1 0 1 0 0,0 0-1 0 0,0-1 0 0 0,0 1 0 0 0,1 0 0 0 0,-1 0 1 0 0,1 0-1 0 0,0-1 0 0 0,0 1 0 0 0,-1-1 0 0 0,2 0 0 0 0,-1 1 1 0 0,0-1-1 0 0,2 1-5 0 0,9 7 62 0 0,1-2 0 0 0,0 0 0 0 0,0 0 1 0 0,1-1-1 0 0,0-1 0 0 0,4 1-62 0 0,4 1 176 0 0,-1 2 1 0 0,4 3-177 0 0,-19-10 120 0 0,0 2 0 0 0,0-1 0 0 0,-1 1 0 0 0,0 0 0 0 0,0 0 0 0 0,0 1 0 0 0,0 0 0 0 0,2 4-120 0 0,-6-8 42 0 0,0 1-1 0 0,-1-1 1 0 0,1 1-1 0 0,-1 0 1 0 0,0-1 0 0 0,0 1-1 0 0,0 0 1 0 0,0 0-1 0 0,0 0 1 0 0,-1 0-1 0 0,1 0 1 0 0,-1-1-1 0 0,0 1 1 0 0,0 0-1 0 0,0 0 1 0 0,0 0-1 0 0,0 0 1 0 0,-1 0-1 0 0,1 0 1 0 0,-1 0-1 0 0,0 0 1 0 0,0 0-1 0 0,0 1-41 0 0,-1 1 44 0 0,0-1-1 0 0,-1 0 1 0 0,1 0-1 0 0,-1 0 0 0 0,0 0 1 0 0,0 0-1 0 0,0-1 1 0 0,-1 1-1 0 0,1-1 0 0 0,-1 0 1 0 0,0 0-1 0 0,0 0 1 0 0,0 0-1 0 0,-2 0-43 0 0,-11 6 72 0 0,-1-1 0 0 0,0 0 0 0 0,0-1 0 0 0,-1-1 0 0 0,0-1 0 0 0,-8 0-72 0 0,16-3-27 0 0,0 0 1 0 0,1-1-1 0 0,-1-1 1 0 0,0 0-1 0 0,0 0 1 0 0,0-1-1 0 0,0 0 1 0 0,0-1-1 0 0,0 0 0 0 0,1-1 1 0 0,-1 0-1 0 0,-1-2 27 0 0,8 3-289 0 0,-1 0-1 0 0,1-1 1 0 0,0 0-1 0 0,0 1 1 0 0,1-1-1 0 0,-1-1 1 0 0,0 1 289 0 0,-10-11-1211 0 0</inkml:trace>
-  <inkml:trace contextRef="#ctx0" brushRef="#br0" timeOffset="1711.661">2318 93 23927 0 0,'0'0'547'0'0,"0"0"77"0"0,1 0-533 0 0,0 0 0 0 0,-1-1-1 0 0,1 1 1 0 0,0 0 0 0 0,-1 0 0 0 0,1 0 0 0 0,-1-1 0 0 0,1 1-1 0 0,0 0 1 0 0,-1 0 0 0 0,1 0 0 0 0,0 0 0 0 0,-1 0 0 0 0,1 0-1 0 0,0 0 1 0 0,0 1-91 0 0,1 2 54 0 0,1 1 0 0 0,0 1 0 0 0,-1-1 0 0 0,1 0 0 0 0,-1 0 0 0 0,0 1 0 0 0,-1 0-1 0 0,1-1 1 0 0,-1 1 0 0 0,0 0 0 0 0,0 0 0 0 0,0 2-54 0 0,2 8 204 0 0,8 41 550 0 0,-3 1 1 0 0,-1 2-755 0 0,-1 3 5 0 0,9 32-5 0 0,-14-92-209 0 0,8 31 536 0 0,-2-18-2259 0 0,4-4-5640 0 0,-7-7-846 0 0</inkml:trace>
+  <inkml:trace contextRef="#ctx0" brushRef="#br0" timeOffset="1711.66">2318 93 23927 0 0,'0'0'547'0'0,"0"0"77"0"0,1 0-533 0 0,0 0 0 0 0,-1-1-1 0 0,1 1 1 0 0,0 0 0 0 0,-1 0 0 0 0,1 0 0 0 0,-1-1 0 0 0,1 1-1 0 0,0 0 1 0 0,-1 0 0 0 0,1 0 0 0 0,0 0 0 0 0,-1 0 0 0 0,1 0-1 0 0,0 0 1 0 0,0 1-91 0 0,1 2 54 0 0,1 1 0 0 0,0 1 0 0 0,-1-1 0 0 0,1 0 0 0 0,-1 0 0 0 0,0 1 0 0 0,-1 0-1 0 0,1-1 1 0 0,-1 1 0 0 0,0 0 0 0 0,0 0 0 0 0,0 2-54 0 0,2 8 204 0 0,8 41 550 0 0,-3 1 1 0 0,-1 2-755 0 0,-1 3 5 0 0,9 32-5 0 0,-14-92-209 0 0,8 31 536 0 0,-2-18-2259 0 0,4-4-5640 0 0,-7-7-846 0 0</inkml:trace>
   <inkml:trace contextRef="#ctx0" brushRef="#br0" timeOffset="2123.355">2524 46 22055 0 0,'0'0'1011'0'0,"0"0"-20"0"0,5 7-583 0 0,0 2-246 0 0,0-1 0 0 0,0 1 0 0 0,0 0 0 0 0,-1 1 0 0 0,-1-1 0 0 0,1 1 0 0 0,-2 0 0 0 0,1 0-162 0 0,4 25 954 0 0,1 23-954 0 0,-7-48-16 0 0,2 29 436 0 0,-2 40-420 0 0,0 3 1179 0 0,-1-77-1080 0 0,1 0 0 0 0,-1 0 0 0 0,1 0 0 0 0,0 0 0 0 0,0 0 0 0 0,1-1 0 0 0,0 4-99 0 0,0-9 61 0 0,-1 0 0 0 0,0 0 0 0 0,0 0 0 0 0,0 0 1 0 0,0-1-1 0 0,0 1 0 0 0,0 0 0 0 0,0 0 0 0 0,0-1 0 0 0,0 1 0 0 0,0-2-61 0 0,7-19 182 0 0,0-1 1 0 0,-2 0-1 0 0,-1-1 0 0 0,-1 1 0 0 0,1-24-182 0 0,4-17 78 0 0,-2 15-67 0 0,-5 27-16 0 0,1 0 0 0 0,2 1 0 0 0,6-20 5 0 0,-11 39-2 0 0,1 1 0 0 0,-1 0 0 0 0,1 0-1 0 0,-1-1 1 0 0,1 1 0 0 0,-1 0 0 0 0,1 0-1 0 0,0 0 1 0 0,0 0 0 0 0,0 0-1 0 0,0 0 1 0 0,0 0 0 0 0,0 0 0 0 0,0 0-1 0 0,0 0 3 0 0,-1 1-1 0 0,1 0-1 0 0,0 0 0 0 0,-1-1 0 0 0,1 1 1 0 0,0 0-1 0 0,-1 0 0 0 0,1 0 0 0 0,0 0 1 0 0,-1-1-1 0 0,1 1 0 0 0,0 0 0 0 0,-1 0 1 0 0,1 1-1 0 0,0-1 0 0 0,-1 0 0 0 0,1 0 1 0 0,0 0-1 0 0,-1 0 0 0 0,1 0 0 0 0,0 1 2 0 0,1 0-18 0 0,0 1 0 0 0,1-1 0 0 0,-1 0 0 0 0,-1 1-1 0 0,1 0 1 0 0,0-1 0 0 0,0 1 0 0 0,-1 0 0 0 0,1 0 0 0 0,-1 0-1 0 0,1 0 1 0 0,-1 0 0 0 0,1 3 18 0 0,11 22 14 0 0,-2 1 0 0 0,-1 1-1 0 0,-1 0 1 0 0,-2 1 0 0 0,-1 0-1 0 0,-1 0 1 0 0,-1 0 0 0 0,-2 0 0 0 0,-1 1-1 0 0,-2 15-13 0 0,0-39-121 0 0,1-1-1 0 0,0 1 1 0 0,1-1-1 0 0,0 4 122 0 0,6 6-3043 0 0,-7-15 2490 0 0,1 0 0 0 0,-1-1 0 0 0,1 1 1 0 0,0 0-1 0 0,-1-1 0 0 0,1 1 0 0 0,0-1 0 0 0,0 1 1 0 0,-1-1-1 0 0,1 1 0 0 0,0-1 0 0 0,0 1 0 0 0,0-1 1 0 0,0 0-1 0 0,-1 1 0 0 0,2-1 553 0 0,8 1-7842 0 0</inkml:trace>
   <inkml:trace contextRef="#ctx0" brushRef="#br0" timeOffset="6648.553">3079 250 5984 0 0,'0'0'464'0'0,"0"0"117"0"0,-4-3 6280 0 0,-5-5-1648 0 0,4 0-4612 0 0,0 1 0 0 0,1-1 0 0 0,-1 0-1 0 0,2 0 1 0 0,-1 0 0 0 0,1 0 0 0 0,-1-4-601 0 0,-5-14 594 0 0,-2-3 316 0 0,7 18-527 0 0,0 0 0 0 0,-1 0 1 0 0,0 1-1 0 0,-5-9-383 0 0,9 18 21 0 0,0-1 0 0 0,1 1-1 0 0,-2 0 1 0 0,1-1 0 0 0,0 1 0 0 0,0 0 0 0 0,0 0-1 0 0,0 0 1 0 0,-1 0 0 0 0,1 0 0 0 0,-1 0 0 0 0,1 0 0 0 0,-1 0-1 0 0,1 0 1 0 0,-1 1 0 0 0,1-1 0 0 0,-1 0 0 0 0,0 1 0 0 0,1 0-1 0 0,-1-1 1 0 0,0 1 0 0 0,-1 0-21 0 0,1 0 7 0 0,-1 0-1 0 0,0 1 1 0 0,1 0-1 0 0,-1-1 1 0 0,1 1 0 0 0,-1 0-1 0 0,1 0 1 0 0,-1 0-1 0 0,1 1 1 0 0,-1-1 0 0 0,1 0-1 0 0,0 1 1 0 0,-1 1-7 0 0,-6 4-39 0 0,0 2 0 0 0,1 0 0 0 0,0 0 0 0 0,1 0 0 0 0,-1 1 1 0 0,2 0 38 0 0,-4 5-33 0 0,1 2 1 0 0,0-1 0 0 0,1 1 0 0 0,1 0 0 0 0,1 0-1 0 0,-2 12 33 0 0,5-20 0 0 0,1 1 0 0 0,1-1-1 0 0,-1 0 1 0 0,1 0-1 0 0,1 1 1 0 0,0-1-1 0 0,0 1 1 0 0,1-1 0 0 0,1 0-1 0 0,-1 1 1 0 0,1-1-1 0 0,1 0 1 0 0,2 8 0 0 0,-3-13 29 0 0,0 0-1 0 0,0 0 1 0 0,0-1 0 0 0,0 1-1 0 0,1-1 1 0 0,-1 1 0 0 0,1-1 0 0 0,0 0-1 0 0,0 0 1 0 0,0 0 0 0 0,0-1-1 0 0,0 1 1 0 0,1-1 0 0 0,-1 1 0 0 0,1-1-1 0 0,0 0 1 0 0,0 0 0 0 0,0-1-1 0 0,-1 1 1 0 0,2-1 0 0 0,-1 0-1 0 0,0 0 1 0 0,0 0 0 0 0,0-1 0 0 0,0 1-1 0 0,1-1 1 0 0,-1 0 0 0 0,0 0-1 0 0,0-1 1 0 0,0 1 0 0 0,1-1 0 0 0,-1 0-1 0 0,0 0 1 0 0,0 0 0 0 0,0-1-1 0 0,0 1 1 0 0,-1-1 0 0 0,1 0 0 0 0,0 0-1 0 0,-1 0 1 0 0,1-1 0 0 0,-1 1-1 0 0,1-1 1 0 0,-1 0 0 0 0,1-2-29 0 0,4-3 95 0 0,-1 0 1 0 0,0-1-1 0 0,-1 0 1 0 0,0 0 0 0 0,0-1-1 0 0,4-10-95 0 0,-7 14 38 0 0,-1 0 1 0 0,0-1-1 0 0,0 0 0 0 0,0 1 0 0 0,-1-1 0 0 0,1 0 0 0 0,-2 0 1 0 0,1 0-1 0 0,-1 0 0 0 0,0 0 0 0 0,-1-4-38 0 0,1 10 13 0 0,0 0 0 0 0,0 0-1 0 0,0 0 1 0 0,-1 0 0 0 0,1 0 0 0 0,0 0-1 0 0,-1 0 1 0 0,1 1 0 0 0,0-1 0 0 0,-1 0-1 0 0,1 0 1 0 0,-1 0 0 0 0,0 0-13 0 0,1 1 11 0 0,0 0-1 0 0,-1-1 1 0 0,1 1 0 0 0,0 0 0 0 0,0 0 0 0 0,-1 0-1 0 0,1 0 1 0 0,0 0 0 0 0,0 0 0 0 0,-1-1 0 0 0,1 1-1 0 0,0 0 1 0 0,0 0 0 0 0,-1 0 0 0 0,1 0 0 0 0,0 0-1 0 0,-1 0 1 0 0,1 0 0 0 0,0 0 0 0 0,0 0 0 0 0,-1 0-1 0 0,1 0 1 0 0,0 0 0 0 0,-1 1 0 0 0,1-1 0 0 0,0 0-1 0 0,0 0 1 0 0,-1 0-11 0 0,0 1 25 0 0,0 0 0 0 0,0-1-1 0 0,0 1 1 0 0,0 0 0 0 0,1 0-1 0 0,-1 0 1 0 0,0 0 0 0 0,0 0-1 0 0,1 0 1 0 0,-1 0 0 0 0,0 1 0 0 0,1-1-1 0 0,-1 0 1 0 0,1 0 0 0 0,-1 0-1 0 0,1 1 1 0 0,0 0-25 0 0,-2 12 56 0 0,1 0 0 0 0,0 0 0 0 0,1 0 0 0 0,1 0 0 0 0,0-1-1 0 0,1 4-55 0 0,2 21 114 0 0,1 32 118 0 0,2 15 80 0 0,-4 0-1 0 0,-7 61-311 0 0,1-118 47 0 0,-3 40 326 0 0,-4 8-373 0 0,6-55 91 0 0,-1 0-1 0 0,-1-1 0 0 0,0 1 1 0 0,-2-1-1 0 0,-6 13-90 0 0,10-26 27 0 0,0 0 0 0 0,-1 0 1 0 0,1 0-1 0 0,-2 0 0 0 0,1-1 0 0 0,0 0 0 0 0,-1 0 0 0 0,0-1 1 0 0,-1 1-1 0 0,1-1 0 0 0,-1-1 0 0 0,0 1 0 0 0,0-1 1 0 0,-1 0-1 0 0,1-1 0 0 0,-1 0 0 0 0,-5 2-27 0 0,2-2 25 0 0,-1-1 1 0 0,1 0-1 0 0,0 0 0 0 0,-1-1 0 0 0,1-1 1 0 0,-1 0-1 0 0,1 0 0 0 0,-1-1 1 0 0,1-1-1 0 0,-1 0 0 0 0,1 0 0 0 0,-7-3-25 0 0,2-1 11 0 0,0 0-1 0 0,1 0 0 0 0,-1-2 1 0 0,2 0-1 0 0,-1 0 1 0 0,1-1-1 0 0,-10-9-10 0 0,15 11 6 0 0,0-1 1 0 0,1 0-1 0 0,0 0 0 0 0,1-1 1 0 0,0 0-1 0 0,0 0 1 0 0,1-1-1 0 0,0 1 0 0 0,0-1 1 0 0,1-1-1 0 0,-3-9-6 0 0,7 15-8 0 0,-1 1 0 0 0,1 0 0 0 0,0-1 0 0 0,1 1 0 0 0,-1 0 0 0 0,1-1 0 0 0,0 1 0 0 0,0-1 0 0 0,0 1 0 0 0,1-1 0 0 0,-1 1 0 0 0,1-1 0 0 0,0 1 0 0 0,0 0 0 0 0,1 0 0 0 0,-1-1-1 0 0,1 1 1 0 0,0 0 0 0 0,2-3 8 0 0,2-1-49 0 0,-1 1 0 0 0,1 0 0 0 0,1 0-1 0 0,-1 1 1 0 0,1 0 0 0 0,0 0 0 0 0,0 0-1 0 0,1 1 1 0 0,2-1 49 0 0,42-24-4121 0 0,33-13 4121 0 0,-52 27-1439 0 0</inkml:trace>
   <inkml:trace contextRef="#ctx0" brushRef="#br0" timeOffset="-735.888">4 190 23783 0 0,'0'-7'2552'0'0,"9"18"-2444"0"0,-2 15-12 0 0,0 0 0 0 0,-2 0 0 0 0,0 1 0 0 0,-2 0-1 0 0,-1 0 1 0 0,-1 3-96 0 0,2 19-2004 0 0,2 4 2004 0 0,-4-51-144 0 0,-1-1 0 0 0,0 0-1 0 0,0 0 1 0 0,0 0-1 0 0,0 0 1 0 0,0 0-1 0 0,0 0 1 0 0,1 0 0 0 0,-1 0-1 0 0,0 0 1 0 0,1 0-1 0 0,-1 0 1 0 0,1 0-1 0 0,-1 0 1 0 0,1 0-1 0 0,-1 0 1 0 0,1 0-1 0 0,0-1 1 0 0,-1 1 0 0 0,1 0-1 0 0,0 0 1 0 0,0-1 144 0 0,4 0-1310 0 0</inkml:trace>
@@ -1589,7 +1589,7 @@
   <inkml:trace contextRef="#ctx0" brushRef="#br0" timeOffset="46332.644">333 1751 21967 0 0,'-11'-5'1674'0'0,"-1"1"-1394"0"0,1 1 0 0 0,0 0 1 0 0,-1 1-1 0 0,1 0 1 0 0,-1 1-1 0 0,0 0 0 0 0,-1 1-280 0 0,-8-2 895 0 0,11 2-544 0 0,0 0 1 0 0,-1 1 0 0 0,1 0-1 0 0,0 0 1 0 0,0 1 0 0 0,1 0-1 0 0,-7 3-351 0 0,14-4 22 0 0,1-1 0 0 0,-1 1-1 0 0,0 0 1 0 0,0 0 0 0 0,0 0-1 0 0,1 0 1 0 0,-1 1 0 0 0,1-1-1 0 0,-1 0 1 0 0,1 1 0 0 0,-1-1-1 0 0,1 1 1 0 0,0-1 0 0 0,-1 1-1 0 0,1-1 1 0 0,0 1 0 0 0,0 0 0 0 0,0 0-1 0 0,1 0 1 0 0,-1 0 0 0 0,0 0-1 0 0,1-1 1 0 0,-1 1 0 0 0,1 0-1 0 0,0 0 1 0 0,-1 1-22 0 0,1 0 28 0 0,0 0 0 0 0,0 0 0 0 0,0 0 0 0 0,1 0 0 0 0,-1 0 0 0 0,1 0 0 0 0,-1 0 0 0 0,1 0 0 0 0,0 0 0 0 0,0-1 0 0 0,0 1 0 0 0,1 0 0 0 0,-1-1 0 0 0,0 1 0 0 0,1-1 0 0 0,0 1 0 0 0,1 1-28 0 0,4 3 24 0 0,1 0 0 0 0,-1-1 0 0 0,1 0 0 0 0,1 0 0 0 0,-1 0 0 0 0,1-1 0 0 0,0-1 0 0 0,0 1 0 0 0,1-2 0 0 0,4 2-24 0 0,37 14 55 0 0,-24-10 5 0 0,0 1 0 0 0,-1 2 1 0 0,0 0-1 0 0,0 3-60 0 0,-22-13 16 0 0,-1 0 0 0 0,0 0 0 0 0,0 1 0 0 0,0-1 0 0 0,0 1-1 0 0,0 0 1 0 0,-1 0 0 0 0,1 0 0 0 0,-1 0 0 0 0,0 1-16 0 0,-1-3 7 0 0,0 0-1 0 0,-1 0 0 0 0,1 0 1 0 0,-1 0-1 0 0,0 0 1 0 0,1 0-1 0 0,-1 1 1 0 0,0-1-1 0 0,0 0 1 0 0,1 0-1 0 0,-1 1 1 0 0,0-1-1 0 0,0 0 0 0 0,0 0 1 0 0,-1 0-1 0 0,1 1 1 0 0,0-1-1 0 0,0 0 1 0 0,-1 0-1 0 0,1 0 1 0 0,-1 1-1 0 0,1-1 1 0 0,-1 0-1 0 0,1 0 0 0 0,-1 0 1 0 0,0 0-1 0 0,1 0 1 0 0,-1 0-1 0 0,0 0 1 0 0,0 0-1 0 0,0-1 1 0 0,0 1-1 0 0,0 0-6 0 0,-4 3 34 0 0,-1 0 0 0 0,1-1 0 0 0,-1 1 0 0 0,0-1 1 0 0,0 0-1 0 0,0-1 0 0 0,-1 0 0 0 0,1 0 0 0 0,-1 0 0 0 0,1 0 0 0 0,-7-1-34 0 0,-7 2 81 0 0,0-2 0 0 0,-1 0-1 0 0,-4-2-80 0 0,15 1 117 0 0,1-1 0 0 0,0 0 0 0 0,-1-1 0 0 0,1 0 0 0 0,0 0 0 0 0,0-1 0 0 0,0 0 0 0 0,-5-3-117 0 0,10 4-145 0 0,0 0 0 0 0,0 0 0 0 0,1-1 0 0 0,-1 0 0 0 0,1 0 0 0 0,-1 0 0 0 0,1 0 0 0 0,-2-2 145 0 0,3 2-461 0 0,0 0 0 0 0,0 0 0 0 0,0 0 0 0 0,1 0 0 0 0,-1 0 0 0 0,1 0 0 0 0,0 0 0 0 0,0-1 0 0 0,0 1 0 0 0,0-1 0 0 0,0-2 461 0 0,0-7-9638 0 0</inkml:trace>
   <inkml:trace contextRef="#ctx0" brushRef="#br0" timeOffset="46912.147">494 1686 23583 0 0,'0'0'1083'0'0,"0"8"352"0"0,-3 30-841 0 0,2 0 0 0 0,2 0 0 0 0,1 0 0 0 0,2-1 0 0 0,8 34-594 0 0,7 12 269 0 0,-17-72-254 0 0,-2-7-8 0 0,1 0 0 0 0,0-1 0 0 0,0 1 0 0 0,0 0 0 0 0,0-1-1 0 0,1 2-6 0 0,-2-5 158 0 0,0 0 15 0 0,0 0 0 0 0,2-60 111 0 0,2 1 0 0 0,3-1-1 0 0,9-28-283 0 0,-16 86 0 0 0,4-18 35 0 0,1 0 0 0 0,2-3-35 0 0,-6 19 6 0 0,1-1 0 0 0,0 0 0 0 0,0 1 0 0 0,0-1 0 0 0,1 1 0 0 0,0 0 0 0 0,-1 0 0 0 0,2 0 0 0 0,-1 0 0 0 0,0 0 0 0 0,3-1-6 0 0,-5 4-2 0 0,-1 0 1 0 0,1 0-1 0 0,0 1 0 0 0,0-1 1 0 0,0 0-1 0 0,0 1 0 0 0,1-1 1 0 0,-1 1-1 0 0,0-1 0 0 0,0 1 1 0 0,0 0-1 0 0,0-1 0 0 0,0 1 0 0 0,1 0 1 0 0,-1 0-1 0 0,0 0 0 0 0,0 0 1 0 0,0 0-1 0 0,1 0 0 0 0,-1 0 1 0 0,0 0-1 0 0,0 1 0 0 0,1-1 2 0 0,0 1-6 0 0,-1 0-1 0 0,1 0 1 0 0,-1 0-1 0 0,1 0 1 0 0,-1 0-1 0 0,1 0 0 0 0,-1 1 1 0 0,0-1-1 0 0,1 0 1 0 0,-1 1-1 0 0,0-1 1 0 0,0 1-1 0 0,1 1 7 0 0,2 4-21 0 0,-1 1 1 0 0,0-1-1 0 0,0 1 0 0 0,0 0 1 0 0,-1 0-1 0 0,0 2 21 0 0,9 46 40 0 0,-3 2-1 0 0,-2-1 1 0 0,-2 46-40 0 0,-4-102 81 0 0,0-1 3 0 0,1-5-11 0 0,0 1-1 0 0,1-1 1 0 0,-1 1-1 0 0,-1-1 1 0 0,1 0 0 0 0,-1 0-1 0 0,0 0-72 0 0,2-9 64 0 0,5-44 0 0 0,3 1 0 0 0,9-26-64 0 0,-17 77 0 0 0,13-40 0 0 0,-14 42 0 0 0,1 1 0 0 0,0-1 0 0 0,0 0 0 0 0,0 1 0 0 0,0-1 0 0 0,1 1 0 0 0,-1 0 0 0 0,1 0 0 0 0,0 0 0 0 0,1 0 0 0 0,-3 2-7 0 0,0 0 0 0 0,0 0 0 0 0,1 0 0 0 0,-1 1 1 0 0,0-1-1 0 0,0 0 0 0 0,1 1 0 0 0,-1 0 0 0 0,1-1 0 0 0,-1 1 0 0 0,0 0 0 0 0,1-1 0 0 0,-1 1 0 0 0,1 0 1 0 0,-1 0-1 0 0,1 0 0 0 0,-1 0 0 0 0,1 0 0 0 0,-1 1 0 0 0,0-1 0 0 0,1 0 0 0 0,-1 1 0 0 0,1-1 0 0 0,-1 1 0 0 0,0-1 1 0 0,1 1-1 0 0,-1 0 0 0 0,0 0 0 0 0,0-1 0 0 0,0 1 0 0 0,1 0 0 0 0,-1 0 0 0 0,0 0 0 0 0,0 0 0 0 0,0 0 1 0 0,-1 1-1 0 0,2-1 7 0 0,2 4 5 0 0,-1 0 0 0 0,1 0 0 0 0,-1 0 0 0 0,0 0 0 0 0,0 1 0 0 0,-1-1 0 0 0,1 1 0 0 0,-1 1-5 0 0,5 20 10 0 0,-2-1 0 0 0,-1 1 1 0 0,-1 0-1 0 0,-2 0 0 0 0,0 18-10 0 0,2 41-483 0 0,-3-83 63 0 0,0-1 0 0 0,0 0 0 0 0,1 1 0 0 0,-1-1-1 0 0,0 0 1 0 0,1 1 0 0 0,0-1 0 0 0,0 0 0 0 0,-1 0-1 0 0,1 0 1 0 0,1 1 0 0 0,-1-1 0 0 0,1 0 420 0 0,5 5-9402 0 0</inkml:trace>
   <inkml:trace contextRef="#ctx0" brushRef="#br0" timeOffset="47283.454">1139 1973 10592 0 0,'0'-3'321'0'0,"1"-1"0"0"0,-1 1 0 0 0,1-1 1 0 0,0 1-1 0 0,0-1 0 0 0,1 1 0 0 0,0-2-321 0 0,5-17 4282 0 0,-5 10-3165 0 0,0 0 0 0 0,-1 0 0 0 0,0 0 0 0 0,-1 0 0 0 0,-1 0 0 0 0,-1-6-1117 0 0,2 13 192 0 0,-1-1 0 0 0,-1 1 0 0 0,1-1 1 0 0,-1 1-1 0 0,0 0 0 0 0,0-1 0 0 0,0 1 1 0 0,-1 0-1 0 0,0 1 0 0 0,0-1 0 0 0,0 0 1 0 0,-1 1-1 0 0,1 0 0 0 0,-1 0 0 0 0,0-1-192 0 0,2 4 69 0 0,1 0 0 0 0,-1 0 0 0 0,1 0 0 0 0,0 0 0 0 0,-1 0 0 0 0,0 0 0 0 0,1 0 0 0 0,-1 0 0 0 0,0 1 0 0 0,1-1 0 0 0,-1 1-1 0 0,0-1 1 0 0,1 1 0 0 0,-1 0 0 0 0,0-1 0 0 0,0 1 0 0 0,0 0 0 0 0,1 0 0 0 0,-3 1-69 0 0,1-1 66 0 0,0 1-1 0 0,1 0 1 0 0,-1 0-1 0 0,0 0 1 0 0,0 0 0 0 0,1 1-1 0 0,-1-1 1 0 0,1 1 0 0 0,-1-1-1 0 0,1 1 1 0 0,-2 1-66 0 0,-4 6 88 0 0,0-1 0 0 0,0 1 0 0 0,0 1 0 0 0,1-1 0 0 0,-3 7-88 0 0,5-7 7 0 0,0 0 0 0 0,1 1-1 0 0,0-1 1 0 0,0 1 0 0 0,1 0-1 0 0,0-1 1 0 0,0 4-7 0 0,2-8 2 0 0,0 0 0 0 0,1 0 0 0 0,-1 0 0 0 0,1 0 0 0 0,0 0 0 0 0,0 0 0 0 0,1 0 0 0 0,-1 0 0 0 0,1 0-1 0 0,0 0 1 0 0,0 0 0 0 0,1 0 0 0 0,0 0 0 0 0,0 0 0 0 0,1 2-2 0 0,-2-5 6 0 0,0 0-1 0 0,0-1 1 0 0,1 1 0 0 0,-1 0-1 0 0,0-1 1 0 0,1 1 0 0 0,-1-1-1 0 0,1 0 1 0 0,0 1 0 0 0,-1-1-1 0 0,1 0 1 0 0,0 0 0 0 0,0 0-1 0 0,0 0 1 0 0,0 0 0 0 0,-1-1-1 0 0,1 1 1 0 0,0 0 0 0 0,0-1-6 0 0,1 0 20 0 0,0 1 0 0 0,0-1 0 0 0,0 0 0 0 0,0-1 0 0 0,0 1 0 0 0,0 0 1 0 0,0-1-1 0 0,0 0 0 0 0,0 0 0 0 0,0 1 0 0 0,0-2 0 0 0,0 1-20 0 0,5-3 49 0 0,0 0 0 0 0,-1-1 0 0 0,1 0 0 0 0,-1 0-1 0 0,0-1 1 0 0,-1 0 0 0 0,1 0 0 0 0,1-3-49 0 0,1 0 22 0 0,-1-1 0 0 0,-1 0 0 0 0,1 0 0 0 0,-2 0 0 0 0,1-1 0 0 0,-2 0 0 0 0,1 0 0 0 0,-2-1 0 0 0,1 0 0 0 0,-1-1-22 0 0,-3 2 37 0 0,-1 11-35 0 0,0 0-1 0 0,0 0 0 0 0,-1 0 1 0 0,1 0-1 0 0,0 0 1 0 0,0 0-1 0 0,0 0 1 0 0,0 0-1 0 0,0 0 0 0 0,0 0 1 0 0,0 0-1 0 0,0 0 1 0 0,0 0-1 0 0,0 0 1 0 0,0 0-1 0 0,0 0 0 0 0,-1 0 1 0 0,1 0-1 0 0,0-1 1 0 0,0 1-1 0 0,0 0 1 0 0,0 1-1 0 0,0-1 1 0 0,0 0-1 0 0,0 0 0 0 0,0 0 1 0 0,0 0-1 0 0,0 0 1 0 0,0 0-1 0 0,-1 0 1 0 0,1 0-1 0 0,0 0 0 0 0,0 0 1 0 0,0 0-1 0 0,0 0 1 0 0,0 0-1 0 0,0 0 1 0 0,0 0-1 0 0,0 0 0 0 0,0 0 1 0 0,0 0-1 0 0,0 0 1 0 0,0 0-1 0 0,0 0 1 0 0,0 0-1 0 0,0 1 1 0 0,0-1-1 0 0,0 0 0 0 0,0 0 1 0 0,0 0-1 0 0,0 0 1 0 0,-1 0-1 0 0,1 0 1 0 0,0 0-1 0 0,0 0-1 0 0,-1 2 12 0 0,0 0-1 0 0,0 0 1 0 0,0 0-1 0 0,0 1 1 0 0,0-1-1 0 0,1 0 1 0 0,-1 0-1 0 0,0 1-11 0 0,0 8-14 0 0,0 0 0 0 0,1 0 0 0 0,0 0 0 0 0,1 0 0 0 0,0 0 0 0 0,2 8 14 0 0,5 18-2530 0 0,4 9 2530 0 0,-12-46-22 0 0,6 19-6795 0 0,2-1-2209 0 0</inkml:trace>
-  <inkml:trace contextRef="#ctx0" brushRef="#br0" timeOffset="47796.192">1374 1255 23583 0 0,'-2'-18'1802'0'0,"2"17"-1236"0"0,0 10-350 0 0,-7 144 1080 0 0,6 0 0 0 0,20 147-1296 0 0,-11-243 175 0 0,1 14-349 0 0,-7-60 84 0 0,0-4-1422 0 0,-2-2-2307 0 0,0-5-4792 0 0</inkml:trace>
+  <inkml:trace contextRef="#ctx0" brushRef="#br0" timeOffset="47796.191">1374 1255 23583 0 0,'-2'-18'1802'0'0,"2"17"-1236"0"0,0 10-350 0 0,-7 144 1080 0 0,6 0 0 0 0,20 147-1296 0 0,-11-243 175 0 0,1 14-349 0 0,-7-60 84 0 0,0-4-1422 0 0,-2-2-2307 0 0,0-5-4792 0 0</inkml:trace>
   <inkml:trace contextRef="#ctx0" brushRef="#br0" timeOffset="48161.378">1470 1208 21711 0 0,'0'0'994'0'0,"0"0"-22"0"0,9 10-558 0 0,-5 8-92 0 0,0 0-1 0 0,-1 0 0 0 0,-1 1 0 0 0,0-1 1 0 0,-1 0-1 0 0,-2 6-321 0 0,3 25 924 0 0,3 127 488 0 0,-4-80-1042 0 0,4 0 0 0 0,9 35-370 0 0,-12-93 11 0 0,0-3-939 0 0,3-14-3079 0 0,-5-20 1737 0 0,0-1-24 0 0</inkml:trace>
   <inkml:trace contextRef="#ctx0" brushRef="#br0" timeOffset="48637.257">1650 1886 20815 0 0,'0'0'472'0'0,"0"0"68"0"0,16 4 736 0 0,-13-4-1132 0 0,0 1 0 0 0,0 0 0 0 0,0-1 0 0 0,0 1 0 0 0,1-1 0 0 0,-1 0 1 0 0,0 0-1 0 0,0 0 0 0 0,0 0 0 0 0,0-1 0 0 0,0 1 0 0 0,0-1 0 0 0,0 0 0 0 0,0 0-144 0 0,8-3 987 0 0,0 0 1 0 0,0-1-1 0 0,0-1-987 0 0,4-1 410 0 0,1-1-254 0 0,0 0-1 0 0,-1 0 1 0 0,14-11-156 0 0,-25 16 18 0 0,0 0 1 0 0,0-1 0 0 0,-1 1 0 0 0,1-1-1 0 0,-1 1 1 0 0,0-1 0 0 0,1 0-1 0 0,-2 0 1 0 0,1-1 0 0 0,0 1-1 0 0,-1-1 1 0 0,0 1 0 0 0,0-1-1 0 0,0 0 1 0 0,0-4-19 0 0,-1 8 5 0 0,-1-1-1 0 0,0 1 1 0 0,1 0-1 0 0,-1-1 1 0 0,0 1 0 0 0,0-1-1 0 0,0 1 1 0 0,0-1-1 0 0,0 1 1 0 0,-1-1 0 0 0,1 1-1 0 0,0 0 1 0 0,-1-1-1 0 0,1 1 1 0 0,-1-1 0 0 0,1 1-1 0 0,-1 0 1 0 0,1 0-1 0 0,-1-1 1 0 0,0 1 0 0 0,0 0-1 0 0,0 0 1 0 0,0 0-1 0 0,0 0 1 0 0,0 0 0 0 0,0 0-1 0 0,0 0 1 0 0,0 0-1 0 0,0 0 1 0 0,-1 0 0 0 0,1 1-1 0 0,0-1 1 0 0,0 0-1 0 0,-1 1 1 0 0,1-1 0 0 0,0 1-1 0 0,-1-1 1 0 0,1 1-1 0 0,-1 0 1 0 0,1 0 0 0 0,-1 0-1 0 0,1 0 1 0 0,-1 0-5 0 0,-3-1-16 0 0,0 1 0 0 0,-1 1 0 0 0,1-1 1 0 0,0 1-1 0 0,0 0 0 0 0,0 0 0 0 0,-1 0 0 0 0,1 1 1 0 0,1-1-1 0 0,-1 1 0 0 0,-3 2 16 0 0,1 1 46 0 0,1-1-1 0 0,0 1 0 0 0,0 1 1 0 0,0-1-1 0 0,1 1 1 0 0,0 0-1 0 0,0 0 1 0 0,0 0-1 0 0,1 1 0 0 0,0 0 1 0 0,0 0-1 0 0,1 0 1 0 0,0 0-1 0 0,-2 5-45 0 0,2-1 71 0 0,-1 0-1 0 0,1 0 1 0 0,1 1 0 0 0,0-1-1 0 0,0 1 1 0 0,1 0 0 0 0,1-1-1 0 0,0 1 1 0 0,1 6-71 0 0,0-14-5 0 0,-1 0-1 0 0,1 0 1 0 0,0 0-1 0 0,0 0 1 0 0,0 0-1 0 0,0-1 1 0 0,1 1 0 0 0,0-1-1 0 0,-1 1 1 0 0,1-1-1 0 0,1 1 1 0 0,-1-1-1 0 0,0 0 1 0 0,1 0-1 0 0,-1 0 1 0 0,1 0 0 0 0,0-1-1 0 0,0 1 1 0 0,0-1-1 0 0,1 0 1 0 0,-1 1-1 0 0,0-1 1 0 0,1-1-1 0 0,-1 1 1 0 0,1-1-1 0 0,0 1 1 0 0,2 0 5 0 0,2-1-31 0 0,-1 1 0 0 0,0-1 0 0 0,1-1 0 0 0,-1 0 0 0 0,1 0 1 0 0,-1 0-1 0 0,1-1 0 0 0,-1 0 0 0 0,1 0 0 0 0,-1-1 0 0 0,0 0 0 0 0,0 0 0 0 0,0 0 0 0 0,2-2 31 0 0,1-1-840 0 0,0 0-1 0 0,-1 0 1 0 0,1-1 0 0 0,-1-1-1 0 0,0 1 1 0 0,-1-2 0 0 0,0 1-1 0 0,0-1 1 0 0,6-7 840 0 0,-5 3-1739 0 0,-1 0-1 0 0,0 0 1 0 0,-1 0-1 0 0,-1-1 1 0 0,0 0-1 0 0,0 0 1 0 0,0-6 1739 0 0,-2 9-954 0 0,7-19 5365 0 0,-10 28-2528 0 0,-1 1 182 0 0,0 0 41 0 0,0 0-148 0 0,0 0-649 0 0,0 15 1598 0 0,-1 9-1707 0 0,1 17 492 0 0,3 10-1692 0 0,-2-37 309 0 0,1 0 0 0 0,1-1 0 0 0,0 1 0 0 0,1-1 0 0 0,3 9-309 0 0,-7-21 84 0 0,0-1-11 0 0,0 0 14 0 0,4-14 426 0 0,-4 6-481 0 0,-1-1 0 0 0,-1 1 0 0 0,0 0 0 0 0,0 0 1 0 0,-3-6-33 0 0,-3-16 23 0 0,3 9-8 0 0,0 4 49 0 0,2-1 1 0 0,0 1-1 0 0,1-1 0 0 0,0-7-64 0 0,2 20 12 0 0,0 1 0 0 0,0-1 0 0 0,1 1 0 0 0,0-1 0 0 0,0 1 0 0 0,0-1 0 0 0,0 1 0 0 0,0-1-1 0 0,1 1 1 0 0,0 0 0 0 0,0 0 0 0 0,0-1 0 0 0,0 2 0 0 0,1-1 0 0 0,0 0 0 0 0,0 0 0 0 0,0 1 0 0 0,0-1 0 0 0,1 0-12 0 0,7-4 92 0 0,0 0 0 0 0,1 0 0 0 0,0 2 0 0 0,0-1 0 0 0,1 1 0 0 0,-1 1 0 0 0,1 0 0 0 0,1 1 0 0 0,9-2-92 0 0,7-1-1523 0 0,15 0 1523 0 0,28-1-8726 0 0,-54 7-895 0 0</inkml:trace>
 </inkml:ink>
@@ -1624,7 +1624,7 @@
   </inkml:definitions>
   <inkml:trace contextRef="#ctx0" brushRef="#br0">53 186 14112 0 0,'-10'-23'835'0'0,"0"0"1"0"0,2-1-1 0 0,-3-12-835 0 0,0-15 4377 0 0,10 48-3953 0 0,1 0-1 0 0,-1 1 1 0 0,1-1 0 0 0,0 0-1 0 0,0 1 1 0 0,0-1-1 0 0,0-2-423 0 0,0 5 50 0 0,0 0 0 0 0,0 0-1 0 0,0 0 1 0 0,0 0 0 0 0,0 0-1 0 0,0-1 1 0 0,0 1 0 0 0,0 0 0 0 0,0 0-1 0 0,0 0 1 0 0,0 0 0 0 0,0-1-1 0 0,0 1 1 0 0,0 0 0 0 0,0 0-1 0 0,0 0 1 0 0,1 0 0 0 0,-1 0-1 0 0,0-1 1 0 0,0 1 0 0 0,0 0 0 0 0,0 0-1 0 0,0 0 1 0 0,0 0 0 0 0,0 0-1 0 0,1 0 1 0 0,-1 0 0 0 0,0-1-1 0 0,0 1 1 0 0,0 0 0 0 0,0 0-1 0 0,0 0 1 0 0,1 0 0 0 0,-1 0 0 0 0,0 0-1 0 0,0 0 1 0 0,0 0-50 0 0,8 10 540 0 0,-3 1-453 0 0,-1 0 0 0 0,0 0 0 0 0,0 1 0 0 0,-1 0 0 0 0,1 7-87 0 0,6 62 353 0 0,-9-77-337 0 0,6 58 194 0 0,0-5 124 0 0,-2 21-334 0 0,8 214 371 0 0,-5-181-94 0 0,-7-107-245 0 0,-1 0-1 0 0,0 0 1 0 0,1-1-1 0 0,0 1 1 0 0,0 0-1 0 0,0 0 1 0 0,0-1-1 0 0,1 1 1 0 0,0-1-1 0 0,-1 1 1 0 0,2 0-32 0 0,-2-3 141 0 0,0-2-99 0 0,1 0 1 0 0,-1 0-1 0 0,1-1 0 0 0,-1 1 0 0 0,0-1 0 0 0,1 1 1 0 0,-1-1-1 0 0,0 0 0 0 0,0 1 0 0 0,0-2-42 0 0,0 3 27 0 0,4-10 98 0 0,0-1 0 0 0,-1 1 0 0 0,0-1-1 0 0,1-5-124 0 0,2-6 81 0 0,1-6 21 0 0,-1 0 0 0 0,3-24-102 0 0,-4 18 38 0 0,1-9-10 0 0,-3 21-13 0 0,0-1 0 0 0,1 1 0 0 0,6-15-15 0 0,-10 35-4 0 0,-1 1 0 0 0,1 0 1 0 0,-1 0-1 0 0,1 0 0 0 0,0 0 0 0 0,-1 0 0 0 0,1 0 1 0 0,0 0-1 0 0,0 0 0 0 0,0 0 0 0 0,0 0 0 0 0,0 0 1 0 0,0 0-1 0 0,0 1 4 0 0,8-3-12 0 0,-6 5 14 0 0,-3-1-3 0 0,4 2-1 0 0,-1 1 0 0 0,1-1 0 0 0,-1 1 0 0 0,1 0 0 0 0,-1 0 0 0 0,0 0 0 0 0,-1 1-1 0 0,1-1 1 0 0,-1 1 0 0 0,1 3 2 0 0,5 12-17 0 0,-1 0 0 0 0,-1 1 17 0 0,5 15-9 0 0,44 133-266 0 0,-54-166 22 0 0,0 0-1 0 0,1 0 0 0 0,-1 0 0 0 0,1 0 1 0 0,-1 0-1 0 0,1 0 0 0 0,0 0 0 0 0,0 0 1 0 0,1-1-1 0 0,-1 1 0 0 0,0-1 1 0 0,1 0-1 0 0,0 0 0 0 0,-1 1 0 0 0,1-2 1 0 0,2 2 253 0 0,5-1-1594 0 0</inkml:trace>
   <inkml:trace contextRef="#ctx0" brushRef="#br0" timeOffset="470.292">614 604 3680 0 0,'4'-8'2273'0'0,"0"1"1"0"0,0-1-1 0 0,-1 0 1 0 0,0-1-1 0 0,1-6-2273 0 0,-2 6 1443 0 0,0 1 0 0 0,-1-1 1 0 0,0 0-1 0 0,-1 0 0 0 0,0-8-1443 0 0,-1 11 229 0 0,1 0 1 0 0,-1 0-1 0 0,0 0 1 0 0,-1 0-1 0 0,1 1 1 0 0,-1-1-1 0 0,0 0 1 0 0,-1 1-1 0 0,1-1 1 0 0,-1 1-1 0 0,0 0 1 0 0,0 0-1 0 0,-1 0 1 0 0,1 0-1 0 0,-1 1 1 0 0,0-1-1 0 0,-1 1 1 0 0,1 0-1 0 0,-2 0-229 0 0,5 3 30 0 0,0 0-1 0 0,-1 0 1 0 0,1 0 0 0 0,-1 1-1 0 0,0-1 1 0 0,1 1 0 0 0,-1-1-1 0 0,1 1 1 0 0,-1-1-1 0 0,0 1 1 0 0,1 0 0 0 0,-1 0-1 0 0,0 0 1 0 0,1 0-1 0 0,-1 0 1 0 0,0 0 0 0 0,1 0-1 0 0,-1 1 1 0 0,0-1-1 0 0,1 1 1 0 0,-1-1 0 0 0,0 1-1 0 0,1 0 1 0 0,-1-1 0 0 0,1 1-1 0 0,0 0 1 0 0,-1 0-1 0 0,1 0 1 0 0,-1 0 0 0 0,1 0-1 0 0,0 0 1 0 0,0 0-1 0 0,-1 2-29 0 0,-5 4 92 0 0,1 0-1 0 0,0 1 0 0 0,0 0 0 0 0,0 0 0 0 0,0 2-91 0 0,-4 10-59 0 0,0 1-1 0 0,1 0 0 0 0,2 0 1 0 0,0 0-1 0 0,1 1 0 0 0,1 0 1 0 0,1 0-1 0 0,1 0 0 0 0,1 1 60 0 0,1-17 23 0 0,1 0 0 0 0,0 0-1 0 0,1 0 1 0 0,0 0 0 0 0,0-1-1 0 0,0 1 1 0 0,0 0 0 0 0,1 0 0 0 0,0-1-1 0 0,0 1 1 0 0,1-1 0 0 0,0 0-1 0 0,0 0 1 0 0,0 0-23 0 0,-2-3 9 0 0,0 0 1 0 0,1 0-1 0 0,-1 0 0 0 0,0-1 1 0 0,1 1-1 0 0,0-1 0 0 0,-1 1 1 0 0,1-1-1 0 0,0 0 0 0 0,0 0 1 0 0,0 1-1 0 0,0-1 0 0 0,0 0 1 0 0,0-1-1 0 0,0 1 0 0 0,0 0 1 0 0,0-1-1 0 0,0 1 0 0 0,0-1 0 0 0,1 1 1 0 0,-1-1-1 0 0,0 0 0 0 0,0 0 1 0 0,1 0-1 0 0,-1 0 0 0 0,0-1 1 0 0,0 1-1 0 0,0-1 0 0 0,0 1 1 0 0,1-1-1 0 0,-1 0 0 0 0,0 1 1 0 0,0-1-1 0 0,0 0 0 0 0,0 0 1 0 0,-1-1-1 0 0,1 1 0 0 0,0 0-9 0 0,5-4 36 0 0,0 0-1 0 0,-1-1 1 0 0,0 1-1 0 0,0-1 0 0 0,0-1 1 0 0,-1 1-1 0 0,0-1 1 0 0,0 0-1 0 0,0 0 1 0 0,-1 0-1 0 0,0 0 1 0 0,-1-1-1 0 0,1 0 1 0 0,-2 0-1 0 0,3-8-35 0 0,-1-1 36 0 0,0-1-1 0 0,-1-1 1 0 0,-1 1-1 0 0,-1 0 1 0 0,-1 0-1 0 0,-2-16-35 0 0,2 4-9 0 0,0 18 50 0 0,0 10 58 0 0,0 4 78 0 0,2 26-78 0 0,0-1 0 0 0,2 1 0 0 0,2 3-99 0 0,0-3 34 0 0,-3-12-27 0 0,0 1 1 0 0,2-1-1 0 0,0 0 0 0 0,2 3-7 0 0,-5-14 4 0 0,0 0-1 0 0,0 0 0 0 0,1 0 0 0 0,0 0 1 0 0,0-1-1 0 0,0 1 0 0 0,1-1 0 0 0,-1 0 1 0 0,1 0-1 0 0,0 0 0 0 0,0 0 0 0 0,0-1 1 0 0,1 1-1 0 0,2 0-3 0 0,-5-3-69 0 0,-1 0 0 0 0,1 0 0 0 0,-1-1 1 0 0,1 1-1 0 0,0-1 0 0 0,-1 1 0 0 0,1-1 0 0 0,0 1 1 0 0,-1-1-1 0 0,1 0 0 0 0,0 0 0 0 0,0 0 0 0 0,-1 0 1 0 0,1 0-1 0 0,0 0 0 0 0,-1-1 0 0 0,1 1 0 0 0,0-1 1 0 0,-1 1-1 0 0,2-1 69 0 0,0-1-405 0 0,0 0 0 0 0,0 1 0 0 0,-1-1 1 0 0,1 0-1 0 0,-1 0 0 0 0,1-1 0 0 0,-1 1 1 0 0,0-1-1 0 0,0 1 0 0 0,1-2 405 0 0,4-7-1675 0 0</inkml:trace>
-  <inkml:trace contextRef="#ctx0" brushRef="#br0" timeOffset="824.94">810 444 18023 0 0,'0'0'827'0'0,"0"0"-22"0"0,-3 12-485 0 0,3-7 0 0 0,-1-1-1 0 0,1 1 0 0 0,1 0 1 0 0,-1 0-1 0 0,1 0 0 0 0,0 0 0 0 0,0 0 1 0 0,0 0-1 0 0,1 1-319 0 0,19 44 2225 0 0,-16-39-1901 0 0,1 1-119 0 0,0-1-1 0 0,0-1 1 0 0,1 1 0 0 0,1-1 0 0 0,0 0-1 0 0,0-1 1 0 0,1 1 0 0 0,0-2-1 0 0,0 1 1 0 0,1-1 0 0 0,2 0-205 0 0,-11-7 63 0 0,0 0 0 0 0,1 0 1 0 0,-1 0-1 0 0,0-1 0 0 0,1 1 1 0 0,-1 0-1 0 0,0-1 0 0 0,1 1 1 0 0,-1-1-1 0 0,1 1 0 0 0,0-1 1 0 0,-1 0-1 0 0,1 0 0 0 0,-1 0 1 0 0,1 1-1 0 0,-1-1 0 0 0,1-1 1 0 0,-1 1-1 0 0,1 0 0 0 0,0 0 1 0 0,-1-1-64 0 0,1 1 63 0 0,-1-1 0 0 0,1 0 1 0 0,-1 0-1 0 0,0 0 0 0 0,1 0 1 0 0,-1 0-1 0 0,0 0 0 0 0,0-1 1 0 0,0 1-1 0 0,0 0 0 0 0,0-1 1 0 0,0 1-1 0 0,0 0 0 0 0,0-1 1 0 0,0 1-1 0 0,-1-1 0 0 0,1 1 1 0 0,-1-1-1 0 0,1 0-63 0 0,1-8 112 0 0,0 0 1 0 0,-1 1-1 0 0,0-1 0 0 0,0 0 1 0 0,-1 1-1 0 0,-1-4-112 0 0,1-15 81 0 0,1-62-236 0 0,-6-16 155 0 0,5 96-112 0 0,1 1-1 0 0,0 0 1 0 0,0-4 112 0 0,2-19-2418 0 0,-3 31 880 0 0,0 1-933 0 0,1 1-3683 0 0,1 6-1575 0 0</inkml:trace>
+  <inkml:trace contextRef="#ctx0" brushRef="#br0" timeOffset="824.939">810 444 18023 0 0,'0'0'827'0'0,"0"0"-22"0"0,-3 12-485 0 0,3-7 0 0 0,-1-1-1 0 0,1 1 0 0 0,1 0 1 0 0,-1 0-1 0 0,1 0 0 0 0,0 0 0 0 0,0 0 1 0 0,0 0-1 0 0,1 1-319 0 0,19 44 2225 0 0,-16-39-1901 0 0,1 1-119 0 0,0-1-1 0 0,0-1 1 0 0,1 1 0 0 0,1-1 0 0 0,0 0-1 0 0,0-1 1 0 0,1 1 0 0 0,0-2-1 0 0,0 1 1 0 0,1-1 0 0 0,2 0-205 0 0,-11-7 63 0 0,0 0 0 0 0,1 0 1 0 0,-1 0-1 0 0,0-1 0 0 0,1 1 1 0 0,-1 0-1 0 0,0-1 0 0 0,1 1 1 0 0,-1-1-1 0 0,1 1 0 0 0,0-1 1 0 0,-1 0-1 0 0,1 0 0 0 0,-1 0 1 0 0,1 1-1 0 0,-1-1 0 0 0,1-1 1 0 0,-1 1-1 0 0,1 0 0 0 0,0 0 1 0 0,-1-1-64 0 0,1 1 63 0 0,-1-1 0 0 0,1 0 1 0 0,-1 0-1 0 0,0 0 0 0 0,1 0 1 0 0,-1 0-1 0 0,0 0 0 0 0,0-1 1 0 0,0 1-1 0 0,0 0 0 0 0,0-1 1 0 0,0 1-1 0 0,0 0 0 0 0,0-1 1 0 0,0 1-1 0 0,-1-1 0 0 0,1 1 1 0 0,-1-1-1 0 0,1 0-63 0 0,1-8 112 0 0,0 0 1 0 0,-1 1-1 0 0,0-1 0 0 0,0 0 1 0 0,-1 1-1 0 0,-1-4-112 0 0,1-15 81 0 0,1-62-236 0 0,-6-16 155 0 0,5 96-112 0 0,1 1-1 0 0,0 0 1 0 0,0-4 112 0 0,2-19-2418 0 0,-3 31 880 0 0,0 1-933 0 0,1 1-3683 0 0,1 6-1575 0 0</inkml:trace>
   <inkml:trace contextRef="#ctx0" brushRef="#br0" timeOffset="1168.369">1103 497 3224 0 0,'4'12'288'0'0,"-3"-7"1983"0"0,0 1 1 0 0,0-1-1 0 0,0 0 1 0 0,1 0-1 0 0,-1 0 1 0 0,1 0-1 0 0,2 2-2271 0 0,-3-5 429 0 0,0 0-1 0 0,1 0 0 0 0,-1 1 0 0 0,1-1 0 0 0,-1 0 0 0 0,1-1 1 0 0,0 1-1 0 0,0 0 0 0 0,0 0 0 0 0,0-1 0 0 0,0 1 0 0 0,0-1 1 0 0,0 0-1 0 0,0 1 0 0 0,1-1 0 0 0,1 0-428 0 0,0 1 148 0 0,1-1 0 0 0,-1 0-1 0 0,1 0 1 0 0,0 0 0 0 0,-1-1 0 0 0,1 1 0 0 0,0-1-1 0 0,-1 0 1 0 0,1-1 0 0 0,-1 1 0 0 0,1-1-1 0 0,0 0 1 0 0,-1 0 0 0 0,1 0 0 0 0,-1-1-1 0 0,0 1 1 0 0,2-2-148 0 0,1 0 53 0 0,-1-1-1 0 0,0 1 1 0 0,0-1-1 0 0,0 0 1 0 0,-1-1-1 0 0,1 1 1 0 0,3-5-53 0 0,1-1 51 0 0,-1-1 1 0 0,0 0 0 0 0,3-6-52 0 0,-10 14 10 0 0,1-1 1 0 0,-1 1 0 0 0,0-1-1 0 0,-1 1 1 0 0,1-1 0 0 0,-1 0-1 0 0,1 1 1 0 0,-1-1 0 0 0,0 0-1 0 0,0 0 1 0 0,-1 0 0 0 0,1 0-1 0 0,-1 0 1 0 0,0 0 0 0 0,0 0-1 0 0,-1 0 1 0 0,1 0 0 0 0,-1 0-1 0 0,1 0 1 0 0,-1 0 0 0 0,-1 0-1 0 0,1 1 1 0 0,0-1 0 0 0,-1 0-1 0 0,0 1 1 0 0,0-1 0 0 0,0 1-1 0 0,0-1 1 0 0,0 1 0 0 0,-1 0-1 0 0,0 0 1 0 0,1 0 0 0 0,-3-1-11 0 0,4 3 0 0 0,-1 0 0 0 0,1 0 1 0 0,0 0-1 0 0,-1 0 0 0 0,1 1 1 0 0,-1-1-1 0 0,1 1 0 0 0,-1-1 1 0 0,1 1-1 0 0,-1-1 0 0 0,1 1 1 0 0,-1 0-1 0 0,1 0 0 0 0,-1 0 1 0 0,1 0-1 0 0,-1 0 1 0 0,0 0-1 0 0,0 0 0 0 0,-1 1-1 0 0,0 0 0 0 0,0 0 0 0 0,1 0 1 0 0,-1 0-1 0 0,0 0 0 0 0,1 0 0 0 0,-1 1 0 0 0,1-1 0 0 0,-3 3 1 0 0,-2 2-3 0 0,0 0-1 0 0,1 0 1 0 0,-1 1 0 0 0,1 0-1 0 0,-4 8 4 0 0,4-6 58 0 0,2-1 1 0 0,0 1-1 0 0,0 0 0 0 0,0 0 0 0 0,1 0 1 0 0,0 0-1 0 0,1 1 0 0 0,0 0 0 0 0,1-1 1 0 0,0 1-1 0 0,0 0 0 0 0,1-1-58 0 0,0 8 130 0 0,0 0-1 0 0,2 0 1 0 0,0-1-1 0 0,1 1 1 0 0,0-1-1 0 0,5 10-129 0 0,-7-22 19 0 0,0 1 0 0 0,1-1 0 0 0,0 0 0 0 0,0 1 0 0 0,0-1 0 0 0,0 0 0 0 0,1-1 0 0 0,0 1 0 0 0,0 0 0 0 0,0-1 0 0 0,0 1 0 0 0,0-1 0 0 0,1 0-1 0 0,-1 0 1 0 0,1 0 0 0 0,0-1 0 0 0,0 1 0 0 0,0-1 0 0 0,0 0 0 0 0,0 0 0 0 0,1 0 0 0 0,-1-1 0 0 0,0 1 0 0 0,1-1 0 0 0,-1 0 0 0 0,1-1 0 0 0,0 1 0 0 0,-1-1 0 0 0,1 0 0 0 0,0 0 0 0 0,-1 0 0 0 0,4-1-19 0 0,7-3-215 0 0,1-1 1 0 0,-1-1-1 0 0,-1 0 1 0 0,1-1-1 0 0,-1 0 1 0 0,0-1-1 0 0,4-4 215 0 0,0 1-1789 0 0</inkml:trace>
 </inkml:ink>
 </file>
@@ -1760,7 +1760,7 @@
   </inkml:definitions>
   <inkml:trace contextRef="#ctx0" brushRef="#br0">91 106 20991 0 0,'-3'-6'271'0'0,"-5"-8"1230"0"0,8 14-1445 0 0,-1 0-1 0 0,1-1 1 0 0,-1 1-1 0 0,1 0 1 0 0,-1 0-1 0 0,1 0 1 0 0,-1 0-1 0 0,1 0 1 0 0,-1 0-1 0 0,1 0 1 0 0,-1 0-1 0 0,1 0 1 0 0,-1 0-1 0 0,1 0 1 0 0,-1 1-1 0 0,1-1 1 0 0,0 0-1 0 0,-1 0 1 0 0,1 0-1 0 0,-1 0 1 0 0,1 1-1 0 0,-1-1 1 0 0,1 0-1 0 0,0 1 1 0 0,-1-1-1 0 0,1 0 1 0 0,0 0-1 0 0,-1 1 1 0 0,1-1-1 0 0,0 1 0 0 0,-1-1 1 0 0,1 0-1 0 0,0 1 1 0 0,0 0-56 0 0,-2 1 197 0 0,0 0-1 0 0,1 1 1 0 0,0-1 0 0 0,-1 0-1 0 0,1 1 1 0 0,0 0-1 0 0,0-1 1 0 0,1 1 0 0 0,-1 0-1 0 0,0-1 1 0 0,1 3-197 0 0,-4 35 825 0 0,3-22-448 0 0,-9 142-13 0 0,-22 152 64 0 0,27-230-657 0 0,6-28 34 0 0,2-40-2045 0 0,-2-13-96 0 0</inkml:trace>
   <inkml:trace contextRef="#ctx0" brushRef="#br0" timeOffset="457.055">96 76 9216 0 0,'-5'-27'532'0'0,"0"0"393"0"0,0 11 4636 0 0,5 15-2201 0 0,0 1-315 0 0,0 0-1442 0 0,-5 19 921 0 0,2-3-2416 0 0,0 1 0 0 0,2 0 1 0 0,0-1-1 0 0,0 1 0 0 0,2 0 1 0 0,1 10-109 0 0,2 0 47 0 0,1-1 0 0 0,1 1-1 0 0,7 18-46 0 0,-10-35 17 0 0,1-1 0 0 0,0 0 0 0 0,0 0 0 0 0,1-1 0 0 0,1 1 0 0 0,1 0-17 0 0,-5-5 16 0 0,2 0-1 0 0,-1 0 0 0 0,0 0 0 0 0,1 0 0 0 0,0-1 0 0 0,0 0 0 0 0,0 0 1 0 0,0 0-1 0 0,0 0 0 0 0,0-1 0 0 0,1 1 0 0 0,-1-1 0 0 0,1 0-15 0 0,-2-2 29 0 0,0 1 0 0 0,-1-1 0 0 0,1 0 0 0 0,0 1 0 0 0,-1-1-1 0 0,1-1 1 0 0,0 1 0 0 0,-1 0 0 0 0,1 0 0 0 0,0-1 0 0 0,-1 0 0 0 0,1 1 0 0 0,-1-1 0 0 0,1 0-1 0 0,-1 0 1 0 0,1-1 0 0 0,-1 1 0 0 0,0 0 0 0 0,0-1 0 0 0,1 1 0 0 0,-1-1 0 0 0,0 0 0 0 0,1-1-29 0 0,6-7 94 0 0,0 1 0 0 0,-1-1 0 0 0,0-1 1 0 0,2-5-95 0 0,-2 5 35 0 0,-1 0 5 0 0,-1 1-1 0 0,0-1 0 0 0,-1-1 0 0 0,0 1 0 0 0,-1-1 0 0 0,3-10-39 0 0,2-14 59 0 0,1-24-59 0 0,-6 30 53 0 0,2 0 0 0 0,8-23-53 0 0,-15 59 149 0 0,0 1 0 0 0,1-1-1 0 0,0 0 1 0 0,0 0-1 0 0,0 0-148 0 0,0 22 15 0 0,-37 425 526 0 0,34-403-402 0 0,1 39-139 0 0,3-71-87 0 0,1 0-1 0 0,0-1 0 0 0,1 1 1 0 0,0-1-1 0 0,2 1 0 0 0,5 11 88 0 0,-10-28-108 0 0,0 0-1 0 0,0-1 0 0 0,1 1 1 0 0,-1-1-1 0 0,0 1 0 0 0,0 0 1 0 0,1-1-1 0 0,-1 1 1 0 0,1-1-1 0 0,-1 1 0 0 0,1-1 1 0 0,-1 1-1 0 0,0-1 0 0 0,1 1 1 0 0,0-1-1 0 0,-1 0 0 0 0,1 1 1 0 0,-1-1-1 0 0,1 0 0 0 0,-1 1 1 0 0,1-1-1 0 0,0 0 0 0 0,-1 0 1 0 0,1 1 108 0 0,7-3-8188 0 0,-2 1-205 0 0</inkml:trace>
-  <inkml:trace contextRef="#ctx0" brushRef="#br0" timeOffset="799.844">550 628 18575 0 0,'0'0'852'0'0,"0"0"-21"0"0,0 0-346 0 0,0 0 538 0 0,0 0 289 0 0,-3 17 2903 0 0,-2 4-3177 0 0,0 0 0 0 0,0 15-1038 0 0,-4 19 733 0 0,7-44-1079 0 0,0 1 1 0 0,1 0 0 0 0,1 12 345 0 0,11-30-4931 0 0,-7-2-1230 0 0,1-1-1605 0 0</inkml:trace>
+  <inkml:trace contextRef="#ctx0" brushRef="#br0" timeOffset="799.843">550 628 18575 0 0,'0'0'852'0'0,"0"0"-21"0"0,0 0-346 0 0,0 0 538 0 0,0 0 289 0 0,-3 17 2903 0 0,-2 4-3177 0 0,0 0 0 0 0,0 15-1038 0 0,-4 19 733 0 0,7-44-1079 0 0,0 1 1 0 0,1 0 0 0 0,1 12 345 0 0,11-30-4931 0 0,-7-2-1230 0 0,1-1-1605 0 0</inkml:trace>
   <inkml:trace contextRef="#ctx0" brushRef="#br0" timeOffset="1162.023">563 493 19263 0 0,'-4'-10'424'0'0,"4"7"88"0"0,-2-1 24 0 0,2-1 0 0 0,-3 1-432 0 0,2 0-104 0 0,-2 2 0 0 0,3-2 0 0 0,0 0 608 0 0,0 4 96 0 0,0 0 16 0 0,0 0 8 0 0,0 0-488 0 0,4-1-96 0 0,-4 1-16 0 0,6 1-8 0 0,2 3-1472 0 0,-1 2-296 0 0</inkml:trace>
   <inkml:trace contextRef="#ctx0" brushRef="#br0" timeOffset="1512.417">704 558 14280 0 0,'0'0'654'0'0,"-5"11"244"0"0,2 4 863 0 0,-1 1 1 0 0,2-1-1 0 0,0 1 1 0 0,1 0 0 0 0,1 0-1 0 0,0 3-1761 0 0,4 32 1990 0 0,3 14-1990 0 0,1 0 432 0 0,-6-47-360 0 0,1 14 336 0 0,-1-1 1 0 0,-2 17-409 0 0,0-39 137 0 0,-1-1 1 0 0,0 0-1 0 0,0 1 1 0 0,-1-1-1 0 0,0 0 1 0 0,-1 0-1 0 0,0 0 1 0 0,0 0-1 0 0,0 0 1 0 0,-1 0-1 0 0,-4 5-137 0 0,7-11 27 0 0,-1 0 0 0 0,0 1 0 0 0,0-1-1 0 0,0 0 1 0 0,0 0 0 0 0,-1 0-1 0 0,1-1 1 0 0,0 1 0 0 0,-1 0 0 0 0,1-1-1 0 0,-1 0 1 0 0,0 1 0 0 0,1-1 0 0 0,-1 0-1 0 0,0-1 1 0 0,0 1 0 0 0,0 0-1 0 0,1-1 1 0 0,-1 1 0 0 0,0-1 0 0 0,0 0-1 0 0,0 0 1 0 0,0 0 0 0 0,0 0 0 0 0,0-1-1 0 0,0 1 1 0 0,0-1 0 0 0,-2-1-27 0 0,1 1-24 0 0,0 0 0 0 0,0-1 0 0 0,1 0 0 0 0,-1 0 0 0 0,1 0 0 0 0,-1 0 1 0 0,1 0-1 0 0,0-1 0 0 0,0 1 0 0 0,0-1 0 0 0,0 0 0 0 0,0 0 0 0 0,1 0 0 0 0,-1 0 0 0 0,1 0 1 0 0,0-1-1 0 0,0 1 0 0 0,0-1 0 0 0,0 0 0 0 0,0-1 24 0 0,0 0-288 0 0,1 0-1 0 0,0 0 1 0 0,0 0 0 0 0,1 0-1 0 0,-1 0 1 0 0,1 0 0 0 0,0 0-1 0 0,1-1 289 0 0,4-25-8995 0 0,-1 13 282 0 0</inkml:trace>
   <inkml:trace contextRef="#ctx0" brushRef="#br0" timeOffset="1513.417">714 438 24415 0 0,'-3'-6'684'0'0,"0"-1"-1"0"0,1 0 0 0 0,-1-1 0 0 0,0-3-683 0 0,3 9 217 0 0,-1-1-1 0 0,0 0 0 0 0,1 0 1 0 0,0 0-1 0 0,0 0 0 0 0,0 0 1 0 0,0 0-1 0 0,0 0 0 0 0,1 0 1 0 0,-1 0-1 0 0,1 0 0 0 0,0-1-216 0 0,-1 3-18 0 0,0 1 1 0 0,0 0-1 0 0,1 0 0 0 0,-1 0 0 0 0,0-1 0 0 0,0 1 0 0 0,0 0 0 0 0,0 0 0 0 0,0 0 0 0 0,0-1 0 0 0,0 1 0 0 0,1 0 0 0 0,-1 0 0 0 0,0 0 0 0 0,0-1 1 0 0,0 1-1 0 0,0 0 0 0 0,1 0 0 0 0,-1 0 0 0 0,0 0 0 0 0,0 0 0 0 0,0 0 0 0 0,1-1 0 0 0,-1 1 0 0 0,0 0 0 0 0,0 0 0 0 0,1 0 0 0 0,-1 0 0 0 0,0 0 1 0 0,0 0-1 0 0,0 0 0 0 0,1 0 0 0 0,-1 0 0 0 0,0 0 0 0 0,0 0 0 0 0,1 0 0 0 0,-1 0 0 0 0,0 0 0 0 0,0 0 0 0 0,1 0 0 0 0,-1 0 0 0 0,0 1 18 0 0,4 2-2289 0 0,0 0-4099 0 0,0 3-2358 0 0</inkml:trace>
@@ -1908,7 +1908,7 @@
   <inkml:trace contextRef="#ctx0" brushRef="#br0" timeOffset="368.608">641 204 12440 0 0,'-1'-6'554'0'0,"-1"-1"1"0"0,1 1-1 0 0,-1 0 1 0 0,-1 0-1 0 0,1 0 1 0 0,-1 1-1 0 0,0-1 1 0 0,-1-1-555 0 0,-2-5 2382 0 0,-4-10 175 0 0,4 9-1663 0 0,1 1 0 0 0,-2 1 0 0 0,1-1 0 0 0,-9-9-894 0 0,14 20 49 0 0,1 0 1 0 0,-1 1-1 0 0,1-1 0 0 0,-1 0 0 0 0,1 1 0 0 0,-1-1 0 0 0,1 1 0 0 0,-1-1 0 0 0,0 0 1 0 0,1 1-1 0 0,-1 0 0 0 0,0-1 0 0 0,0 1 0 0 0,1-1 0 0 0,-1 1 0 0 0,0 0 1 0 0,0 0-1 0 0,0-1 0 0 0,1 1 0 0 0,-1 0 0 0 0,0 0 0 0 0,0 0 0 0 0,0 0 0 0 0,0 0-49 0 0,0 0 37 0 0,0 1 0 0 0,0-1 0 0 0,1 1 0 0 0,-1-1 0 0 0,0 1 0 0 0,1-1 0 0 0,-1 1 0 0 0,0-1 0 0 0,1 1 0 0 0,-1 0 0 0 0,0-1 0 0 0,1 1 0 0 0,-1 0 0 0 0,1 0 0 0 0,-1-1 0 0 0,1 1 0 0 0,0 0 0 0 0,-1 1-37 0 0,-2 6 126 0 0,1-1 0 0 0,0 1-1 0 0,0 0 1 0 0,0 6-126 0 0,1-9 49 0 0,-13 115 582 0 0,5 0 0 0 0,5 16-631 0 0,3-75 57 0 0,1 0 0 0 0,4 0 1 0 0,10 52-58 0 0,-10-100-142 0 0,-3-11-128 0 0,-1 0 0 0 0,1 0 0 0 0,0 0 0 0 0,-1 0 0 0 0,1 0 0 0 0,-1 0 0 0 0,0 0 1 0 0,0 1 269 0 0,1-4-1586 0 0,0-6-70 0 0</inkml:trace>
   <inkml:trace contextRef="#ctx0" brushRef="#br0" timeOffset="720.285">332 479 20671 0 0,'0'0'951'0'0,"0"0"-24"0"0,9 4-201 0 0,3-3-231 0 0,-1-1 0 0 0,1-1 0 0 0,-1 0-1 0 0,0-1 1 0 0,9-1-495 0 0,55-18 976 0 0,-5-3-1108 0 0,-23 6-2872 0 0,-25 9-5561 0 0</inkml:trace>
   <inkml:trace contextRef="#ctx0" brushRef="#br0" timeOffset="721.285">751 0 24071 0 0,'-2'6'385'0'0,"0"0"0"0"0,0 0 0 0 0,1 0 0 0 0,0 0-1 0 0,0 0 1 0 0,1 1 0 0 0,-1 4-385 0 0,5 47-84 0 0,-2-33 606 0 0,7 92 1525 0 0,2 19-1034 0 0,-6 74-1013 0 0,-6-176-96 0 0,-1 24-308 0 0,4 22 404 0 0,0-63-927 0 0,1-10-7088 0 0,-3-7-942 0 0</inkml:trace>
-  <inkml:trace contextRef="#ctx0" brushRef="#br0" timeOffset="1067.371">706 401 10136 0 0,'-3'0'220'0'0,"3"0"-158"0"0,-1 0-1 0 0,0 0 1 0 0,1 0-1 0 0,-1-1 1 0 0,1 1 0 0 0,-1 0-1 0 0,0 0 1 0 0,1-1 0 0 0,-1 1-1 0 0,1 0 1 0 0,-1-1-1 0 0,1 1 1 0 0,-1 0 0 0 0,1-1-1 0 0,-1 1 1 0 0,1-1 0 0 0,-1 1-1 0 0,1-1 1 0 0,-1 1-1 0 0,1-1 1 0 0,0 1 0 0 0,-1-1-62 0 0,2-4 7237 0 0,5 1-3408 0 0,6-3-766 0 0,5-1-2417 0 0,1 1 0 0 0,1 1 1 0 0,-1 1-1 0 0,1 0 0 0 0,12 0-646 0 0,-21 4-225 0 0,1 0-1 0 0,-1 1 1 0 0,0 0-1 0 0,0 1 0 0 0,3 0 226 0 0,-6 0-637 0 0,0 1 0 0 0,1 0 0 0 0,-1 0 0 0 0,0 0 0 0 0,0 1 0 0 0,-1 0 0 0 0,5 2 637 0 0,-9-3-463 0 0,1 0 1 0 0,-1-1 0 0 0,0 1 0 0 0,0 0 0 0 0,1 0-1 0 0,-1 0 1 0 0,-1 1 0 0 0,1-1 0 0 0,0 1 462 0 0,6 10-2126 0 0</inkml:trace>
+  <inkml:trace contextRef="#ctx0" brushRef="#br0" timeOffset="1067.37">706 401 10136 0 0,'-3'0'220'0'0,"3"0"-158"0"0,-1 0-1 0 0,0 0 1 0 0,1 0-1 0 0,-1-1 1 0 0,1 1 0 0 0,-1 0-1 0 0,0 0 1 0 0,1-1 0 0 0,-1 1-1 0 0,1 0 1 0 0,-1-1-1 0 0,1 1 1 0 0,-1 0 0 0 0,1-1-1 0 0,-1 1 1 0 0,1-1 0 0 0,-1 1-1 0 0,1-1 1 0 0,-1 1-1 0 0,1-1 1 0 0,0 1 0 0 0,-1-1-62 0 0,2-4 7237 0 0,5 1-3408 0 0,6-3-766 0 0,5-1-2417 0 0,1 1 0 0 0,1 1 1 0 0,-1 1-1 0 0,1 0 0 0 0,12 0-646 0 0,-21 4-225 0 0,1 0-1 0 0,-1 1 1 0 0,0 0-1 0 0,0 1 0 0 0,3 0 226 0 0,-6 0-637 0 0,0 1 0 0 0,1 0 0 0 0,-1 0 0 0 0,0 0 0 0 0,0 1 0 0 0,-1 0 0 0 0,5 2 637 0 0,-9-3-463 0 0,1 0 1 0 0,-1-1 0 0 0,0 1 0 0 0,0 0 0 0 0,1 0-1 0 0,-1 0 1 0 0,-1 1 0 0 0,1-1 0 0 0,0 1 462 0 0,6 10-2126 0 0</inkml:trace>
   <inkml:trace contextRef="#ctx0" brushRef="#br0" timeOffset="1416.197">940 482 18399 0 0,'-4'14'1851'0'0,"4"-11"-1644"0"0,-1 0 1 0 0,0 1-1 0 0,1-1 1 0 0,-1 0-1 0 0,1 0 1 0 0,0 0-1 0 0,0 0 1 0 0,0 0-1 0 0,1 0 0 0 0,-1 1 1 0 0,1-1-1 0 0,0 1-207 0 0,-1-3 146 0 0,1 1-1 0 0,-1-1 1 0 0,1 0-1 0 0,-1 0 1 0 0,1 0-1 0 0,0 0 1 0 0,0 1-1 0 0,-1-1 0 0 0,1 0 1 0 0,0 0-1 0 0,0 0 1 0 0,0-1-1 0 0,0 1 1 0 0,0 0-1 0 0,0 0 1 0 0,1 0-1 0 0,-1-1 1 0 0,0 1-1 0 0,0-1 1 0 0,0 1-1 0 0,1-1 1 0 0,-1 1-1 0 0,0-1 1 0 0,1 0-1 0 0,-1 0 0 0 0,0 1 1 0 0,1-1-1 0 0,-1 0 1 0 0,1 0-146 0 0,4-1 60 0 0,-1 0 1 0 0,1 0-1 0 0,-1 0 0 0 0,0-1 1 0 0,1 0-1 0 0,-1 0 0 0 0,0 0 1 0 0,0-1-1 0 0,0 1 0 0 0,-1-1 1 0 0,1 0-1 0 0,-1-1 0 0 0,1 1 1 0 0,-1-1-1 0 0,0 0 0 0 0,-1 0 1 0 0,1 0-1 0 0,-1 0 0 0 0,1-1 1 0 0,-1 1-1 0 0,0-1 0 0 0,-1 0 1 0 0,1 0-1 0 0,-1 0 0 0 0,0 0 1 0 0,-1-1-1 0 0,2-2-60 0 0,-3 7 5 0 0,0-1 0 0 0,1 1-1 0 0,-1-1 1 0 0,0 1 0 0 0,0-1 0 0 0,0 0 0 0 0,0 1-1 0 0,0-1 1 0 0,0 1 0 0 0,-1-1 0 0 0,1 0-1 0 0,-1 1 1 0 0,1-1 0 0 0,-1 1 0 0 0,1-1-1 0 0,-1 1 1 0 0,0 0 0 0 0,1-1 0 0 0,-1 1 0 0 0,0 0-1 0 0,0-1 1 0 0,0 1 0 0 0,0 0 0 0 0,0 0-1 0 0,-1 0 1 0 0,1 0 0 0 0,0 0 0 0 0,0 0-1 0 0,-1 0 1 0 0,1 0 0 0 0,-1 0 0 0 0,1 1 0 0 0,-1-1-1 0 0,1 1 1 0 0,-1-1-5 0 0,-1 0 8 0 0,0 1 1 0 0,0-1-1 0 0,0 1 0 0 0,0 0 1 0 0,0 0-1 0 0,0 0 0 0 0,0 0 0 0 0,0 1 1 0 0,0-1-1 0 0,0 1 0 0 0,1 0 0 0 0,-1-1 1 0 0,0 1-1 0 0,0 1 0 0 0,0-1 1 0 0,1 0-1 0 0,-1 1 0 0 0,-2 1-8 0 0,0 2 5 0 0,-1 0 0 0 0,1 0-1 0 0,0 1 1 0 0,0 0 0 0 0,1 0 0 0 0,0 0-1 0 0,0 0 1 0 0,0 1 0 0 0,1-1 0 0 0,0 1-1 0 0,0 0 1 0 0,0 0 0 0 0,1 0 0 0 0,0 1-1 0 0,1-1 1 0 0,-1 5-5 0 0,0 0 10 0 0,1 0 0 0 0,0-1 0 0 0,1 1 0 0 0,1 0 0 0 0,0 0 0 0 0,0-1 0 0 0,1 1 0 0 0,0-1 0 0 0,1 0 0 0 0,2 4-10 0 0,-4-11 15 0 0,1 0-1 0 0,0 0 0 0 0,0 0 1 0 0,0 0-1 0 0,0 0 1 0 0,1-1-1 0 0,-1 1 1 0 0,1-1-1 0 0,0 1 0 0 0,0-1 1 0 0,1 0-1 0 0,-1-1 1 0 0,0 1-1 0 0,1 0 0 0 0,0-1 1 0 0,1 1-15 0 0,-2-2-45 0 0,0 1 0 0 0,1-1 0 0 0,-1 0 0 0 0,0 0 0 0 0,1-1 0 0 0,-1 1 0 0 0,1-1 0 0 0,-1 1 0 0 0,1-1 0 0 0,-1 0 0 0 0,1 0 0 0 0,-1-1 0 0 0,1 1 0 0 0,-1-1 0 0 0,1 0 0 0 0,-1 0 0 0 0,0 0 0 0 0,1 0 0 0 0,-1 0 0 0 0,2-2 45 0 0,21-13-2635 0 0,-9 2-4114 0 0,-3-1-1461 0 0</inkml:trace>
   <inkml:trace contextRef="#ctx0" brushRef="#br0" timeOffset="1766.115">1229 465 18399 0 0,'1'1'175'0'0,"1"0"0"0"0,-1 0 0 0 0,0 0 0 0 0,0 0 0 0 0,0 0 0 0 0,0 0-1 0 0,0 0 1 0 0,0 0 0 0 0,0 1 0 0 0,-1-1 0 0 0,1 0 0 0 0,0 0-1 0 0,-1 1 1 0 0,1-1 0 0 0,-1 1 0 0 0,1-1 0 0 0,-1 0 0 0 0,0 1 0 0 0,1-1-1 0 0,-1 1 1 0 0,0-1 0 0 0,0 2-175 0 0,2 38 2928 0 0,-2-39-2809 0 0,0 13 200 0 0,1 0 1 0 0,1 0 0 0 0,0-1 0 0 0,1 1-1 0 0,0 0 1 0 0,4 8-320 0 0,1 1 1652 0 0,-9-46-688 0 0,2 7-648 0 0,-2 5-277 0 0,0-10 163 0 0,1-1 1 0 0,0 1-1 0 0,3-10-202 0 0,-3 24 112 0 0,1 0 0 0 0,1 0 0 0 0,-1 0 0 0 0,1 0 0 0 0,0 0 0 0 0,1 0 0 0 0,-1 0 0 0 0,1 1 0 0 0,0-1 0 0 0,1 1-1 0 0,-1 0 1 0 0,1 0 0 0 0,3-3-112 0 0,1 1 3 0 0,0-1 0 0 0,0 1 0 0 0,1 1 0 0 0,0-1 0 0 0,0 1 0 0 0,0 1-1 0 0,1 0 1 0 0,5-2-3 0 0,-3 2-843 0 0,-1 2-1 0 0,1-1 0 0 0,0 1 0 0 0,9 0 844 0 0,-5 1-1229 0 0</inkml:trace>
 </inkml:ink>
@@ -2161,8 +2161,8 @@
   <inkml:trace contextRef="#ctx0" brushRef="#br0" timeOffset="724.901">765 201 19895 0 0,'-2'-12'518'0'0,"2"0"1"0"0,0 0-1 0 0,0 0 0 0 0,1 0 0 0 0,1-1 0 0 0,0 1 0 0 0,0 0 0 0 0,4-9-518 0 0,-5 18 144 0 0,0 0 1 0 0,1-1-1 0 0,-1 1 1 0 0,1 0-1 0 0,-1 0 1 0 0,1 0-1 0 0,0 0 0 0 0,1 1 1 0 0,-1-1-1 0 0,0 0 1 0 0,1 1-1 0 0,-1 0 1 0 0,1-1-1 0 0,0 1 0 0 0,0 0 1 0 0,0 0-1 0 0,0 1 1 0 0,0-1-1 0 0,0 1 1 0 0,0-1-1 0 0,0 1 1 0 0,1 0-1 0 0,-1 0 0 0 0,1 0 1 0 0,-1 1-1 0 0,0-1 1 0 0,1 1-1 0 0,-1 0 1 0 0,1 0-1 0 0,-1 0 0 0 0,1 0 1 0 0,1 1-145 0 0,1 0 12 0 0,0 0 1 0 0,0 1 0 0 0,0-1 0 0 0,-1 1-1 0 0,1 0 1 0 0,-1 1 0 0 0,1 0-1 0 0,-1-1 1 0 0,0 2 0 0 0,0-1-1 0 0,0 0 1 0 0,-1 1 0 0 0,1 0 0 0 0,-1 0-1 0 0,0 0 1 0 0,0 1 0 0 0,0 0-1 0 0,0-1 1 0 0,-1 1 0 0 0,0 1-13 0 0,0-2 8 0 0,-1 0 0 0 0,0 1 0 0 0,0-1 0 0 0,0 1 0 0 0,-1-1 1 0 0,0 1-1 0 0,1 0 0 0 0,-2 0 0 0 0,1-1 0 0 0,0 1 0 0 0,-1 0 0 0 0,0 0 1 0 0,0 0-1 0 0,-1 0 0 0 0,1 0 0 0 0,-1 0 0 0 0,0-1 0 0 0,0 1 0 0 0,-1 0 1 0 0,1-1-1 0 0,-1 1 0 0 0,0-1 0 0 0,0 1 0 0 0,-2 1-8 0 0,-2 5 67 0 0,-2-1-1 0 0,1 0 1 0 0,-1 0-1 0 0,-1 0 1 0 0,1-1 0 0 0,-2-1-1 0 0,1 1 1 0 0,-1-1-1 0 0,0-1 1 0 0,-1 0-1 0 0,0 0 1 0 0,0-1 0 0 0,0-1-1 0 0,-11 4-66 0 0,20-8 4 0 0,-1 0 1 0 0,0-1-1 0 0,0 1 0 0 0,1-1 1 0 0,-1 0-1 0 0,0 1 0 0 0,0-1 1 0 0,0 0-1 0 0,0-1 0 0 0,1 1 1 0 0,-1 0-1 0 0,0-1 0 0 0,0 0 1 0 0,1 0-1 0 0,-1 0 0 0 0,0 0 1 0 0,1 0-1 0 0,-1 0-4 0 0,1 0-73 0 0,1 0 0 0 0,0 0 0 0 0,0 0 0 0 0,0 0 0 0 0,0 0 0 0 0,0-1 0 0 0,0 1 0 0 0,0 0 0 0 0,0 0 0 0 0,1-1 0 0 0,-1 1 0 0 0,0 0 0 0 0,1-1 0 0 0,-1 1 0 0 0,1-1 0 0 0,-1 1 0 0 0,1-1 0 0 0,0 1 0 0 0,0-1 0 0 0,-1 1 0 0 0,1-1 0 0 0,0 1 0 0 0,0-1 0 0 0,1 1 0 0 0,-1-1 0 0 0,0 1 0 0 0,0-1 0 0 0,1 1 0 0 0,-1-1 0 0 0,1 1 0 0 0,-1 0 0 0 0,1-1 0 0 0,0 0 73 0 0,6-13-1666 0 0,0-1-77 0 0</inkml:trace>
   <inkml:trace contextRef="#ctx0" brushRef="#br0" timeOffset="1089.729">1102 105 19895 0 0,'3'15'1998'0'0,"0"1"-1121"0"0,-1 0 1 0 0,0 0-1 0 0,-2 0 0 0 0,0 1 1 0 0,-1 5-878 0 0,0 32 1734 0 0,11 32-369 0 0,-10-85-1088 0 0,0-1 10 0 0,-9-9 513 0 0,4 1-731 0 0,0 0 1 0 0,1 0-1 0 0,0 0 0 0 0,0-1 1 0 0,1 0-1 0 0,0 1 0 0 0,0-1 1 0 0,1 0-1 0 0,1 0 0 0 0,-1-1 1 0 0,1 1-1 0 0,1-7-69 0 0,0 3 88 0 0,0 0 0 0 0,1 0 0 0 0,1 0 0 0 0,0 0 0 0 0,1 1 0 0 0,0-1 0 0 0,1 1 0 0 0,4-10-88 0 0,-5 15-230 0 0,0-1-1 0 0,1 1 1 0 0,0 1-1 0 0,0-1 1 0 0,0 1-1 0 0,1-1 1 0 0,0 1 0 0 0,1 0-1 0 0,0 0 231 0 0,-3 3-153 0 0,0 1 0 0 0,0 0 0 0 0,1 0-1 0 0,-1 0 1 0 0,0 0 0 0 0,1 0 0 0 0,-1 1 0 0 0,1-1 0 0 0,-1 1 0 0 0,1 0-1 0 0,0 0 1 0 0,0 1 0 0 0,-1-1 0 0 0,1 1 0 0 0,0 0 0 0 0,0 0-1 0 0,0 0 1 0 0,-1 0 0 0 0,3 1 153 0 0,10 2-5307 0 0,-11-2 1692 0 0,6 2-4334 0 0</inkml:trace>
   <inkml:trace contextRef="#ctx0" brushRef="#br0" timeOffset="1424.995">1346 89 16903 0 0,'-21'30'2144'0'0,"16"-24"-1394"0"0,1 1 0 0 0,-1-1 1 0 0,1 1-1 0 0,0 0 0 0 0,-1 4-750 0 0,1-1 995 0 0,1 1 0 0 0,-1 0 0 0 0,1 0 0 0 0,1 0 0 0 0,0 2-995 0 0,2-10 79 0 0,-1 0 1 0 0,1 0 0 0 0,0 0-1 0 0,0 0 1 0 0,1 0 0 0 0,-1 0-1 0 0,0 0 1 0 0,1 0 0 0 0,0 0-1 0 0,0 0 1 0 0,0 0 0 0 0,0 0-1 0 0,0 0 1 0 0,1-1 0 0 0,-1 1-1 0 0,1 0 1 0 0,0-1 0 0 0,0 1-1 0 0,0-1 1 0 0,0 0 0 0 0,2 2-80 0 0,-1-1 37 0 0,0 0 0 0 0,0-1 0 0 0,0 1 0 0 0,0-1 0 0 0,1 0 0 0 0,0 0 0 0 0,-1 0 1 0 0,1 0-1 0 0,0-1 0 0 0,0 0 0 0 0,0 1 0 0 0,0-1 0 0 0,0-1 0 0 0,0 1 0 0 0,0 0 0 0 0,0-1 1 0 0,0 0-1 0 0,0 0 0 0 0,0 0 0 0 0,0-1 0 0 0,0 1 0 0 0,0-1 0 0 0,0 0 0 0 0,0 0 0 0 0,0-1 0 0 0,0 1 1 0 0,0-1-1 0 0,-1 1 0 0 0,4-3-37 0 0,-1 0 5 0 0,-1-1 1 0 0,0 1 0 0 0,0-1-1 0 0,0 0 1 0 0,-1 0 0 0 0,0 0-1 0 0,0-1 1 0 0,0 1 0 0 0,-1-1-1 0 0,1 0 1 0 0,-1 0 0 0 0,-1 0-1 0 0,1-1 1 0 0,-1 1 0 0 0,0-1-1 0 0,-1 1 1 0 0,1-1-1 0 0,-1 0 1 0 0,-1 1 0 0 0,1-4-6 0 0,-1 3-63 0 0,0 0 1 0 0,0 0 0 0 0,0 1-1 0 0,-1-1 1 0 0,0 0-1 0 0,-1 0 1 0 0,1 1 0 0 0,-1-1-1 0 0,0 1 1 0 0,-1 0 0 0 0,0-1-1 0 0,0 1 1 0 0,0 0-1 0 0,-1 0 1 0 0,0 1 0 0 0,0-1-1 0 0,0 1 1 0 0,0 0-1 0 0,-1 0 1 0 0,-2-1 62 0 0,5 4-3 0 0,0 1 0 0 0,0-1 0 0 0,-1 1 0 0 0,1 0 0 0 0,-1-1 0 0 0,1 1 0 0 0,-1 0 0 0 0,1 1 0 0 0,-1-1 0 0 0,0 0 0 0 0,1 1 0 0 0,-1-1 0 0 0,0 1 0 0 0,0 0 0 0 0,1 0 0 0 0,-1 0 0 0 0,0 0 0 0 0,1 1 0 0 0,-1-1 0 0 0,0 1 0 0 0,1-1 0 0 0,-1 1 0 0 0,0 0 0 0 0,1 0 0 0 0,-1 0 0 0 0,1 1 0 0 0,0-1 0 0 0,-1 0 0 0 0,1 1 0 0 0,0 0 0 0 0,0-1 0 0 0,-1 2 3 0 0,-1 0-18 0 0,1 0 1 0 0,0 0-1 0 0,0 1 0 0 0,0-1 0 0 0,0 1 0 0 0,0 0 0 0 0,1-1 0 0 0,0 1 0 0 0,0 0 0 0 0,0 0 0 0 0,0 1 0 0 0,0-1 1 0 0,1 0-1 0 0,0 1 0 0 0,0-1 0 0 0,0 0 0 0 0,0 1 0 0 0,1-1 0 0 0,0 3 18 0 0,0-1-123 0 0,1 0-1 0 0,0 0 1 0 0,0 0-1 0 0,1 0 1 0 0,0 0 0 0 0,0 0-1 0 0,0-1 1 0 0,1 1-1 0 0,0 0 124 0 0,1 2-1633 0 0,1-1 0 0 0,0 0 0 0 0,5 6 1633 0 0,3 0-8501 0 0</inkml:trace>
-  <inkml:trace contextRef="#ctx0" brushRef="#br0" timeOffset="1768.632">1624 31 25367 0 0,'0'0'579'0'0,"0"0"80"0"0,0 0 39 0 0,0 0-87 0 0,7 9-343 0 0,36 57 1781 0 0,38 43-2049 0 0,-68-94 34 0 0,0-1-1 0 0,12 10-33 0 0,-18-19-119 0 0,-1 1 0 0 0,1-1 0 0 0,0-1 1 0 0,1 1-1 0 0,-1-1 0 0 0,1-1 0 0 0,3 2 119 0 0,9-1-1727 0 0,-7-6-6031 0 0,-6-3-855 0 0</inkml:trace>
-  <inkml:trace contextRef="#ctx0" brushRef="#br0" timeOffset="1769.632">1866 1 22431 0 0,'0'0'1027'0'0,"-12"8"378"0"0,-12 23-796 0 0,1 1 0 0 0,2 1-1 0 0,-12 24-608 0 0,-3 13 910 0 0,-6 27-910 0 0,32-66-3962 0 0,9-19 1916 0 0</inkml:trace>
+  <inkml:trace contextRef="#ctx0" brushRef="#br0" timeOffset="1768.631">1624 31 25367 0 0,'0'0'579'0'0,"0"0"80"0"0,0 0 39 0 0,0 0-87 0 0,7 9-343 0 0,36 57 1781 0 0,38 43-2049 0 0,-68-94 34 0 0,0-1-1 0 0,12 10-33 0 0,-18-19-119 0 0,-1 1 0 0 0,1-1 0 0 0,0-1 1 0 0,1 1-1 0 0,-1-1 0 0 0,1-1 0 0 0,3 2 119 0 0,9-1-1727 0 0,-7-6-6031 0 0,-6-3-855 0 0</inkml:trace>
+  <inkml:trace contextRef="#ctx0" brushRef="#br0" timeOffset="1769.631">1866 1 22431 0 0,'0'0'1027'0'0,"-12"8"378"0"0,-12 23-796 0 0,1 1 0 0 0,2 1-1 0 0,-12 24-608 0 0,-3 13 910 0 0,-6 27-910 0 0,32-66-3962 0 0,9-19 1916 0 0</inkml:trace>
 </inkml:ink>
 </file>
 
@@ -6642,8 +6642,8 @@
           </a:p>
         </p:txBody>
       </p:sp>
-      <mc:AlternateContent xmlns:mc="http://schemas.openxmlformats.org/markup-compatibility/2006">
-        <mc:Choice xmlns:a14="http://schemas.microsoft.com/office/drawing/2010/main" Requires="a14">
+      <mc:AlternateContent xmlns:mc="http://schemas.openxmlformats.org/markup-compatibility/2006" xmlns:a14="http://schemas.microsoft.com/office/drawing/2010/main">
+        <mc:Choice Requires="a14">
           <p:sp>
             <p:nvSpPr>
               <p:cNvPr id="3" name="Content Placeholder 2">
@@ -7110,13 +7110,7 @@
                           <a:rPr lang="en-US" b="0" i="1" dirty="0" smtClean="0">
                             <a:latin typeface="Cambria Math" panose="02040503050406030204" pitchFamily="18" charset="0"/>
                           </a:rPr>
-                          <m:t>−</m:t>
-                        </m:r>
-                        <m:r>
-                          <a:rPr lang="en-US" b="0" i="1" dirty="0" smtClean="0">
-                            <a:latin typeface="Cambria Math" panose="02040503050406030204" pitchFamily="18" charset="0"/>
-                          </a:rPr>
-                          <m:t>1</m:t>
+                          <m:t>−1</m:t>
                         </m:r>
                       </m:den>
                     </m:f>
@@ -7208,13 +7202,7 @@
                           <a:rPr lang="en-US" i="1" dirty="0">
                             <a:latin typeface="Cambria Math" panose="02040503050406030204" pitchFamily="18" charset="0"/>
                           </a:rPr>
-                          <m:t>−</m:t>
-                        </m:r>
-                        <m:r>
-                          <a:rPr lang="en-US" i="1" dirty="0">
-                            <a:latin typeface="Cambria Math" panose="02040503050406030204" pitchFamily="18" charset="0"/>
-                          </a:rPr>
-                          <m:t>1</m:t>
+                          <m:t>−1</m:t>
                         </m:r>
                       </m:den>
                     </m:f>
@@ -7859,13 +7847,7 @@
                           <a:rPr lang="en-US" i="1" dirty="0">
                             <a:latin typeface="Cambria Math" panose="02040503050406030204" pitchFamily="18" charset="0"/>
                           </a:rPr>
-                          <m:t>−</m:t>
-                        </m:r>
-                        <m:r>
-                          <a:rPr lang="en-US" i="1" dirty="0">
-                            <a:latin typeface="Cambria Math" panose="02040503050406030204" pitchFamily="18" charset="0"/>
-                          </a:rPr>
-                          <m:t>1</m:t>
+                          <m:t>−1</m:t>
                         </m:r>
                       </m:den>
                     </m:f>
@@ -8384,7 +8366,7 @@
             </p:txBody>
           </p:sp>
         </mc:Choice>
-        <mc:Fallback>
+        <mc:Fallback xmlns="">
           <p:sp>
             <p:nvSpPr>
               <p:cNvPr id="3" name="Content Placeholder 2">
@@ -9043,7 +9025,7 @@
                 </a14:m>
                 <a:r>
                   <a:rPr lang="en-US" dirty="0"/>
-                  <a:t> are the principle components.</a:t>
+                  <a:t>’s rows are the principle components.</a:t>
                 </a:r>
               </a:p>
               <a:p>

</xml_diff>